<commit_message>
Began to dig into actual CFML material.
</commit_message>
<xml_diff>
--- a/presentation.pptx
+++ b/presentation.pptx
@@ -5,7 +5,7 @@
     <p:sldMasterId id="2147484490" r:id="rId1"/>
   </p:sldMasterIdLst>
   <p:notesMasterIdLst>
-    <p:notesMasterId r:id="rId11"/>
+    <p:notesMasterId r:id="rId29"/>
   </p:notesMasterIdLst>
   <p:sldIdLst>
     <p:sldId id="256" r:id="rId2"/>
@@ -17,6 +17,24 @@
     <p:sldId id="262" r:id="rId8"/>
     <p:sldId id="263" r:id="rId9"/>
     <p:sldId id="264" r:id="rId10"/>
+    <p:sldId id="265" r:id="rId11"/>
+    <p:sldId id="266" r:id="rId12"/>
+    <p:sldId id="276" r:id="rId13"/>
+    <p:sldId id="269" r:id="rId14"/>
+    <p:sldId id="267" r:id="rId15"/>
+    <p:sldId id="268" r:id="rId16"/>
+    <p:sldId id="270" r:id="rId17"/>
+    <p:sldId id="271" r:id="rId18"/>
+    <p:sldId id="272" r:id="rId19"/>
+    <p:sldId id="273" r:id="rId20"/>
+    <p:sldId id="274" r:id="rId21"/>
+    <p:sldId id="275" r:id="rId22"/>
+    <p:sldId id="278" r:id="rId23"/>
+    <p:sldId id="279" r:id="rId24"/>
+    <p:sldId id="280" r:id="rId25"/>
+    <p:sldId id="281" r:id="rId26"/>
+    <p:sldId id="282" r:id="rId27"/>
+    <p:sldId id="277" r:id="rId28"/>
   </p:sldIdLst>
   <p:sldSz cx="9144000" cy="6858000" type="screen4x3"/>
   <p:notesSz cx="6858000" cy="9144000"/>
@@ -200,7 +218,7 @@
           <a:p>
             <a:fld id="{7AEE52E7-1768-1242-A166-3ECCD64BD606}" type="datetimeFigureOut">
               <a:rPr lang="en-US" smtClean="0"/>
-              <a:t>10/30/11</a:t>
+              <a:t>11/1/11</a:t>
             </a:fld>
             <a:endParaRPr lang="en-US"/>
           </a:p>
@@ -580,6 +598,1094 @@
 </p:notes>
 </file>
 
+<file path=ppt/notesSlides/notesSlide10.xml><?xml version="1.0" encoding="utf-8"?>
+<p:notes xmlns:a="http://schemas.openxmlformats.org/drawingml/2006/main" xmlns:r="http://schemas.openxmlformats.org/officeDocument/2006/relationships" xmlns:p="http://schemas.openxmlformats.org/presentationml/2006/main">
+  <p:cSld>
+    <p:spTree>
+      <p:nvGrpSpPr>
+        <p:cNvPr id="1" name=""/>
+        <p:cNvGrpSpPr/>
+        <p:nvPr/>
+      </p:nvGrpSpPr>
+      <p:grpSpPr>
+        <a:xfrm>
+          <a:off x="0" y="0"/>
+          <a:ext cx="0" cy="0"/>
+          <a:chOff x="0" y="0"/>
+          <a:chExt cx="0" cy="0"/>
+        </a:xfrm>
+      </p:grpSpPr>
+      <p:sp>
+        <p:nvSpPr>
+          <p:cNvPr id="2" name="Slide Image Placeholder 1"/>
+          <p:cNvSpPr>
+            <a:spLocks noGrp="1" noRot="1" noChangeAspect="1"/>
+          </p:cNvSpPr>
+          <p:nvPr>
+            <p:ph type="sldImg"/>
+          </p:nvPr>
+        </p:nvSpPr>
+        <p:spPr/>
+      </p:sp>
+      <p:sp>
+        <p:nvSpPr>
+          <p:cNvPr id="3" name="Notes Placeholder 2"/>
+          <p:cNvSpPr>
+            <a:spLocks noGrp="1"/>
+          </p:cNvSpPr>
+          <p:nvPr>
+            <p:ph type="body" idx="1"/>
+          </p:nvPr>
+        </p:nvSpPr>
+        <p:spPr/>
+        <p:txBody>
+          <a:bodyPr/>
+          <a:lstStyle/>
+          <a:p>
+            <a:pPr marL="0" marR="0" indent="0" algn="l" defTabSz="457200" rtl="0" eaLnBrk="1" fontAlgn="auto" latinLnBrk="0" hangingPunct="1">
+              <a:lnSpc>
+                <a:spcPct val="100000"/>
+              </a:lnSpc>
+              <a:spcBef>
+                <a:spcPts val="0"/>
+              </a:spcBef>
+              <a:spcAft>
+                <a:spcPts val="0"/>
+              </a:spcAft>
+              <a:buClrTx/>
+              <a:buSzTx/>
+              <a:buFontTx/>
+              <a:buNone/>
+              <a:tabLst/>
+              <a:defRPr/>
+            </a:pPr>
+            <a:r>
+              <a:rPr lang="en-US" dirty="0" smtClean="0"/>
+              <a:t>http://</a:t>
+            </a:r>
+            <a:r>
+              <a:rPr lang="en-US" dirty="0" err="1" smtClean="0"/>
+              <a:t>openbd.org</a:t>
+            </a:r>
+            <a:r>
+              <a:rPr lang="en-US" dirty="0" smtClean="0"/>
+              <a:t>/manual/?/</a:t>
+            </a:r>
+            <a:r>
+              <a:rPr lang="en-US" dirty="0" err="1" smtClean="0"/>
+              <a:t>basic_cfml</a:t>
+            </a:r>
+            <a:endParaRPr lang="en-US" dirty="0" smtClean="0"/>
+          </a:p>
+          <a:p>
+            <a:endParaRPr lang="en-US" dirty="0"/>
+          </a:p>
+        </p:txBody>
+      </p:sp>
+      <p:sp>
+        <p:nvSpPr>
+          <p:cNvPr id="4" name="Slide Number Placeholder 3"/>
+          <p:cNvSpPr>
+            <a:spLocks noGrp="1"/>
+          </p:cNvSpPr>
+          <p:nvPr>
+            <p:ph type="sldNum" sz="quarter" idx="10"/>
+          </p:nvPr>
+        </p:nvSpPr>
+        <p:spPr/>
+        <p:txBody>
+          <a:bodyPr/>
+          <a:lstStyle/>
+          <a:p>
+            <a:fld id="{433137AF-EBFE-664E-840A-10B3290003D1}" type="slidenum">
+              <a:rPr lang="en-US" smtClean="0"/>
+              <a:t>13</a:t>
+            </a:fld>
+            <a:endParaRPr lang="en-US"/>
+          </a:p>
+        </p:txBody>
+      </p:sp>
+    </p:spTree>
+    <p:extLst>
+      <p:ext uri="{BB962C8B-B14F-4D97-AF65-F5344CB8AC3E}">
+        <p14:creationId xmlns:p14="http://schemas.microsoft.com/office/powerpoint/2010/main" val="4110009042"/>
+      </p:ext>
+    </p:extLst>
+  </p:cSld>
+  <p:clrMapOvr>
+    <a:masterClrMapping/>
+  </p:clrMapOvr>
+</p:notes>
+</file>
+
+<file path=ppt/notesSlides/notesSlide11.xml><?xml version="1.0" encoding="utf-8"?>
+<p:notes xmlns:a="http://schemas.openxmlformats.org/drawingml/2006/main" xmlns:r="http://schemas.openxmlformats.org/officeDocument/2006/relationships" xmlns:p="http://schemas.openxmlformats.org/presentationml/2006/main">
+  <p:cSld>
+    <p:spTree>
+      <p:nvGrpSpPr>
+        <p:cNvPr id="1" name=""/>
+        <p:cNvGrpSpPr/>
+        <p:nvPr/>
+      </p:nvGrpSpPr>
+      <p:grpSpPr>
+        <a:xfrm>
+          <a:off x="0" y="0"/>
+          <a:ext cx="0" cy="0"/>
+          <a:chOff x="0" y="0"/>
+          <a:chExt cx="0" cy="0"/>
+        </a:xfrm>
+      </p:grpSpPr>
+      <p:sp>
+        <p:nvSpPr>
+          <p:cNvPr id="2" name="Slide Image Placeholder 1"/>
+          <p:cNvSpPr>
+            <a:spLocks noGrp="1" noRot="1" noChangeAspect="1"/>
+          </p:cNvSpPr>
+          <p:nvPr>
+            <p:ph type="sldImg"/>
+          </p:nvPr>
+        </p:nvSpPr>
+        <p:spPr/>
+      </p:sp>
+      <p:sp>
+        <p:nvSpPr>
+          <p:cNvPr id="3" name="Notes Placeholder 2"/>
+          <p:cNvSpPr>
+            <a:spLocks noGrp="1"/>
+          </p:cNvSpPr>
+          <p:nvPr>
+            <p:ph type="body" idx="1"/>
+          </p:nvPr>
+        </p:nvSpPr>
+        <p:spPr/>
+        <p:txBody>
+          <a:bodyPr/>
+          <a:lstStyle/>
+          <a:p>
+            <a:r>
+              <a:rPr lang="en-US" dirty="0" smtClean="0"/>
+              <a:t>http://</a:t>
+            </a:r>
+            <a:r>
+              <a:rPr lang="en-US" dirty="0" err="1" smtClean="0"/>
+              <a:t>openbd.org</a:t>
+            </a:r>
+            <a:r>
+              <a:rPr lang="en-US" dirty="0" smtClean="0"/>
+              <a:t>/manual/?/</a:t>
+            </a:r>
+            <a:r>
+              <a:rPr lang="en-US" dirty="0" err="1" smtClean="0"/>
+              <a:t>basic_cfml</a:t>
+            </a:r>
+            <a:endParaRPr lang="en-US" dirty="0" smtClean="0"/>
+          </a:p>
+          <a:p>
+            <a:r>
+              <a:rPr lang="en-US" dirty="0" smtClean="0"/>
+              <a:t>http://</a:t>
+            </a:r>
+            <a:r>
+              <a:rPr lang="en-US" dirty="0" err="1" smtClean="0"/>
+              <a:t>openbd.org</a:t>
+            </a:r>
+            <a:r>
+              <a:rPr lang="en-US" dirty="0" smtClean="0"/>
+              <a:t>/manual/?/</a:t>
+            </a:r>
+            <a:r>
+              <a:rPr lang="en-US" dirty="0" err="1" smtClean="0"/>
+              <a:t>language_scopes</a:t>
+            </a:r>
+            <a:endParaRPr lang="en-US" dirty="0"/>
+          </a:p>
+        </p:txBody>
+      </p:sp>
+      <p:sp>
+        <p:nvSpPr>
+          <p:cNvPr id="4" name="Slide Number Placeholder 3"/>
+          <p:cNvSpPr>
+            <a:spLocks noGrp="1"/>
+          </p:cNvSpPr>
+          <p:nvPr>
+            <p:ph type="sldNum" sz="quarter" idx="10"/>
+          </p:nvPr>
+        </p:nvSpPr>
+        <p:spPr/>
+        <p:txBody>
+          <a:bodyPr/>
+          <a:lstStyle/>
+          <a:p>
+            <a:fld id="{433137AF-EBFE-664E-840A-10B3290003D1}" type="slidenum">
+              <a:rPr lang="en-US" smtClean="0"/>
+              <a:t>14</a:t>
+            </a:fld>
+            <a:endParaRPr lang="en-US"/>
+          </a:p>
+        </p:txBody>
+      </p:sp>
+    </p:spTree>
+    <p:extLst>
+      <p:ext uri="{BB962C8B-B14F-4D97-AF65-F5344CB8AC3E}">
+        <p14:creationId xmlns:p14="http://schemas.microsoft.com/office/powerpoint/2010/main" val="1640793204"/>
+      </p:ext>
+    </p:extLst>
+  </p:cSld>
+  <p:clrMapOvr>
+    <a:masterClrMapping/>
+  </p:clrMapOvr>
+</p:notes>
+</file>
+
+<file path=ppt/notesSlides/notesSlide12.xml><?xml version="1.0" encoding="utf-8"?>
+<p:notes xmlns:a="http://schemas.openxmlformats.org/drawingml/2006/main" xmlns:r="http://schemas.openxmlformats.org/officeDocument/2006/relationships" xmlns:p="http://schemas.openxmlformats.org/presentationml/2006/main">
+  <p:cSld>
+    <p:spTree>
+      <p:nvGrpSpPr>
+        <p:cNvPr id="1" name=""/>
+        <p:cNvGrpSpPr/>
+        <p:nvPr/>
+      </p:nvGrpSpPr>
+      <p:grpSpPr>
+        <a:xfrm>
+          <a:off x="0" y="0"/>
+          <a:ext cx="0" cy="0"/>
+          <a:chOff x="0" y="0"/>
+          <a:chExt cx="0" cy="0"/>
+        </a:xfrm>
+      </p:grpSpPr>
+      <p:sp>
+        <p:nvSpPr>
+          <p:cNvPr id="2" name="Slide Image Placeholder 1"/>
+          <p:cNvSpPr>
+            <a:spLocks noGrp="1" noRot="1" noChangeAspect="1"/>
+          </p:cNvSpPr>
+          <p:nvPr>
+            <p:ph type="sldImg"/>
+          </p:nvPr>
+        </p:nvSpPr>
+        <p:spPr/>
+      </p:sp>
+      <p:sp>
+        <p:nvSpPr>
+          <p:cNvPr id="3" name="Notes Placeholder 2"/>
+          <p:cNvSpPr>
+            <a:spLocks noGrp="1"/>
+          </p:cNvSpPr>
+          <p:nvPr>
+            <p:ph type="body" idx="1"/>
+          </p:nvPr>
+        </p:nvSpPr>
+        <p:spPr/>
+        <p:txBody>
+          <a:bodyPr/>
+          <a:lstStyle/>
+          <a:p>
+            <a:pPr marL="0" marR="0" indent="0" algn="l" defTabSz="457200" rtl="0" eaLnBrk="1" fontAlgn="auto" latinLnBrk="0" hangingPunct="1">
+              <a:lnSpc>
+                <a:spcPct val="100000"/>
+              </a:lnSpc>
+              <a:spcBef>
+                <a:spcPts val="0"/>
+              </a:spcBef>
+              <a:spcAft>
+                <a:spcPts val="0"/>
+              </a:spcAft>
+              <a:buClrTx/>
+              <a:buSzTx/>
+              <a:buFontTx/>
+              <a:buNone/>
+              <a:tabLst/>
+              <a:defRPr/>
+            </a:pPr>
+            <a:r>
+              <a:rPr lang="en-US" dirty="0" smtClean="0"/>
+              <a:t>http://</a:t>
+            </a:r>
+            <a:r>
+              <a:rPr lang="en-US" dirty="0" err="1" smtClean="0"/>
+              <a:t>openbd.org</a:t>
+            </a:r>
+            <a:r>
+              <a:rPr lang="en-US" dirty="0" smtClean="0"/>
+              <a:t>/manual/?/</a:t>
+            </a:r>
+            <a:r>
+              <a:rPr lang="en-US" dirty="0" err="1" smtClean="0"/>
+              <a:t>basic_cfml</a:t>
+            </a:r>
+            <a:endParaRPr lang="en-US" dirty="0" smtClean="0"/>
+          </a:p>
+          <a:p>
+            <a:endParaRPr lang="en-US" dirty="0"/>
+          </a:p>
+        </p:txBody>
+      </p:sp>
+      <p:sp>
+        <p:nvSpPr>
+          <p:cNvPr id="4" name="Slide Number Placeholder 3"/>
+          <p:cNvSpPr>
+            <a:spLocks noGrp="1"/>
+          </p:cNvSpPr>
+          <p:nvPr>
+            <p:ph type="sldNum" sz="quarter" idx="10"/>
+          </p:nvPr>
+        </p:nvSpPr>
+        <p:spPr/>
+        <p:txBody>
+          <a:bodyPr/>
+          <a:lstStyle/>
+          <a:p>
+            <a:fld id="{433137AF-EBFE-664E-840A-10B3290003D1}" type="slidenum">
+              <a:rPr lang="en-US" smtClean="0"/>
+              <a:t>15</a:t>
+            </a:fld>
+            <a:endParaRPr lang="en-US"/>
+          </a:p>
+        </p:txBody>
+      </p:sp>
+    </p:spTree>
+    <p:extLst>
+      <p:ext uri="{BB962C8B-B14F-4D97-AF65-F5344CB8AC3E}">
+        <p14:creationId xmlns:p14="http://schemas.microsoft.com/office/powerpoint/2010/main" val="4023371768"/>
+      </p:ext>
+    </p:extLst>
+  </p:cSld>
+  <p:clrMapOvr>
+    <a:masterClrMapping/>
+  </p:clrMapOvr>
+</p:notes>
+</file>
+
+<file path=ppt/notesSlides/notesSlide13.xml><?xml version="1.0" encoding="utf-8"?>
+<p:notes xmlns:a="http://schemas.openxmlformats.org/drawingml/2006/main" xmlns:r="http://schemas.openxmlformats.org/officeDocument/2006/relationships" xmlns:p="http://schemas.openxmlformats.org/presentationml/2006/main">
+  <p:cSld>
+    <p:spTree>
+      <p:nvGrpSpPr>
+        <p:cNvPr id="1" name=""/>
+        <p:cNvGrpSpPr/>
+        <p:nvPr/>
+      </p:nvGrpSpPr>
+      <p:grpSpPr>
+        <a:xfrm>
+          <a:off x="0" y="0"/>
+          <a:ext cx="0" cy="0"/>
+          <a:chOff x="0" y="0"/>
+          <a:chExt cx="0" cy="0"/>
+        </a:xfrm>
+      </p:grpSpPr>
+      <p:sp>
+        <p:nvSpPr>
+          <p:cNvPr id="2" name="Slide Image Placeholder 1"/>
+          <p:cNvSpPr>
+            <a:spLocks noGrp="1" noRot="1" noChangeAspect="1"/>
+          </p:cNvSpPr>
+          <p:nvPr>
+            <p:ph type="sldImg"/>
+          </p:nvPr>
+        </p:nvSpPr>
+        <p:spPr/>
+      </p:sp>
+      <p:sp>
+        <p:nvSpPr>
+          <p:cNvPr id="3" name="Notes Placeholder 2"/>
+          <p:cNvSpPr>
+            <a:spLocks noGrp="1"/>
+          </p:cNvSpPr>
+          <p:nvPr>
+            <p:ph type="body" idx="1"/>
+          </p:nvPr>
+        </p:nvSpPr>
+        <p:spPr/>
+        <p:txBody>
+          <a:bodyPr/>
+          <a:lstStyle/>
+          <a:p>
+            <a:pPr marL="0" marR="0" indent="0" algn="l" defTabSz="457200" rtl="0" eaLnBrk="1" fontAlgn="auto" latinLnBrk="0" hangingPunct="1">
+              <a:lnSpc>
+                <a:spcPct val="100000"/>
+              </a:lnSpc>
+              <a:spcBef>
+                <a:spcPts val="0"/>
+              </a:spcBef>
+              <a:spcAft>
+                <a:spcPts val="0"/>
+              </a:spcAft>
+              <a:buClrTx/>
+              <a:buSzTx/>
+              <a:buFontTx/>
+              <a:buNone/>
+              <a:tabLst/>
+              <a:defRPr/>
+            </a:pPr>
+            <a:r>
+              <a:rPr lang="en-US" dirty="0" smtClean="0"/>
+              <a:t>http://</a:t>
+            </a:r>
+            <a:r>
+              <a:rPr lang="en-US" dirty="0" err="1" smtClean="0"/>
+              <a:t>openbd.org</a:t>
+            </a:r>
+            <a:r>
+              <a:rPr lang="en-US" dirty="0" smtClean="0"/>
+              <a:t>/manual/?/</a:t>
+            </a:r>
+            <a:r>
+              <a:rPr lang="en-US" dirty="0" err="1" smtClean="0"/>
+              <a:t>basic_cfml</a:t>
+            </a:r>
+            <a:endParaRPr lang="en-US" dirty="0" smtClean="0"/>
+          </a:p>
+          <a:p>
+            <a:endParaRPr lang="en-US" dirty="0"/>
+          </a:p>
+        </p:txBody>
+      </p:sp>
+      <p:sp>
+        <p:nvSpPr>
+          <p:cNvPr id="4" name="Slide Number Placeholder 3"/>
+          <p:cNvSpPr>
+            <a:spLocks noGrp="1"/>
+          </p:cNvSpPr>
+          <p:nvPr>
+            <p:ph type="sldNum" sz="quarter" idx="10"/>
+          </p:nvPr>
+        </p:nvSpPr>
+        <p:spPr/>
+        <p:txBody>
+          <a:bodyPr/>
+          <a:lstStyle/>
+          <a:p>
+            <a:fld id="{433137AF-EBFE-664E-840A-10B3290003D1}" type="slidenum">
+              <a:rPr lang="en-US" smtClean="0"/>
+              <a:t>16</a:t>
+            </a:fld>
+            <a:endParaRPr lang="en-US"/>
+          </a:p>
+        </p:txBody>
+      </p:sp>
+    </p:spTree>
+    <p:extLst>
+      <p:ext uri="{BB962C8B-B14F-4D97-AF65-F5344CB8AC3E}">
+        <p14:creationId xmlns:p14="http://schemas.microsoft.com/office/powerpoint/2010/main" val="582364797"/>
+      </p:ext>
+    </p:extLst>
+  </p:cSld>
+  <p:clrMapOvr>
+    <a:masterClrMapping/>
+  </p:clrMapOvr>
+</p:notes>
+</file>
+
+<file path=ppt/notesSlides/notesSlide14.xml><?xml version="1.0" encoding="utf-8"?>
+<p:notes xmlns:a="http://schemas.openxmlformats.org/drawingml/2006/main" xmlns:r="http://schemas.openxmlformats.org/officeDocument/2006/relationships" xmlns:p="http://schemas.openxmlformats.org/presentationml/2006/main">
+  <p:cSld>
+    <p:spTree>
+      <p:nvGrpSpPr>
+        <p:cNvPr id="1" name=""/>
+        <p:cNvGrpSpPr/>
+        <p:nvPr/>
+      </p:nvGrpSpPr>
+      <p:grpSpPr>
+        <a:xfrm>
+          <a:off x="0" y="0"/>
+          <a:ext cx="0" cy="0"/>
+          <a:chOff x="0" y="0"/>
+          <a:chExt cx="0" cy="0"/>
+        </a:xfrm>
+      </p:grpSpPr>
+      <p:sp>
+        <p:nvSpPr>
+          <p:cNvPr id="2" name="Slide Image Placeholder 1"/>
+          <p:cNvSpPr>
+            <a:spLocks noGrp="1" noRot="1" noChangeAspect="1"/>
+          </p:cNvSpPr>
+          <p:nvPr>
+            <p:ph type="sldImg"/>
+          </p:nvPr>
+        </p:nvSpPr>
+        <p:spPr/>
+      </p:sp>
+      <p:sp>
+        <p:nvSpPr>
+          <p:cNvPr id="3" name="Notes Placeholder 2"/>
+          <p:cNvSpPr>
+            <a:spLocks noGrp="1"/>
+          </p:cNvSpPr>
+          <p:nvPr>
+            <p:ph type="body" idx="1"/>
+          </p:nvPr>
+        </p:nvSpPr>
+        <p:spPr/>
+        <p:txBody>
+          <a:bodyPr/>
+          <a:lstStyle/>
+          <a:p>
+            <a:r>
+              <a:rPr lang="en-US" dirty="0" smtClean="0"/>
+              <a:t>http://</a:t>
+            </a:r>
+            <a:r>
+              <a:rPr lang="en-US" dirty="0" err="1" smtClean="0"/>
+              <a:t>openbd.org</a:t>
+            </a:r>
+            <a:r>
+              <a:rPr lang="en-US" dirty="0" smtClean="0"/>
+              <a:t>/manual/?/</a:t>
+            </a:r>
+            <a:r>
+              <a:rPr lang="en-US" dirty="0" err="1" smtClean="0"/>
+              <a:t>language_creation</a:t>
+            </a:r>
+            <a:endParaRPr lang="en-US" dirty="0" smtClean="0"/>
+          </a:p>
+          <a:p>
+            <a:r>
+              <a:rPr lang="en-US" dirty="0" smtClean="0"/>
+              <a:t>http://</a:t>
+            </a:r>
+            <a:r>
+              <a:rPr lang="en-US" dirty="0" err="1" smtClean="0"/>
+              <a:t>openbd.org</a:t>
+            </a:r>
+            <a:r>
+              <a:rPr lang="en-US" dirty="0" smtClean="0"/>
+              <a:t>/manual/?/tag/CFPARAM</a:t>
+            </a:r>
+            <a:endParaRPr lang="en-US" dirty="0"/>
+          </a:p>
+        </p:txBody>
+      </p:sp>
+      <p:sp>
+        <p:nvSpPr>
+          <p:cNvPr id="4" name="Slide Number Placeholder 3"/>
+          <p:cNvSpPr>
+            <a:spLocks noGrp="1"/>
+          </p:cNvSpPr>
+          <p:nvPr>
+            <p:ph type="sldNum" sz="quarter" idx="10"/>
+          </p:nvPr>
+        </p:nvSpPr>
+        <p:spPr/>
+        <p:txBody>
+          <a:bodyPr/>
+          <a:lstStyle/>
+          <a:p>
+            <a:fld id="{433137AF-EBFE-664E-840A-10B3290003D1}" type="slidenum">
+              <a:rPr lang="en-US" smtClean="0"/>
+              <a:t>17</a:t>
+            </a:fld>
+            <a:endParaRPr lang="en-US"/>
+          </a:p>
+        </p:txBody>
+      </p:sp>
+    </p:spTree>
+    <p:extLst>
+      <p:ext uri="{BB962C8B-B14F-4D97-AF65-F5344CB8AC3E}">
+        <p14:creationId xmlns:p14="http://schemas.microsoft.com/office/powerpoint/2010/main" val="3323382600"/>
+      </p:ext>
+    </p:extLst>
+  </p:cSld>
+  <p:clrMapOvr>
+    <a:masterClrMapping/>
+  </p:clrMapOvr>
+</p:notes>
+</file>
+
+<file path=ppt/notesSlides/notesSlide15.xml><?xml version="1.0" encoding="utf-8"?>
+<p:notes xmlns:a="http://schemas.openxmlformats.org/drawingml/2006/main" xmlns:r="http://schemas.openxmlformats.org/officeDocument/2006/relationships" xmlns:p="http://schemas.openxmlformats.org/presentationml/2006/main">
+  <p:cSld>
+    <p:spTree>
+      <p:nvGrpSpPr>
+        <p:cNvPr id="1" name=""/>
+        <p:cNvGrpSpPr/>
+        <p:nvPr/>
+      </p:nvGrpSpPr>
+      <p:grpSpPr>
+        <a:xfrm>
+          <a:off x="0" y="0"/>
+          <a:ext cx="0" cy="0"/>
+          <a:chOff x="0" y="0"/>
+          <a:chExt cx="0" cy="0"/>
+        </a:xfrm>
+      </p:grpSpPr>
+      <p:sp>
+        <p:nvSpPr>
+          <p:cNvPr id="2" name="Slide Image Placeholder 1"/>
+          <p:cNvSpPr>
+            <a:spLocks noGrp="1" noRot="1" noChangeAspect="1"/>
+          </p:cNvSpPr>
+          <p:nvPr>
+            <p:ph type="sldImg"/>
+          </p:nvPr>
+        </p:nvSpPr>
+        <p:spPr/>
+      </p:sp>
+      <p:sp>
+        <p:nvSpPr>
+          <p:cNvPr id="3" name="Notes Placeholder 2"/>
+          <p:cNvSpPr>
+            <a:spLocks noGrp="1"/>
+          </p:cNvSpPr>
+          <p:nvPr>
+            <p:ph type="body" idx="1"/>
+          </p:nvPr>
+        </p:nvSpPr>
+        <p:spPr/>
+        <p:txBody>
+          <a:bodyPr/>
+          <a:lstStyle/>
+          <a:p>
+            <a:r>
+              <a:rPr lang="en-US" dirty="0" smtClean="0"/>
+              <a:t>http://</a:t>
+            </a:r>
+            <a:r>
+              <a:rPr lang="en-US" dirty="0" err="1" smtClean="0"/>
+              <a:t>openbd.org</a:t>
+            </a:r>
+            <a:r>
+              <a:rPr lang="en-US" dirty="0" smtClean="0"/>
+              <a:t>/manual/?/</a:t>
+            </a:r>
+            <a:r>
+              <a:rPr lang="en-US" dirty="0" err="1" smtClean="0"/>
+              <a:t>language_creation</a:t>
+            </a:r>
+            <a:endParaRPr lang="en-US" dirty="0"/>
+          </a:p>
+        </p:txBody>
+      </p:sp>
+      <p:sp>
+        <p:nvSpPr>
+          <p:cNvPr id="4" name="Slide Number Placeholder 3"/>
+          <p:cNvSpPr>
+            <a:spLocks noGrp="1"/>
+          </p:cNvSpPr>
+          <p:nvPr>
+            <p:ph type="sldNum" sz="quarter" idx="10"/>
+          </p:nvPr>
+        </p:nvSpPr>
+        <p:spPr/>
+        <p:txBody>
+          <a:bodyPr/>
+          <a:lstStyle/>
+          <a:p>
+            <a:fld id="{433137AF-EBFE-664E-840A-10B3290003D1}" type="slidenum">
+              <a:rPr lang="en-US" smtClean="0"/>
+              <a:t>18</a:t>
+            </a:fld>
+            <a:endParaRPr lang="en-US"/>
+          </a:p>
+        </p:txBody>
+      </p:sp>
+    </p:spTree>
+    <p:extLst>
+      <p:ext uri="{BB962C8B-B14F-4D97-AF65-F5344CB8AC3E}">
+        <p14:creationId xmlns:p14="http://schemas.microsoft.com/office/powerpoint/2010/main" val="1115322018"/>
+      </p:ext>
+    </p:extLst>
+  </p:cSld>
+  <p:clrMapOvr>
+    <a:masterClrMapping/>
+  </p:clrMapOvr>
+</p:notes>
+</file>
+
+<file path=ppt/notesSlides/notesSlide16.xml><?xml version="1.0" encoding="utf-8"?>
+<p:notes xmlns:a="http://schemas.openxmlformats.org/drawingml/2006/main" xmlns:r="http://schemas.openxmlformats.org/officeDocument/2006/relationships" xmlns:p="http://schemas.openxmlformats.org/presentationml/2006/main">
+  <p:cSld>
+    <p:spTree>
+      <p:nvGrpSpPr>
+        <p:cNvPr id="1" name=""/>
+        <p:cNvGrpSpPr/>
+        <p:nvPr/>
+      </p:nvGrpSpPr>
+      <p:grpSpPr>
+        <a:xfrm>
+          <a:off x="0" y="0"/>
+          <a:ext cx="0" cy="0"/>
+          <a:chOff x="0" y="0"/>
+          <a:chExt cx="0" cy="0"/>
+        </a:xfrm>
+      </p:grpSpPr>
+      <p:sp>
+        <p:nvSpPr>
+          <p:cNvPr id="2" name="Slide Image Placeholder 1"/>
+          <p:cNvSpPr>
+            <a:spLocks noGrp="1" noRot="1" noChangeAspect="1"/>
+          </p:cNvSpPr>
+          <p:nvPr>
+            <p:ph type="sldImg"/>
+          </p:nvPr>
+        </p:nvSpPr>
+        <p:spPr/>
+      </p:sp>
+      <p:sp>
+        <p:nvSpPr>
+          <p:cNvPr id="3" name="Notes Placeholder 2"/>
+          <p:cNvSpPr>
+            <a:spLocks noGrp="1"/>
+          </p:cNvSpPr>
+          <p:nvPr>
+            <p:ph type="body" idx="1"/>
+          </p:nvPr>
+        </p:nvSpPr>
+        <p:spPr/>
+        <p:txBody>
+          <a:bodyPr/>
+          <a:lstStyle/>
+          <a:p>
+            <a:r>
+              <a:rPr lang="en-US" dirty="0" smtClean="0"/>
+              <a:t>http://</a:t>
+            </a:r>
+            <a:r>
+              <a:rPr lang="en-US" dirty="0" err="1" smtClean="0"/>
+              <a:t>openbd.org</a:t>
+            </a:r>
+            <a:r>
+              <a:rPr lang="en-US" dirty="0" smtClean="0"/>
+              <a:t>/manual/?/</a:t>
+            </a:r>
+            <a:r>
+              <a:rPr lang="en-US" dirty="0" err="1" smtClean="0"/>
+              <a:t>language_creation</a:t>
+            </a:r>
+            <a:endParaRPr lang="en-US" dirty="0"/>
+          </a:p>
+        </p:txBody>
+      </p:sp>
+      <p:sp>
+        <p:nvSpPr>
+          <p:cNvPr id="4" name="Slide Number Placeholder 3"/>
+          <p:cNvSpPr>
+            <a:spLocks noGrp="1"/>
+          </p:cNvSpPr>
+          <p:nvPr>
+            <p:ph type="sldNum" sz="quarter" idx="10"/>
+          </p:nvPr>
+        </p:nvSpPr>
+        <p:spPr/>
+        <p:txBody>
+          <a:bodyPr/>
+          <a:lstStyle/>
+          <a:p>
+            <a:fld id="{433137AF-EBFE-664E-840A-10B3290003D1}" type="slidenum">
+              <a:rPr lang="en-US" smtClean="0"/>
+              <a:t>19</a:t>
+            </a:fld>
+            <a:endParaRPr lang="en-US"/>
+          </a:p>
+        </p:txBody>
+      </p:sp>
+    </p:spTree>
+    <p:extLst>
+      <p:ext uri="{BB962C8B-B14F-4D97-AF65-F5344CB8AC3E}">
+        <p14:creationId xmlns:p14="http://schemas.microsoft.com/office/powerpoint/2010/main" val="846956662"/>
+      </p:ext>
+    </p:extLst>
+  </p:cSld>
+  <p:clrMapOvr>
+    <a:masterClrMapping/>
+  </p:clrMapOvr>
+</p:notes>
+</file>
+
+<file path=ppt/notesSlides/notesSlide17.xml><?xml version="1.0" encoding="utf-8"?>
+<p:notes xmlns:a="http://schemas.openxmlformats.org/drawingml/2006/main" xmlns:r="http://schemas.openxmlformats.org/officeDocument/2006/relationships" xmlns:p="http://schemas.openxmlformats.org/presentationml/2006/main">
+  <p:cSld>
+    <p:spTree>
+      <p:nvGrpSpPr>
+        <p:cNvPr id="1" name=""/>
+        <p:cNvGrpSpPr/>
+        <p:nvPr/>
+      </p:nvGrpSpPr>
+      <p:grpSpPr>
+        <a:xfrm>
+          <a:off x="0" y="0"/>
+          <a:ext cx="0" cy="0"/>
+          <a:chOff x="0" y="0"/>
+          <a:chExt cx="0" cy="0"/>
+        </a:xfrm>
+      </p:grpSpPr>
+      <p:sp>
+        <p:nvSpPr>
+          <p:cNvPr id="2" name="Slide Image Placeholder 1"/>
+          <p:cNvSpPr>
+            <a:spLocks noGrp="1" noRot="1" noChangeAspect="1"/>
+          </p:cNvSpPr>
+          <p:nvPr>
+            <p:ph type="sldImg"/>
+          </p:nvPr>
+        </p:nvSpPr>
+        <p:spPr/>
+      </p:sp>
+      <p:sp>
+        <p:nvSpPr>
+          <p:cNvPr id="3" name="Notes Placeholder 2"/>
+          <p:cNvSpPr>
+            <a:spLocks noGrp="1"/>
+          </p:cNvSpPr>
+          <p:nvPr>
+            <p:ph type="body" idx="1"/>
+          </p:nvPr>
+        </p:nvSpPr>
+        <p:spPr/>
+        <p:txBody>
+          <a:bodyPr/>
+          <a:lstStyle/>
+          <a:p>
+            <a:r>
+              <a:rPr lang="en-US" dirty="0" smtClean="0"/>
+              <a:t>http://</a:t>
+            </a:r>
+            <a:r>
+              <a:rPr lang="en-US" dirty="0" err="1" smtClean="0"/>
+              <a:t>openbd.org</a:t>
+            </a:r>
+            <a:r>
+              <a:rPr lang="en-US" dirty="0" smtClean="0"/>
+              <a:t>/manual/?/</a:t>
+            </a:r>
+            <a:r>
+              <a:rPr lang="en-US" dirty="0" err="1" smtClean="0"/>
+              <a:t>language_operators</a:t>
+            </a:r>
+            <a:endParaRPr lang="en-US" dirty="0"/>
+          </a:p>
+        </p:txBody>
+      </p:sp>
+      <p:sp>
+        <p:nvSpPr>
+          <p:cNvPr id="4" name="Slide Number Placeholder 3"/>
+          <p:cNvSpPr>
+            <a:spLocks noGrp="1"/>
+          </p:cNvSpPr>
+          <p:nvPr>
+            <p:ph type="sldNum" sz="quarter" idx="10"/>
+          </p:nvPr>
+        </p:nvSpPr>
+        <p:spPr/>
+        <p:txBody>
+          <a:bodyPr/>
+          <a:lstStyle/>
+          <a:p>
+            <a:fld id="{433137AF-EBFE-664E-840A-10B3290003D1}" type="slidenum">
+              <a:rPr lang="en-US" smtClean="0"/>
+              <a:t>20</a:t>
+            </a:fld>
+            <a:endParaRPr lang="en-US"/>
+          </a:p>
+        </p:txBody>
+      </p:sp>
+    </p:spTree>
+    <p:extLst>
+      <p:ext uri="{BB962C8B-B14F-4D97-AF65-F5344CB8AC3E}">
+        <p14:creationId xmlns:p14="http://schemas.microsoft.com/office/powerpoint/2010/main" val="3159642190"/>
+      </p:ext>
+    </p:extLst>
+  </p:cSld>
+  <p:clrMapOvr>
+    <a:masterClrMapping/>
+  </p:clrMapOvr>
+</p:notes>
+</file>
+
+<file path=ppt/notesSlides/notesSlide18.xml><?xml version="1.0" encoding="utf-8"?>
+<p:notes xmlns:a="http://schemas.openxmlformats.org/drawingml/2006/main" xmlns:r="http://schemas.openxmlformats.org/officeDocument/2006/relationships" xmlns:p="http://schemas.openxmlformats.org/presentationml/2006/main">
+  <p:cSld>
+    <p:spTree>
+      <p:nvGrpSpPr>
+        <p:cNvPr id="1" name=""/>
+        <p:cNvGrpSpPr/>
+        <p:nvPr/>
+      </p:nvGrpSpPr>
+      <p:grpSpPr>
+        <a:xfrm>
+          <a:off x="0" y="0"/>
+          <a:ext cx="0" cy="0"/>
+          <a:chOff x="0" y="0"/>
+          <a:chExt cx="0" cy="0"/>
+        </a:xfrm>
+      </p:grpSpPr>
+      <p:sp>
+        <p:nvSpPr>
+          <p:cNvPr id="2" name="Slide Image Placeholder 1"/>
+          <p:cNvSpPr>
+            <a:spLocks noGrp="1" noRot="1" noChangeAspect="1"/>
+          </p:cNvSpPr>
+          <p:nvPr>
+            <p:ph type="sldImg"/>
+          </p:nvPr>
+        </p:nvSpPr>
+        <p:spPr/>
+      </p:sp>
+      <p:sp>
+        <p:nvSpPr>
+          <p:cNvPr id="3" name="Notes Placeholder 2"/>
+          <p:cNvSpPr>
+            <a:spLocks noGrp="1"/>
+          </p:cNvSpPr>
+          <p:nvPr>
+            <p:ph type="body" idx="1"/>
+          </p:nvPr>
+        </p:nvSpPr>
+        <p:spPr/>
+        <p:txBody>
+          <a:bodyPr/>
+          <a:lstStyle/>
+          <a:p>
+            <a:endParaRPr lang="en-US" dirty="0"/>
+          </a:p>
+        </p:txBody>
+      </p:sp>
+      <p:sp>
+        <p:nvSpPr>
+          <p:cNvPr id="4" name="Slide Number Placeholder 3"/>
+          <p:cNvSpPr>
+            <a:spLocks noGrp="1"/>
+          </p:cNvSpPr>
+          <p:nvPr>
+            <p:ph type="sldNum" sz="quarter" idx="10"/>
+          </p:nvPr>
+        </p:nvSpPr>
+        <p:spPr/>
+        <p:txBody>
+          <a:bodyPr/>
+          <a:lstStyle/>
+          <a:p>
+            <a:fld id="{433137AF-EBFE-664E-840A-10B3290003D1}" type="slidenum">
+              <a:rPr lang="en-US" smtClean="0"/>
+              <a:t>21</a:t>
+            </a:fld>
+            <a:endParaRPr lang="en-US"/>
+          </a:p>
+        </p:txBody>
+      </p:sp>
+    </p:spTree>
+    <p:extLst>
+      <p:ext uri="{BB962C8B-B14F-4D97-AF65-F5344CB8AC3E}">
+        <p14:creationId xmlns:p14="http://schemas.microsoft.com/office/powerpoint/2010/main" val="1972797592"/>
+      </p:ext>
+    </p:extLst>
+  </p:cSld>
+  <p:clrMapOvr>
+    <a:masterClrMapping/>
+  </p:clrMapOvr>
+</p:notes>
+</file>
+
+<file path=ppt/notesSlides/notesSlide19.xml><?xml version="1.0" encoding="utf-8"?>
+<p:notes xmlns:a="http://schemas.openxmlformats.org/drawingml/2006/main" xmlns:r="http://schemas.openxmlformats.org/officeDocument/2006/relationships" xmlns:p="http://schemas.openxmlformats.org/presentationml/2006/main">
+  <p:cSld>
+    <p:spTree>
+      <p:nvGrpSpPr>
+        <p:cNvPr id="1" name=""/>
+        <p:cNvGrpSpPr/>
+        <p:nvPr/>
+      </p:nvGrpSpPr>
+      <p:grpSpPr>
+        <a:xfrm>
+          <a:off x="0" y="0"/>
+          <a:ext cx="0" cy="0"/>
+          <a:chOff x="0" y="0"/>
+          <a:chExt cx="0" cy="0"/>
+        </a:xfrm>
+      </p:grpSpPr>
+      <p:sp>
+        <p:nvSpPr>
+          <p:cNvPr id="2" name="Slide Image Placeholder 1"/>
+          <p:cNvSpPr>
+            <a:spLocks noGrp="1" noRot="1" noChangeAspect="1"/>
+          </p:cNvSpPr>
+          <p:nvPr>
+            <p:ph type="sldImg"/>
+          </p:nvPr>
+        </p:nvSpPr>
+        <p:spPr/>
+      </p:sp>
+      <p:sp>
+        <p:nvSpPr>
+          <p:cNvPr id="3" name="Notes Placeholder 2"/>
+          <p:cNvSpPr>
+            <a:spLocks noGrp="1"/>
+          </p:cNvSpPr>
+          <p:nvPr>
+            <p:ph type="body" idx="1"/>
+          </p:nvPr>
+        </p:nvSpPr>
+        <p:spPr/>
+        <p:txBody>
+          <a:bodyPr/>
+          <a:lstStyle/>
+          <a:p>
+            <a:r>
+              <a:rPr lang="en-US" dirty="0" smtClean="0"/>
+              <a:t>http://</a:t>
+            </a:r>
+            <a:r>
+              <a:rPr lang="en-US" dirty="0" err="1" smtClean="0"/>
+              <a:t>openbd.org</a:t>
+            </a:r>
+            <a:r>
+              <a:rPr lang="en-US" dirty="0" smtClean="0"/>
+              <a:t>/manual/?/tag/category/control</a:t>
+            </a:r>
+          </a:p>
+          <a:p>
+            <a:r>
+              <a:rPr lang="en-US" dirty="0" smtClean="0"/>
+              <a:t>http://</a:t>
+            </a:r>
+            <a:r>
+              <a:rPr lang="en-US" dirty="0" err="1" smtClean="0"/>
+              <a:t>openbd.org</a:t>
+            </a:r>
+            <a:r>
+              <a:rPr lang="en-US" dirty="0" smtClean="0"/>
+              <a:t>/manual/?/tag/category/network</a:t>
+            </a:r>
+            <a:endParaRPr lang="en-US" dirty="0"/>
+          </a:p>
+        </p:txBody>
+      </p:sp>
+      <p:sp>
+        <p:nvSpPr>
+          <p:cNvPr id="4" name="Slide Number Placeholder 3"/>
+          <p:cNvSpPr>
+            <a:spLocks noGrp="1"/>
+          </p:cNvSpPr>
+          <p:nvPr>
+            <p:ph type="sldNum" sz="quarter" idx="10"/>
+          </p:nvPr>
+        </p:nvSpPr>
+        <p:spPr/>
+        <p:txBody>
+          <a:bodyPr/>
+          <a:lstStyle/>
+          <a:p>
+            <a:fld id="{433137AF-EBFE-664E-840A-10B3290003D1}" type="slidenum">
+              <a:rPr lang="en-US" smtClean="0"/>
+              <a:t>22</a:t>
+            </a:fld>
+            <a:endParaRPr lang="en-US"/>
+          </a:p>
+        </p:txBody>
+      </p:sp>
+    </p:spTree>
+    <p:extLst>
+      <p:ext uri="{BB962C8B-B14F-4D97-AF65-F5344CB8AC3E}">
+        <p14:creationId xmlns:p14="http://schemas.microsoft.com/office/powerpoint/2010/main" val="42394760"/>
+      </p:ext>
+    </p:extLst>
+  </p:cSld>
+  <p:clrMapOvr>
+    <a:masterClrMapping/>
+  </p:clrMapOvr>
+</p:notes>
+</file>
+
 <file path=ppt/notesSlides/notesSlide2.xml><?xml version="1.0" encoding="utf-8"?>
 <p:notes xmlns:a="http://schemas.openxmlformats.org/drawingml/2006/main" xmlns:r="http://schemas.openxmlformats.org/officeDocument/2006/relationships" xmlns:p="http://schemas.openxmlformats.org/presentationml/2006/main">
   <p:cSld>
@@ -655,6 +1761,436 @@
     <p:extLst>
       <p:ext uri="{BB962C8B-B14F-4D97-AF65-F5344CB8AC3E}">
         <p14:creationId xmlns:p14="http://schemas.microsoft.com/office/powerpoint/2010/main" val="1840430768"/>
+      </p:ext>
+    </p:extLst>
+  </p:cSld>
+  <p:clrMapOvr>
+    <a:masterClrMapping/>
+  </p:clrMapOvr>
+</p:notes>
+</file>
+
+<file path=ppt/notesSlides/notesSlide20.xml><?xml version="1.0" encoding="utf-8"?>
+<p:notes xmlns:a="http://schemas.openxmlformats.org/drawingml/2006/main" xmlns:r="http://schemas.openxmlformats.org/officeDocument/2006/relationships" xmlns:p="http://schemas.openxmlformats.org/presentationml/2006/main">
+  <p:cSld>
+    <p:spTree>
+      <p:nvGrpSpPr>
+        <p:cNvPr id="1" name=""/>
+        <p:cNvGrpSpPr/>
+        <p:nvPr/>
+      </p:nvGrpSpPr>
+      <p:grpSpPr>
+        <a:xfrm>
+          <a:off x="0" y="0"/>
+          <a:ext cx="0" cy="0"/>
+          <a:chOff x="0" y="0"/>
+          <a:chExt cx="0" cy="0"/>
+        </a:xfrm>
+      </p:grpSpPr>
+      <p:sp>
+        <p:nvSpPr>
+          <p:cNvPr id="2" name="Slide Image Placeholder 1"/>
+          <p:cNvSpPr>
+            <a:spLocks noGrp="1" noRot="1" noChangeAspect="1"/>
+          </p:cNvSpPr>
+          <p:nvPr>
+            <p:ph type="sldImg"/>
+          </p:nvPr>
+        </p:nvSpPr>
+        <p:spPr/>
+      </p:sp>
+      <p:sp>
+        <p:nvSpPr>
+          <p:cNvPr id="3" name="Notes Placeholder 2"/>
+          <p:cNvSpPr>
+            <a:spLocks noGrp="1"/>
+          </p:cNvSpPr>
+          <p:nvPr>
+            <p:ph type="body" idx="1"/>
+          </p:nvPr>
+        </p:nvSpPr>
+        <p:spPr/>
+        <p:txBody>
+          <a:bodyPr/>
+          <a:lstStyle/>
+          <a:p>
+            <a:r>
+              <a:rPr lang="en-US" dirty="0" smtClean="0"/>
+              <a:t>http://</a:t>
+            </a:r>
+            <a:r>
+              <a:rPr lang="en-US" dirty="0" err="1" smtClean="0"/>
+              <a:t>openbd.org</a:t>
+            </a:r>
+            <a:r>
+              <a:rPr lang="en-US" dirty="0" smtClean="0"/>
+              <a:t>/manual/?/tag/category/control</a:t>
+            </a:r>
+            <a:endParaRPr lang="en-US" dirty="0"/>
+          </a:p>
+        </p:txBody>
+      </p:sp>
+      <p:sp>
+        <p:nvSpPr>
+          <p:cNvPr id="4" name="Slide Number Placeholder 3"/>
+          <p:cNvSpPr>
+            <a:spLocks noGrp="1"/>
+          </p:cNvSpPr>
+          <p:nvPr>
+            <p:ph type="sldNum" sz="quarter" idx="10"/>
+          </p:nvPr>
+        </p:nvSpPr>
+        <p:spPr/>
+        <p:txBody>
+          <a:bodyPr/>
+          <a:lstStyle/>
+          <a:p>
+            <a:fld id="{433137AF-EBFE-664E-840A-10B3290003D1}" type="slidenum">
+              <a:rPr lang="en-US" smtClean="0"/>
+              <a:t>23</a:t>
+            </a:fld>
+            <a:endParaRPr lang="en-US"/>
+          </a:p>
+        </p:txBody>
+      </p:sp>
+    </p:spTree>
+    <p:extLst>
+      <p:ext uri="{BB962C8B-B14F-4D97-AF65-F5344CB8AC3E}">
+        <p14:creationId xmlns:p14="http://schemas.microsoft.com/office/powerpoint/2010/main" val="107169159"/>
+      </p:ext>
+    </p:extLst>
+  </p:cSld>
+  <p:clrMapOvr>
+    <a:masterClrMapping/>
+  </p:clrMapOvr>
+</p:notes>
+</file>
+
+<file path=ppt/notesSlides/notesSlide21.xml><?xml version="1.0" encoding="utf-8"?>
+<p:notes xmlns:a="http://schemas.openxmlformats.org/drawingml/2006/main" xmlns:r="http://schemas.openxmlformats.org/officeDocument/2006/relationships" xmlns:p="http://schemas.openxmlformats.org/presentationml/2006/main">
+  <p:cSld>
+    <p:spTree>
+      <p:nvGrpSpPr>
+        <p:cNvPr id="1" name=""/>
+        <p:cNvGrpSpPr/>
+        <p:nvPr/>
+      </p:nvGrpSpPr>
+      <p:grpSpPr>
+        <a:xfrm>
+          <a:off x="0" y="0"/>
+          <a:ext cx="0" cy="0"/>
+          <a:chOff x="0" y="0"/>
+          <a:chExt cx="0" cy="0"/>
+        </a:xfrm>
+      </p:grpSpPr>
+      <p:sp>
+        <p:nvSpPr>
+          <p:cNvPr id="2" name="Slide Image Placeholder 1"/>
+          <p:cNvSpPr>
+            <a:spLocks noGrp="1" noRot="1" noChangeAspect="1"/>
+          </p:cNvSpPr>
+          <p:nvPr>
+            <p:ph type="sldImg"/>
+          </p:nvPr>
+        </p:nvSpPr>
+        <p:spPr/>
+      </p:sp>
+      <p:sp>
+        <p:nvSpPr>
+          <p:cNvPr id="3" name="Notes Placeholder 2"/>
+          <p:cNvSpPr>
+            <a:spLocks noGrp="1"/>
+          </p:cNvSpPr>
+          <p:nvPr>
+            <p:ph type="body" idx="1"/>
+          </p:nvPr>
+        </p:nvSpPr>
+        <p:spPr/>
+        <p:txBody>
+          <a:bodyPr/>
+          <a:lstStyle/>
+          <a:p>
+            <a:r>
+              <a:rPr lang="en-US" dirty="0" smtClean="0"/>
+              <a:t>http://</a:t>
+            </a:r>
+            <a:r>
+              <a:rPr lang="en-US" dirty="0" err="1" smtClean="0"/>
+              <a:t>openbd.org</a:t>
+            </a:r>
+            <a:r>
+              <a:rPr lang="en-US" dirty="0" smtClean="0"/>
+              <a:t>/manual/?/tag/category/database</a:t>
+            </a:r>
+          </a:p>
+          <a:p>
+            <a:r>
+              <a:rPr lang="en-US" dirty="0" smtClean="0"/>
+              <a:t>http://</a:t>
+            </a:r>
+            <a:r>
+              <a:rPr lang="en-US" dirty="0" err="1" smtClean="0"/>
+              <a:t>openbd.org</a:t>
+            </a:r>
+            <a:r>
+              <a:rPr lang="en-US" dirty="0" smtClean="0"/>
+              <a:t>/manual/?/tag/category/file</a:t>
+            </a:r>
+          </a:p>
+          <a:p>
+            <a:r>
+              <a:rPr lang="en-US" dirty="0" smtClean="0"/>
+              <a:t>http://</a:t>
+            </a:r>
+            <a:r>
+              <a:rPr lang="en-US" dirty="0" err="1" smtClean="0"/>
+              <a:t>openbd.org</a:t>
+            </a:r>
+            <a:r>
+              <a:rPr lang="en-US" dirty="0" smtClean="0"/>
+              <a:t>/manual/?/tag/category/remote</a:t>
+            </a:r>
+            <a:endParaRPr lang="en-US" dirty="0"/>
+          </a:p>
+        </p:txBody>
+      </p:sp>
+      <p:sp>
+        <p:nvSpPr>
+          <p:cNvPr id="4" name="Slide Number Placeholder 3"/>
+          <p:cNvSpPr>
+            <a:spLocks noGrp="1"/>
+          </p:cNvSpPr>
+          <p:nvPr>
+            <p:ph type="sldNum" sz="quarter" idx="10"/>
+          </p:nvPr>
+        </p:nvSpPr>
+        <p:spPr/>
+        <p:txBody>
+          <a:bodyPr/>
+          <a:lstStyle/>
+          <a:p>
+            <a:fld id="{433137AF-EBFE-664E-840A-10B3290003D1}" type="slidenum">
+              <a:rPr lang="en-US" smtClean="0"/>
+              <a:t>24</a:t>
+            </a:fld>
+            <a:endParaRPr lang="en-US"/>
+          </a:p>
+        </p:txBody>
+      </p:sp>
+    </p:spTree>
+    <p:extLst>
+      <p:ext uri="{BB962C8B-B14F-4D97-AF65-F5344CB8AC3E}">
+        <p14:creationId xmlns:p14="http://schemas.microsoft.com/office/powerpoint/2010/main" val="3064070676"/>
+      </p:ext>
+    </p:extLst>
+  </p:cSld>
+  <p:clrMapOvr>
+    <a:masterClrMapping/>
+  </p:clrMapOvr>
+</p:notes>
+</file>
+
+<file path=ppt/notesSlides/notesSlide22.xml><?xml version="1.0" encoding="utf-8"?>
+<p:notes xmlns:a="http://schemas.openxmlformats.org/drawingml/2006/main" xmlns:r="http://schemas.openxmlformats.org/officeDocument/2006/relationships" xmlns:p="http://schemas.openxmlformats.org/presentationml/2006/main">
+  <p:cSld>
+    <p:spTree>
+      <p:nvGrpSpPr>
+        <p:cNvPr id="1" name=""/>
+        <p:cNvGrpSpPr/>
+        <p:nvPr/>
+      </p:nvGrpSpPr>
+      <p:grpSpPr>
+        <a:xfrm>
+          <a:off x="0" y="0"/>
+          <a:ext cx="0" cy="0"/>
+          <a:chOff x="0" y="0"/>
+          <a:chExt cx="0" cy="0"/>
+        </a:xfrm>
+      </p:grpSpPr>
+      <p:sp>
+        <p:nvSpPr>
+          <p:cNvPr id="2" name="Slide Image Placeholder 1"/>
+          <p:cNvSpPr>
+            <a:spLocks noGrp="1" noRot="1" noChangeAspect="1"/>
+          </p:cNvSpPr>
+          <p:nvPr>
+            <p:ph type="sldImg"/>
+          </p:nvPr>
+        </p:nvSpPr>
+        <p:spPr/>
+      </p:sp>
+      <p:sp>
+        <p:nvSpPr>
+          <p:cNvPr id="3" name="Notes Placeholder 2"/>
+          <p:cNvSpPr>
+            <a:spLocks noGrp="1"/>
+          </p:cNvSpPr>
+          <p:nvPr>
+            <p:ph type="body" idx="1"/>
+          </p:nvPr>
+        </p:nvSpPr>
+        <p:spPr/>
+        <p:txBody>
+          <a:bodyPr/>
+          <a:lstStyle/>
+          <a:p>
+            <a:r>
+              <a:rPr lang="en-US" dirty="0" smtClean="0"/>
+              <a:t>http://</a:t>
+            </a:r>
+            <a:r>
+              <a:rPr lang="en-US" dirty="0" err="1" smtClean="0"/>
+              <a:t>openbd.org</a:t>
+            </a:r>
+            <a:r>
+              <a:rPr lang="en-US" dirty="0" smtClean="0"/>
+              <a:t>/manual/?/tag/category/remote</a:t>
+            </a:r>
+          </a:p>
+          <a:p>
+            <a:r>
+              <a:rPr lang="en-US" dirty="0" smtClean="0"/>
+              <a:t>http://</a:t>
+            </a:r>
+            <a:r>
+              <a:rPr lang="en-US" dirty="0" err="1" smtClean="0"/>
+              <a:t>openbd.org</a:t>
+            </a:r>
+            <a:r>
+              <a:rPr lang="en-US" dirty="0" smtClean="0"/>
+              <a:t>/manual/?/tag/category/unknown</a:t>
+            </a:r>
+            <a:endParaRPr lang="en-US" dirty="0"/>
+          </a:p>
+        </p:txBody>
+      </p:sp>
+      <p:sp>
+        <p:nvSpPr>
+          <p:cNvPr id="4" name="Slide Number Placeholder 3"/>
+          <p:cNvSpPr>
+            <a:spLocks noGrp="1"/>
+          </p:cNvSpPr>
+          <p:nvPr>
+            <p:ph type="sldNum" sz="quarter" idx="10"/>
+          </p:nvPr>
+        </p:nvSpPr>
+        <p:spPr/>
+        <p:txBody>
+          <a:bodyPr/>
+          <a:lstStyle/>
+          <a:p>
+            <a:fld id="{433137AF-EBFE-664E-840A-10B3290003D1}" type="slidenum">
+              <a:rPr lang="en-US" smtClean="0"/>
+              <a:t>25</a:t>
+            </a:fld>
+            <a:endParaRPr lang="en-US"/>
+          </a:p>
+        </p:txBody>
+      </p:sp>
+    </p:spTree>
+    <p:extLst>
+      <p:ext uri="{BB962C8B-B14F-4D97-AF65-F5344CB8AC3E}">
+        <p14:creationId xmlns:p14="http://schemas.microsoft.com/office/powerpoint/2010/main" val="747617567"/>
+      </p:ext>
+    </p:extLst>
+  </p:cSld>
+  <p:clrMapOvr>
+    <a:masterClrMapping/>
+  </p:clrMapOvr>
+</p:notes>
+</file>
+
+<file path=ppt/notesSlides/notesSlide23.xml><?xml version="1.0" encoding="utf-8"?>
+<p:notes xmlns:a="http://schemas.openxmlformats.org/drawingml/2006/main" xmlns:r="http://schemas.openxmlformats.org/officeDocument/2006/relationships" xmlns:p="http://schemas.openxmlformats.org/presentationml/2006/main">
+  <p:cSld>
+    <p:spTree>
+      <p:nvGrpSpPr>
+        <p:cNvPr id="1" name=""/>
+        <p:cNvGrpSpPr/>
+        <p:nvPr/>
+      </p:nvGrpSpPr>
+      <p:grpSpPr>
+        <a:xfrm>
+          <a:off x="0" y="0"/>
+          <a:ext cx="0" cy="0"/>
+          <a:chOff x="0" y="0"/>
+          <a:chExt cx="0" cy="0"/>
+        </a:xfrm>
+      </p:grpSpPr>
+      <p:sp>
+        <p:nvSpPr>
+          <p:cNvPr id="2" name="Slide Image Placeholder 1"/>
+          <p:cNvSpPr>
+            <a:spLocks noGrp="1" noRot="1" noChangeAspect="1"/>
+          </p:cNvSpPr>
+          <p:nvPr>
+            <p:ph type="sldImg"/>
+          </p:nvPr>
+        </p:nvSpPr>
+        <p:spPr/>
+      </p:sp>
+      <p:sp>
+        <p:nvSpPr>
+          <p:cNvPr id="3" name="Notes Placeholder 2"/>
+          <p:cNvSpPr>
+            <a:spLocks noGrp="1"/>
+          </p:cNvSpPr>
+          <p:nvPr>
+            <p:ph type="body" idx="1"/>
+          </p:nvPr>
+        </p:nvSpPr>
+        <p:spPr/>
+        <p:txBody>
+          <a:bodyPr/>
+          <a:lstStyle/>
+          <a:p>
+            <a:r>
+              <a:rPr lang="en-US" dirty="0" smtClean="0"/>
+              <a:t>http://</a:t>
+            </a:r>
+            <a:r>
+              <a:rPr lang="en-US" dirty="0" err="1" smtClean="0"/>
+              <a:t>openbd.org</a:t>
+            </a:r>
+            <a:r>
+              <a:rPr lang="en-US" dirty="0" smtClean="0"/>
+              <a:t>/manual/?/</a:t>
+            </a:r>
+            <a:r>
+              <a:rPr lang="en-US" dirty="0" err="1" smtClean="0"/>
+              <a:t>cfc_introduction</a:t>
+            </a:r>
+            <a:endParaRPr lang="en-US" dirty="0"/>
+          </a:p>
+        </p:txBody>
+      </p:sp>
+      <p:sp>
+        <p:nvSpPr>
+          <p:cNvPr id="4" name="Slide Number Placeholder 3"/>
+          <p:cNvSpPr>
+            <a:spLocks noGrp="1"/>
+          </p:cNvSpPr>
+          <p:nvPr>
+            <p:ph type="sldNum" sz="quarter" idx="10"/>
+          </p:nvPr>
+        </p:nvSpPr>
+        <p:spPr/>
+        <p:txBody>
+          <a:bodyPr/>
+          <a:lstStyle/>
+          <a:p>
+            <a:fld id="{433137AF-EBFE-664E-840A-10B3290003D1}" type="slidenum">
+              <a:rPr lang="en-US" smtClean="0"/>
+              <a:t>27</a:t>
+            </a:fld>
+            <a:endParaRPr lang="en-US"/>
+          </a:p>
+        </p:txBody>
+      </p:sp>
+    </p:spTree>
+    <p:extLst>
+      <p:ext uri="{BB962C8B-B14F-4D97-AF65-F5344CB8AC3E}">
+        <p14:creationId xmlns:p14="http://schemas.microsoft.com/office/powerpoint/2010/main" val="882511047"/>
       </p:ext>
     </p:extLst>
   </p:cSld>
@@ -1582,6 +3118,94 @@
     <p:extLst>
       <p:ext uri="{BB962C8B-B14F-4D97-AF65-F5344CB8AC3E}">
         <p14:creationId xmlns:p14="http://schemas.microsoft.com/office/powerpoint/2010/main" val="598371091"/>
+      </p:ext>
+    </p:extLst>
+  </p:cSld>
+  <p:clrMapOvr>
+    <a:masterClrMapping/>
+  </p:clrMapOvr>
+</p:notes>
+</file>
+
+<file path=ppt/notesSlides/notesSlide9.xml><?xml version="1.0" encoding="utf-8"?>
+<p:notes xmlns:a="http://schemas.openxmlformats.org/drawingml/2006/main" xmlns:r="http://schemas.openxmlformats.org/officeDocument/2006/relationships" xmlns:p="http://schemas.openxmlformats.org/presentationml/2006/main">
+  <p:cSld>
+    <p:spTree>
+      <p:nvGrpSpPr>
+        <p:cNvPr id="1" name=""/>
+        <p:cNvGrpSpPr/>
+        <p:nvPr/>
+      </p:nvGrpSpPr>
+      <p:grpSpPr>
+        <a:xfrm>
+          <a:off x="0" y="0"/>
+          <a:ext cx="0" cy="0"/>
+          <a:chOff x="0" y="0"/>
+          <a:chExt cx="0" cy="0"/>
+        </a:xfrm>
+      </p:grpSpPr>
+      <p:sp>
+        <p:nvSpPr>
+          <p:cNvPr id="2" name="Slide Image Placeholder 1"/>
+          <p:cNvSpPr>
+            <a:spLocks noGrp="1" noRot="1" noChangeAspect="1"/>
+          </p:cNvSpPr>
+          <p:nvPr>
+            <p:ph type="sldImg"/>
+          </p:nvPr>
+        </p:nvSpPr>
+        <p:spPr/>
+      </p:sp>
+      <p:sp>
+        <p:nvSpPr>
+          <p:cNvPr id="3" name="Notes Placeholder 2"/>
+          <p:cNvSpPr>
+            <a:spLocks noGrp="1"/>
+          </p:cNvSpPr>
+          <p:nvPr>
+            <p:ph type="body" idx="1"/>
+          </p:nvPr>
+        </p:nvSpPr>
+        <p:spPr/>
+        <p:txBody>
+          <a:bodyPr/>
+          <a:lstStyle/>
+          <a:p>
+            <a:r>
+              <a:rPr lang="en-US" dirty="0" smtClean="0"/>
+              <a:t>Create a new guestbook website</a:t>
+            </a:r>
+            <a:endParaRPr lang="en-US" dirty="0"/>
+          </a:p>
+        </p:txBody>
+      </p:sp>
+      <p:sp>
+        <p:nvSpPr>
+          <p:cNvPr id="4" name="Slide Number Placeholder 3"/>
+          <p:cNvSpPr>
+            <a:spLocks noGrp="1"/>
+          </p:cNvSpPr>
+          <p:nvPr>
+            <p:ph type="sldNum" sz="quarter" idx="10"/>
+          </p:nvPr>
+        </p:nvSpPr>
+        <p:spPr/>
+        <p:txBody>
+          <a:bodyPr/>
+          <a:lstStyle/>
+          <a:p>
+            <a:fld id="{433137AF-EBFE-664E-840A-10B3290003D1}" type="slidenum">
+              <a:rPr lang="en-US" smtClean="0"/>
+              <a:t>12</a:t>
+            </a:fld>
+            <a:endParaRPr lang="en-US"/>
+          </a:p>
+        </p:txBody>
+      </p:sp>
+    </p:spTree>
+    <p:extLst>
+      <p:ext uri="{BB962C8B-B14F-4D97-AF65-F5344CB8AC3E}">
+        <p14:creationId xmlns:p14="http://schemas.microsoft.com/office/powerpoint/2010/main" val="4066927578"/>
       </p:ext>
     </p:extLst>
   </p:cSld>
@@ -1875,7 +3499,7 @@
             <a:fld id="{8ACDB3CC-F982-40F9-8DD6-BCC9AFBF44BD}" type="datetime1">
               <a:rPr lang="en-US" smtClean="0"/>
               <a:pPr/>
-              <a:t>10/30/11</a:t>
+              <a:t>11/1/11</a:t>
             </a:fld>
             <a:endParaRPr lang="en-US" dirty="0"/>
           </a:p>
@@ -2068,7 +3692,7 @@
           <a:p>
             <a:fld id="{8604C85F-9729-E84D-AABC-8B386584B07D}" type="datetimeFigureOut">
               <a:rPr lang="en-US" smtClean="0"/>
-              <a:t>10/30/11</a:t>
+              <a:t>11/1/11</a:t>
             </a:fld>
             <a:endParaRPr lang="en-US"/>
           </a:p>
@@ -2337,7 +3961,7 @@
           <a:p>
             <a:fld id="{8604C85F-9729-E84D-AABC-8B386584B07D}" type="datetimeFigureOut">
               <a:rPr lang="en-US" smtClean="0"/>
-              <a:t>10/30/11</a:t>
+              <a:t>11/1/11</a:t>
             </a:fld>
             <a:endParaRPr lang="en-US"/>
           </a:p>
@@ -2516,7 +4140,7 @@
           <a:p>
             <a:fld id="{8604C85F-9729-E84D-AABC-8B386584B07D}" type="datetimeFigureOut">
               <a:rPr lang="en-US" smtClean="0"/>
-              <a:t>10/30/11</a:t>
+              <a:t>11/1/11</a:t>
             </a:fld>
             <a:endParaRPr lang="en-US"/>
           </a:p>
@@ -2685,7 +4309,7 @@
           <a:p>
             <a:fld id="{8604C85F-9729-E84D-AABC-8B386584B07D}" type="datetimeFigureOut">
               <a:rPr lang="en-US" smtClean="0"/>
-              <a:t>10/30/11</a:t>
+              <a:t>11/1/11</a:t>
             </a:fld>
             <a:endParaRPr lang="en-US"/>
           </a:p>
@@ -2927,7 +4551,7 @@
           <a:p>
             <a:fld id="{8604C85F-9729-E84D-AABC-8B386584B07D}" type="datetimeFigureOut">
               <a:rPr lang="en-US" smtClean="0"/>
-              <a:t>10/30/11</a:t>
+              <a:t>11/1/11</a:t>
             </a:fld>
             <a:endParaRPr lang="en-US"/>
           </a:p>
@@ -3251,7 +4875,7 @@
             <a:fld id="{64DDAE5B-B07C-441A-8026-C23A427A74DC}" type="datetime1">
               <a:rPr lang="en-US" smtClean="0"/>
               <a:pPr/>
-              <a:t>10/30/11</a:t>
+              <a:t>11/1/11</a:t>
             </a:fld>
             <a:endParaRPr lang="en-US"/>
           </a:p>
@@ -3550,7 +5174,7 @@
           <a:p>
             <a:fld id="{8604C85F-9729-E84D-AABC-8B386584B07D}" type="datetimeFigureOut">
               <a:rPr lang="en-US" smtClean="0"/>
-              <a:t>10/30/11</a:t>
+              <a:t>11/1/11</a:t>
             </a:fld>
             <a:endParaRPr lang="en-US"/>
           </a:p>
@@ -4006,7 +5630,7 @@
           <a:p>
             <a:fld id="{8604C85F-9729-E84D-AABC-8B386584B07D}" type="datetimeFigureOut">
               <a:rPr lang="en-US" smtClean="0"/>
-              <a:t>10/30/11</a:t>
+              <a:t>11/1/11</a:t>
             </a:fld>
             <a:endParaRPr lang="en-US"/>
           </a:p>
@@ -4119,7 +5743,7 @@
           <a:p>
             <a:fld id="{8604C85F-9729-E84D-AABC-8B386584B07D}" type="datetimeFigureOut">
               <a:rPr lang="en-US" smtClean="0"/>
-              <a:t>10/30/11</a:t>
+              <a:t>11/1/11</a:t>
             </a:fld>
             <a:endParaRPr lang="en-US"/>
           </a:p>
@@ -4209,7 +5833,7 @@
           <a:p>
             <a:fld id="{8604C85F-9729-E84D-AABC-8B386584B07D}" type="datetimeFigureOut">
               <a:rPr lang="en-US" smtClean="0"/>
-              <a:t>10/30/11</a:t>
+              <a:t>11/1/11</a:t>
             </a:fld>
             <a:endParaRPr lang="en-US"/>
           </a:p>
@@ -4491,7 +6115,7 @@
           <a:p>
             <a:fld id="{8604C85F-9729-E84D-AABC-8B386584B07D}" type="datetimeFigureOut">
               <a:rPr lang="en-US" smtClean="0"/>
-              <a:t>10/30/11</a:t>
+              <a:t>11/1/11</a:t>
             </a:fld>
             <a:endParaRPr lang="en-US"/>
           </a:p>
@@ -4698,7 +6322,7 @@
           <a:p>
             <a:fld id="{8604C85F-9729-E84D-AABC-8B386584B07D}" type="datetimeFigureOut">
               <a:rPr lang="en-US" smtClean="0"/>
-              <a:t>10/30/11</a:t>
+              <a:t>11/1/11</a:t>
             </a:fld>
             <a:endParaRPr lang="en-US"/>
           </a:p>
@@ -5205,14 +6829,1826 @@
   <p:clrMapOvr>
     <a:masterClrMapping/>
   </p:clrMapOvr>
-  <mc:AlternateContent xmlns:mc="http://schemas.openxmlformats.org/markup-compatibility/2006">
-    <mc:Choice xmlns:p14="http://schemas.microsoft.com/office/powerpoint/2010/main" Requires="p14">
+  <mc:AlternateContent xmlns:mc="http://schemas.openxmlformats.org/markup-compatibility/2006" xmlns:p14="http://schemas.microsoft.com/office/powerpoint/2010/main">
+    <mc:Choice Requires="p14">
       <p:transition spd="slow" p14:dur="2000"/>
     </mc:Choice>
-    <mc:Fallback>
+    <mc:Fallback xmlns="">
       <p:transition xmlns:p14="http://schemas.microsoft.com/office/powerpoint/2010/main" spd="slow"/>
     </mc:Fallback>
   </mc:AlternateContent>
+</p:sld>
+</file>
+
+<file path=ppt/slides/slide10.xml><?xml version="1.0" encoding="utf-8"?>
+<p:sld xmlns:a="http://schemas.openxmlformats.org/drawingml/2006/main" xmlns:r="http://schemas.openxmlformats.org/officeDocument/2006/relationships" xmlns:p="http://schemas.openxmlformats.org/presentationml/2006/main">
+  <p:cSld>
+    <p:spTree>
+      <p:nvGrpSpPr>
+        <p:cNvPr id="1" name=""/>
+        <p:cNvGrpSpPr/>
+        <p:nvPr/>
+      </p:nvGrpSpPr>
+      <p:grpSpPr>
+        <a:xfrm>
+          <a:off x="0" y="0"/>
+          <a:ext cx="0" cy="0"/>
+          <a:chOff x="0" y="0"/>
+          <a:chExt cx="0" cy="0"/>
+        </a:xfrm>
+      </p:grpSpPr>
+      <p:sp>
+        <p:nvSpPr>
+          <p:cNvPr id="2" name="Title 1"/>
+          <p:cNvSpPr>
+            <a:spLocks noGrp="1"/>
+          </p:cNvSpPr>
+          <p:nvPr>
+            <p:ph type="title"/>
+          </p:nvPr>
+        </p:nvSpPr>
+        <p:spPr/>
+        <p:txBody>
+          <a:bodyPr/>
+          <a:lstStyle/>
+          <a:p>
+            <a:r>
+              <a:rPr lang="en-US" dirty="0" smtClean="0"/>
+              <a:t>Install </a:t>
+            </a:r>
+            <a:r>
+              <a:rPr lang="en-US" dirty="0" err="1" smtClean="0"/>
+              <a:t>OpenBD</a:t>
+            </a:r>
+            <a:r>
+              <a:rPr lang="en-US" dirty="0" smtClean="0"/>
+              <a:t> Desktop</a:t>
+            </a:r>
+            <a:endParaRPr lang="en-US" dirty="0"/>
+          </a:p>
+        </p:txBody>
+      </p:sp>
+      <p:sp>
+        <p:nvSpPr>
+          <p:cNvPr id="3" name="Content Placeholder 2"/>
+          <p:cNvSpPr>
+            <a:spLocks noGrp="1"/>
+          </p:cNvSpPr>
+          <p:nvPr>
+            <p:ph idx="1"/>
+          </p:nvPr>
+        </p:nvSpPr>
+        <p:spPr/>
+        <p:txBody>
+          <a:bodyPr>
+            <a:normAutofit lnSpcReduction="10000"/>
+          </a:bodyPr>
+          <a:lstStyle/>
+          <a:p>
+            <a:r>
+              <a:rPr lang="en-US" dirty="0" smtClean="0"/>
+              <a:t>Go to </a:t>
+            </a:r>
+            <a:r>
+              <a:rPr lang="en-US" dirty="0" err="1" smtClean="0"/>
+              <a:t>openbd.org</a:t>
+            </a:r>
+            <a:endParaRPr lang="en-US" dirty="0" smtClean="0"/>
+          </a:p>
+          <a:p>
+            <a:r>
+              <a:rPr lang="en-US" dirty="0" smtClean="0"/>
+              <a:t>Click on Download</a:t>
+            </a:r>
+          </a:p>
+          <a:p>
+            <a:r>
+              <a:rPr lang="en-US" dirty="0" smtClean="0"/>
+              <a:t>Click </a:t>
+            </a:r>
+            <a:r>
+              <a:rPr lang="en-US" dirty="0" err="1" smtClean="0"/>
+              <a:t>OpenBD</a:t>
+            </a:r>
+            <a:r>
+              <a:rPr lang="en-US" dirty="0" smtClean="0"/>
+              <a:t> Desktop</a:t>
+            </a:r>
+          </a:p>
+          <a:p>
+            <a:r>
+              <a:rPr lang="en-US" dirty="0" smtClean="0"/>
+              <a:t>Click Download</a:t>
+            </a:r>
+          </a:p>
+          <a:p>
+            <a:r>
+              <a:rPr lang="en-US" dirty="0" smtClean="0"/>
+              <a:t>Unzip</a:t>
+            </a:r>
+          </a:p>
+          <a:p>
+            <a:r>
+              <a:rPr lang="en-US" dirty="0" smtClean="0"/>
+              <a:t>Execute the .exe or .</a:t>
+            </a:r>
+            <a:r>
+              <a:rPr lang="en-US" dirty="0" err="1" smtClean="0"/>
+              <a:t>sh</a:t>
+            </a:r>
+            <a:endParaRPr lang="en-US" dirty="0" smtClean="0"/>
+          </a:p>
+          <a:p>
+            <a:pPr lvl="1"/>
+            <a:r>
+              <a:rPr lang="en-US" dirty="0" smtClean="0"/>
+              <a:t>.</a:t>
+            </a:r>
+            <a:r>
+              <a:rPr lang="en-US" dirty="0" err="1" smtClean="0"/>
+              <a:t>sh</a:t>
+            </a:r>
+            <a:r>
+              <a:rPr lang="en-US" dirty="0" smtClean="0"/>
+              <a:t> might need to get </a:t>
+            </a:r>
+            <a:r>
+              <a:rPr lang="en-US" dirty="0" err="1" smtClean="0"/>
+              <a:t>chmod</a:t>
+            </a:r>
+            <a:r>
+              <a:rPr lang="en-US" dirty="0" smtClean="0"/>
+              <a:t> +x</a:t>
+            </a:r>
+          </a:p>
+          <a:p>
+            <a:pPr lvl="1"/>
+            <a:r>
+              <a:rPr lang="en-US" dirty="0" smtClean="0"/>
+              <a:t>Execute .</a:t>
+            </a:r>
+            <a:r>
+              <a:rPr lang="en-US" dirty="0" err="1" smtClean="0"/>
+              <a:t>sh</a:t>
+            </a:r>
+            <a:r>
+              <a:rPr lang="en-US" dirty="0" smtClean="0"/>
+              <a:t> as `</a:t>
+            </a:r>
+            <a:r>
+              <a:rPr lang="en-US" dirty="0" err="1" smtClean="0"/>
+              <a:t>sudo</a:t>
+            </a:r>
+            <a:r>
+              <a:rPr lang="en-US" dirty="0" smtClean="0"/>
+              <a:t> </a:t>
+            </a:r>
+            <a:r>
+              <a:rPr lang="en-US" dirty="0" err="1" smtClean="0"/>
+              <a:t>sh</a:t>
+            </a:r>
+            <a:r>
+              <a:rPr lang="en-US" dirty="0" smtClean="0"/>
+              <a:t> </a:t>
+            </a:r>
+            <a:r>
+              <a:rPr lang="en-US" dirty="0" err="1" smtClean="0"/>
+              <a:t>OpenBlueDragonDesktop.sh</a:t>
+            </a:r>
+            <a:r>
+              <a:rPr lang="en-US" dirty="0" smtClean="0"/>
+              <a:t>`</a:t>
+            </a:r>
+            <a:endParaRPr lang="en-US" dirty="0"/>
+          </a:p>
+        </p:txBody>
+      </p:sp>
+    </p:spTree>
+    <p:extLst>
+      <p:ext uri="{BB962C8B-B14F-4D97-AF65-F5344CB8AC3E}">
+        <p14:creationId xmlns:p14="http://schemas.microsoft.com/office/powerpoint/2010/main" val="507268359"/>
+      </p:ext>
+    </p:extLst>
+  </p:cSld>
+  <p:clrMapOvr>
+    <a:masterClrMapping/>
+  </p:clrMapOvr>
+</p:sld>
+</file>
+
+<file path=ppt/slides/slide11.xml><?xml version="1.0" encoding="utf-8"?>
+<p:sld xmlns:a="http://schemas.openxmlformats.org/drawingml/2006/main" xmlns:r="http://schemas.openxmlformats.org/officeDocument/2006/relationships" xmlns:p="http://schemas.openxmlformats.org/presentationml/2006/main">
+  <p:cSld>
+    <p:spTree>
+      <p:nvGrpSpPr>
+        <p:cNvPr id="1" name=""/>
+        <p:cNvGrpSpPr/>
+        <p:nvPr/>
+      </p:nvGrpSpPr>
+      <p:grpSpPr>
+        <a:xfrm>
+          <a:off x="0" y="0"/>
+          <a:ext cx="0" cy="0"/>
+          <a:chOff x="0" y="0"/>
+          <a:chExt cx="0" cy="0"/>
+        </a:xfrm>
+      </p:grpSpPr>
+      <p:sp>
+        <p:nvSpPr>
+          <p:cNvPr id="2" name="Title 1"/>
+          <p:cNvSpPr>
+            <a:spLocks noGrp="1"/>
+          </p:cNvSpPr>
+          <p:nvPr>
+            <p:ph type="title"/>
+          </p:nvPr>
+        </p:nvSpPr>
+        <p:spPr/>
+        <p:txBody>
+          <a:bodyPr/>
+          <a:lstStyle/>
+          <a:p>
+            <a:r>
+              <a:rPr lang="en-US" dirty="0" smtClean="0"/>
+              <a:t>Run </a:t>
+            </a:r>
+            <a:r>
+              <a:rPr lang="en-US" dirty="0" err="1" smtClean="0"/>
+              <a:t>OpenBD</a:t>
+            </a:r>
+            <a:r>
+              <a:rPr lang="en-US" dirty="0" smtClean="0"/>
+              <a:t> Desktop</a:t>
+            </a:r>
+            <a:endParaRPr lang="en-US" dirty="0"/>
+          </a:p>
+        </p:txBody>
+      </p:sp>
+      <p:sp>
+        <p:nvSpPr>
+          <p:cNvPr id="3" name="Content Placeholder 2"/>
+          <p:cNvSpPr>
+            <a:spLocks noGrp="1"/>
+          </p:cNvSpPr>
+          <p:nvPr>
+            <p:ph idx="1"/>
+          </p:nvPr>
+        </p:nvSpPr>
+        <p:spPr/>
+        <p:txBody>
+          <a:bodyPr/>
+          <a:lstStyle/>
+          <a:p>
+            <a:r>
+              <a:rPr lang="en-US" dirty="0" smtClean="0"/>
+              <a:t>Web App</a:t>
+            </a:r>
+          </a:p>
+          <a:p>
+            <a:pPr lvl="1"/>
+            <a:r>
+              <a:rPr lang="en-US" dirty="0" smtClean="0"/>
+              <a:t>Choose Web App Folder (will add necessary files)</a:t>
+            </a:r>
+          </a:p>
+          <a:p>
+            <a:pPr lvl="1"/>
+            <a:r>
+              <a:rPr lang="en-US" dirty="0" smtClean="0"/>
+              <a:t>Web Port</a:t>
+            </a:r>
+          </a:p>
+          <a:p>
+            <a:pPr lvl="1"/>
+            <a:r>
+              <a:rPr lang="en-US" dirty="0" smtClean="0"/>
+              <a:t>Extensions to execute through </a:t>
+            </a:r>
+            <a:r>
+              <a:rPr lang="en-US" dirty="0" err="1" smtClean="0"/>
+              <a:t>OpenBD</a:t>
+            </a:r>
+            <a:endParaRPr lang="en-US" dirty="0" smtClean="0"/>
+          </a:p>
+          <a:p>
+            <a:pPr lvl="1"/>
+            <a:r>
+              <a:rPr lang="en-US" dirty="0" smtClean="0"/>
+              <a:t>Options: check Manual and Admin Console</a:t>
+            </a:r>
+          </a:p>
+          <a:p>
+            <a:pPr lvl="1"/>
+            <a:r>
+              <a:rPr lang="en-US" dirty="0" smtClean="0"/>
+              <a:t>Standard Engine</a:t>
+            </a:r>
+          </a:p>
+          <a:p>
+            <a:r>
+              <a:rPr lang="en-US" dirty="0" smtClean="0"/>
+              <a:t>Click Start </a:t>
+            </a:r>
+            <a:r>
+              <a:rPr lang="en-US" dirty="0" err="1" smtClean="0"/>
+              <a:t>OpenBD</a:t>
+            </a:r>
+            <a:endParaRPr lang="en-US" dirty="0"/>
+          </a:p>
+        </p:txBody>
+      </p:sp>
+    </p:spTree>
+    <p:extLst>
+      <p:ext uri="{BB962C8B-B14F-4D97-AF65-F5344CB8AC3E}">
+        <p14:creationId xmlns:p14="http://schemas.microsoft.com/office/powerpoint/2010/main" val="1145352571"/>
+      </p:ext>
+    </p:extLst>
+  </p:cSld>
+  <p:clrMapOvr>
+    <a:masterClrMapping/>
+  </p:clrMapOvr>
+</p:sld>
+</file>
+
+<file path=ppt/slides/slide12.xml><?xml version="1.0" encoding="utf-8"?>
+<p:sld xmlns:a="http://schemas.openxmlformats.org/drawingml/2006/main" xmlns:r="http://schemas.openxmlformats.org/officeDocument/2006/relationships" xmlns:p="http://schemas.openxmlformats.org/presentationml/2006/main">
+  <p:cSld>
+    <p:spTree>
+      <p:nvGrpSpPr>
+        <p:cNvPr id="1" name=""/>
+        <p:cNvGrpSpPr/>
+        <p:nvPr/>
+      </p:nvGrpSpPr>
+      <p:grpSpPr>
+        <a:xfrm>
+          <a:off x="0" y="0"/>
+          <a:ext cx="0" cy="0"/>
+          <a:chOff x="0" y="0"/>
+          <a:chExt cx="0" cy="0"/>
+        </a:xfrm>
+      </p:grpSpPr>
+      <p:sp>
+        <p:nvSpPr>
+          <p:cNvPr id="4" name="Title 3"/>
+          <p:cNvSpPr>
+            <a:spLocks noGrp="1"/>
+          </p:cNvSpPr>
+          <p:nvPr>
+            <p:ph type="ctrTitle"/>
+          </p:nvPr>
+        </p:nvSpPr>
+        <p:spPr/>
+        <p:txBody>
+          <a:bodyPr/>
+          <a:lstStyle/>
+          <a:p>
+            <a:r>
+              <a:rPr lang="en-US" dirty="0" smtClean="0"/>
+              <a:t>Demo 01</a:t>
+            </a:r>
+            <a:endParaRPr lang="en-US" dirty="0"/>
+          </a:p>
+        </p:txBody>
+      </p:sp>
+      <p:sp>
+        <p:nvSpPr>
+          <p:cNvPr id="5" name="Subtitle 4"/>
+          <p:cNvSpPr>
+            <a:spLocks noGrp="1"/>
+          </p:cNvSpPr>
+          <p:nvPr>
+            <p:ph type="subTitle" idx="1"/>
+          </p:nvPr>
+        </p:nvSpPr>
+        <p:spPr/>
+        <p:txBody>
+          <a:bodyPr/>
+          <a:lstStyle/>
+          <a:p>
+            <a:endParaRPr lang="en-US"/>
+          </a:p>
+        </p:txBody>
+      </p:sp>
+      <p:sp>
+        <p:nvSpPr>
+          <p:cNvPr id="6" name="Picture Placeholder 5"/>
+          <p:cNvSpPr>
+            <a:spLocks noGrp="1"/>
+          </p:cNvSpPr>
+          <p:nvPr>
+            <p:ph type="pic" idx="13"/>
+          </p:nvPr>
+        </p:nvSpPr>
+        <p:spPr/>
+      </p:sp>
+    </p:spTree>
+    <p:extLst>
+      <p:ext uri="{BB962C8B-B14F-4D97-AF65-F5344CB8AC3E}">
+        <p14:creationId xmlns:p14="http://schemas.microsoft.com/office/powerpoint/2010/main" val="711675040"/>
+      </p:ext>
+    </p:extLst>
+  </p:cSld>
+  <p:clrMapOvr>
+    <a:masterClrMapping/>
+  </p:clrMapOvr>
+</p:sld>
+</file>
+
+<file path=ppt/slides/slide13.xml><?xml version="1.0" encoding="utf-8"?>
+<p:sld xmlns:a="http://schemas.openxmlformats.org/drawingml/2006/main" xmlns:r="http://schemas.openxmlformats.org/officeDocument/2006/relationships" xmlns:p="http://schemas.openxmlformats.org/presentationml/2006/main">
+  <p:cSld>
+    <p:spTree>
+      <p:nvGrpSpPr>
+        <p:cNvPr id="1" name=""/>
+        <p:cNvGrpSpPr/>
+        <p:nvPr/>
+      </p:nvGrpSpPr>
+      <p:grpSpPr>
+        <a:xfrm>
+          <a:off x="0" y="0"/>
+          <a:ext cx="0" cy="0"/>
+          <a:chOff x="0" y="0"/>
+          <a:chExt cx="0" cy="0"/>
+        </a:xfrm>
+      </p:grpSpPr>
+      <p:sp>
+        <p:nvSpPr>
+          <p:cNvPr id="2" name="Title 1"/>
+          <p:cNvSpPr>
+            <a:spLocks noGrp="1"/>
+          </p:cNvSpPr>
+          <p:nvPr>
+            <p:ph type="title"/>
+          </p:nvPr>
+        </p:nvSpPr>
+        <p:spPr/>
+        <p:txBody>
+          <a:bodyPr/>
+          <a:lstStyle/>
+          <a:p>
+            <a:r>
+              <a:rPr lang="en-US" dirty="0" smtClean="0"/>
+              <a:t>Basic CFML - syntax</a:t>
+            </a:r>
+            <a:endParaRPr lang="en-US" dirty="0"/>
+          </a:p>
+        </p:txBody>
+      </p:sp>
+      <p:sp>
+        <p:nvSpPr>
+          <p:cNvPr id="3" name="Content Placeholder 2"/>
+          <p:cNvSpPr>
+            <a:spLocks noGrp="1"/>
+          </p:cNvSpPr>
+          <p:nvPr>
+            <p:ph idx="1"/>
+          </p:nvPr>
+        </p:nvSpPr>
+        <p:spPr/>
+        <p:txBody>
+          <a:bodyPr/>
+          <a:lstStyle/>
+          <a:p>
+            <a:r>
+              <a:rPr lang="en-US" dirty="0" smtClean="0"/>
+              <a:t>Code lives in CFM or CFC files</a:t>
+            </a:r>
+          </a:p>
+          <a:p>
+            <a:r>
+              <a:rPr lang="en-US" dirty="0"/>
+              <a:t>Designed to live amongst </a:t>
+            </a:r>
+            <a:r>
+              <a:rPr lang="en-US" dirty="0" smtClean="0"/>
+              <a:t>HTML</a:t>
+            </a:r>
+          </a:p>
+          <a:p>
+            <a:r>
+              <a:rPr lang="en-US" dirty="0" smtClean="0"/>
+              <a:t>Tag</a:t>
+            </a:r>
+            <a:r>
+              <a:rPr lang="en-US" dirty="0"/>
+              <a:t>-based, starting with “</a:t>
+            </a:r>
+            <a:r>
+              <a:rPr lang="en-US" dirty="0" err="1"/>
+              <a:t>cf</a:t>
+            </a:r>
+            <a:r>
+              <a:rPr lang="en-US" dirty="0"/>
+              <a:t>” (for example, </a:t>
+            </a:r>
+            <a:r>
+              <a:rPr lang="en-US" b="1" dirty="0"/>
+              <a:t>&lt;</a:t>
+            </a:r>
+            <a:r>
+              <a:rPr lang="en-US" b="1" dirty="0" err="1" smtClean="0"/>
+              <a:t>cfset</a:t>
+            </a:r>
+            <a:r>
+              <a:rPr lang="en-US" b="1" dirty="0" smtClean="0"/>
+              <a:t>&gt;</a:t>
+            </a:r>
+            <a:r>
+              <a:rPr lang="en-US" dirty="0" smtClean="0"/>
+              <a:t>)</a:t>
+            </a:r>
+          </a:p>
+          <a:p>
+            <a:r>
+              <a:rPr lang="en-US" dirty="0" smtClean="0"/>
+              <a:t>Some tags are self-closing, many have attributes, some perform processing within the tag</a:t>
+            </a:r>
+          </a:p>
+          <a:p>
+            <a:r>
+              <a:rPr lang="en-US" dirty="0" smtClean="0"/>
+              <a:t>Can create custom tags</a:t>
+            </a:r>
+          </a:p>
+          <a:p>
+            <a:r>
+              <a:rPr lang="en-US" dirty="0" smtClean="0"/>
+              <a:t>Comments: </a:t>
+            </a:r>
+            <a:r>
+              <a:rPr lang="en-US" i="1" dirty="0" smtClean="0"/>
+              <a:t>&lt;!--- comment ---&gt;</a:t>
+            </a:r>
+          </a:p>
+        </p:txBody>
+      </p:sp>
+    </p:spTree>
+    <p:extLst>
+      <p:ext uri="{BB962C8B-B14F-4D97-AF65-F5344CB8AC3E}">
+        <p14:creationId xmlns:p14="http://schemas.microsoft.com/office/powerpoint/2010/main" val="1399933645"/>
+      </p:ext>
+    </p:extLst>
+  </p:cSld>
+  <p:clrMapOvr>
+    <a:masterClrMapping/>
+  </p:clrMapOvr>
+</p:sld>
+</file>
+
+<file path=ppt/slides/slide14.xml><?xml version="1.0" encoding="utf-8"?>
+<p:sld xmlns:a="http://schemas.openxmlformats.org/drawingml/2006/main" xmlns:r="http://schemas.openxmlformats.org/officeDocument/2006/relationships" xmlns:p="http://schemas.openxmlformats.org/presentationml/2006/main">
+  <p:cSld>
+    <p:spTree>
+      <p:nvGrpSpPr>
+        <p:cNvPr id="1" name=""/>
+        <p:cNvGrpSpPr/>
+        <p:nvPr/>
+      </p:nvGrpSpPr>
+      <p:grpSpPr>
+        <a:xfrm>
+          <a:off x="0" y="0"/>
+          <a:ext cx="0" cy="0"/>
+          <a:chOff x="0" y="0"/>
+          <a:chExt cx="0" cy="0"/>
+        </a:xfrm>
+      </p:grpSpPr>
+      <p:sp>
+        <p:nvSpPr>
+          <p:cNvPr id="2" name="Title 1"/>
+          <p:cNvSpPr>
+            <a:spLocks noGrp="1"/>
+          </p:cNvSpPr>
+          <p:nvPr>
+            <p:ph type="title"/>
+          </p:nvPr>
+        </p:nvSpPr>
+        <p:spPr/>
+        <p:txBody>
+          <a:bodyPr/>
+          <a:lstStyle/>
+          <a:p>
+            <a:r>
+              <a:rPr lang="en-US" dirty="0" smtClean="0"/>
+              <a:t>Basic CFML - variables</a:t>
+            </a:r>
+            <a:endParaRPr lang="en-US" dirty="0"/>
+          </a:p>
+        </p:txBody>
+      </p:sp>
+      <p:sp>
+        <p:nvSpPr>
+          <p:cNvPr id="3" name="Content Placeholder 2"/>
+          <p:cNvSpPr>
+            <a:spLocks noGrp="1"/>
+          </p:cNvSpPr>
+          <p:nvPr>
+            <p:ph idx="1"/>
+          </p:nvPr>
+        </p:nvSpPr>
+        <p:spPr/>
+        <p:txBody>
+          <a:bodyPr>
+            <a:normAutofit/>
+          </a:bodyPr>
+          <a:lstStyle/>
+          <a:p>
+            <a:r>
+              <a:rPr lang="en-US" dirty="0" smtClean="0"/>
+              <a:t>Variables </a:t>
+            </a:r>
+            <a:r>
+              <a:rPr lang="en-US" dirty="0"/>
+              <a:t>are </a:t>
+            </a:r>
+            <a:r>
+              <a:rPr lang="en-US" dirty="0" smtClean="0"/>
+              <a:t>type-less</a:t>
+            </a:r>
+          </a:p>
+          <a:p>
+            <a:pPr lvl="1"/>
+            <a:r>
+              <a:rPr lang="en-US" dirty="0" smtClean="0"/>
+              <a:t> </a:t>
+            </a:r>
+            <a:r>
+              <a:rPr lang="en-US" dirty="0"/>
+              <a:t>String, number, date, </a:t>
+            </a:r>
+            <a:r>
+              <a:rPr lang="en-US" dirty="0" err="1"/>
+              <a:t>boolean</a:t>
+            </a:r>
+            <a:r>
+              <a:rPr lang="en-US" dirty="0"/>
+              <a:t>, structures, </a:t>
+            </a:r>
+            <a:r>
+              <a:rPr lang="en-US" dirty="0" smtClean="0"/>
+              <a:t>arrays</a:t>
+            </a:r>
+          </a:p>
+          <a:p>
+            <a:r>
+              <a:rPr lang="en-US" dirty="0" smtClean="0"/>
+              <a:t>Variables have scope</a:t>
+            </a:r>
+          </a:p>
+          <a:p>
+            <a:pPr lvl="1"/>
+            <a:r>
+              <a:rPr lang="en-US" dirty="0" smtClean="0"/>
+              <a:t>Server, </a:t>
+            </a:r>
+            <a:r>
+              <a:rPr lang="en-US" dirty="0" err="1" smtClean="0"/>
+              <a:t>cgi</a:t>
+            </a:r>
+            <a:r>
+              <a:rPr lang="en-US" dirty="0" smtClean="0"/>
+              <a:t>, cookie, request, form, </a:t>
+            </a:r>
+            <a:r>
+              <a:rPr lang="en-US" dirty="0" err="1" smtClean="0"/>
+              <a:t>url</a:t>
+            </a:r>
+            <a:r>
+              <a:rPr lang="en-US" dirty="0" smtClean="0"/>
+              <a:t>, variables, local, arguments, attributes, application, client, session, </a:t>
+            </a:r>
+            <a:r>
+              <a:rPr lang="en-US" dirty="0" err="1" smtClean="0"/>
+              <a:t>cfthread</a:t>
+            </a:r>
+            <a:r>
+              <a:rPr lang="en-US" dirty="0" smtClean="0"/>
+              <a:t>, </a:t>
+            </a:r>
+            <a:r>
+              <a:rPr lang="en-US" dirty="0" err="1" smtClean="0"/>
+              <a:t>cffile</a:t>
+            </a:r>
+            <a:r>
+              <a:rPr lang="en-US" dirty="0" smtClean="0"/>
+              <a:t>, this, super, </a:t>
+            </a:r>
+            <a:r>
+              <a:rPr lang="en-US" dirty="0" err="1" smtClean="0"/>
+              <a:t>cfcatch</a:t>
+            </a:r>
+            <a:endParaRPr lang="en-US" dirty="0" smtClean="0"/>
+          </a:p>
+          <a:p>
+            <a:r>
+              <a:rPr lang="en-US" dirty="0" smtClean="0"/>
+              <a:t>Reference variables [scope].[variable’s name] or [scope][‘variable’s name’]</a:t>
+            </a:r>
+          </a:p>
+          <a:p>
+            <a:r>
+              <a:rPr lang="en-US" b="1" dirty="0" smtClean="0"/>
+              <a:t>&lt;</a:t>
+            </a:r>
+            <a:r>
+              <a:rPr lang="en-US" b="1" dirty="0" err="1" smtClean="0"/>
+              <a:t>cfset</a:t>
+            </a:r>
+            <a:r>
+              <a:rPr lang="en-US" b="1" dirty="0" smtClean="0"/>
+              <a:t> message = “Hello, World!”&gt;</a:t>
+            </a:r>
+          </a:p>
+        </p:txBody>
+      </p:sp>
+    </p:spTree>
+    <p:extLst>
+      <p:ext uri="{BB962C8B-B14F-4D97-AF65-F5344CB8AC3E}">
+        <p14:creationId xmlns:p14="http://schemas.microsoft.com/office/powerpoint/2010/main" val="2772679587"/>
+      </p:ext>
+    </p:extLst>
+  </p:cSld>
+  <p:clrMapOvr>
+    <a:masterClrMapping/>
+  </p:clrMapOvr>
+</p:sld>
+</file>
+
+<file path=ppt/slides/slide15.xml><?xml version="1.0" encoding="utf-8"?>
+<p:sld xmlns:a="http://schemas.openxmlformats.org/drawingml/2006/main" xmlns:r="http://schemas.openxmlformats.org/officeDocument/2006/relationships" xmlns:p="http://schemas.openxmlformats.org/presentationml/2006/main">
+  <p:cSld>
+    <p:spTree>
+      <p:nvGrpSpPr>
+        <p:cNvPr id="1" name=""/>
+        <p:cNvGrpSpPr/>
+        <p:nvPr/>
+      </p:nvGrpSpPr>
+      <p:grpSpPr>
+        <a:xfrm>
+          <a:off x="0" y="0"/>
+          <a:ext cx="0" cy="0"/>
+          <a:chOff x="0" y="0"/>
+          <a:chExt cx="0" cy="0"/>
+        </a:xfrm>
+      </p:grpSpPr>
+      <p:sp>
+        <p:nvSpPr>
+          <p:cNvPr id="2" name="Title 1"/>
+          <p:cNvSpPr>
+            <a:spLocks noGrp="1"/>
+          </p:cNvSpPr>
+          <p:nvPr>
+            <p:ph type="title"/>
+          </p:nvPr>
+        </p:nvSpPr>
+        <p:spPr/>
+        <p:txBody>
+          <a:bodyPr/>
+          <a:lstStyle/>
+          <a:p>
+            <a:r>
+              <a:rPr lang="en-US" dirty="0" smtClean="0"/>
+              <a:t>Basic CFML - output</a:t>
+            </a:r>
+            <a:endParaRPr lang="en-US" dirty="0"/>
+          </a:p>
+        </p:txBody>
+      </p:sp>
+      <p:sp>
+        <p:nvSpPr>
+          <p:cNvPr id="3" name="Content Placeholder 2"/>
+          <p:cNvSpPr>
+            <a:spLocks noGrp="1"/>
+          </p:cNvSpPr>
+          <p:nvPr>
+            <p:ph idx="1"/>
+          </p:nvPr>
+        </p:nvSpPr>
+        <p:spPr/>
+        <p:txBody>
+          <a:bodyPr>
+            <a:normAutofit fontScale="92500"/>
+          </a:bodyPr>
+          <a:lstStyle/>
+          <a:p>
+            <a:r>
+              <a:rPr lang="en-US" dirty="0" smtClean="0"/>
+              <a:t>CFML lives amongst HTML, so you tell it when to output</a:t>
+            </a:r>
+          </a:p>
+          <a:p>
+            <a:r>
+              <a:rPr lang="en-US" dirty="0" smtClean="0"/>
+              <a:t>Use #s to process CFML, with </a:t>
+            </a:r>
+            <a:r>
+              <a:rPr lang="en-US" b="1" dirty="0" smtClean="0"/>
+              <a:t>&lt;</a:t>
+            </a:r>
+            <a:r>
+              <a:rPr lang="en-US" b="1" dirty="0" err="1" smtClean="0"/>
+              <a:t>cfoutput</a:t>
+            </a:r>
+            <a:r>
+              <a:rPr lang="en-US" b="1" dirty="0" smtClean="0"/>
+              <a:t>&gt;</a:t>
+            </a:r>
+          </a:p>
+          <a:p>
+            <a:r>
+              <a:rPr lang="en-US" dirty="0" smtClean="0"/>
+              <a:t>Can put variables or function calls within #s</a:t>
+            </a:r>
+          </a:p>
+          <a:p>
+            <a:pPr lvl="1"/>
+            <a:r>
+              <a:rPr lang="en-US" b="1" dirty="0" smtClean="0"/>
+              <a:t>#</a:t>
+            </a:r>
+            <a:r>
+              <a:rPr lang="en-US" b="1" dirty="0" err="1" smtClean="0"/>
+              <a:t>uCase</a:t>
+            </a:r>
+            <a:r>
+              <a:rPr lang="en-US" b="1" dirty="0" smtClean="0"/>
+              <a:t>(message)# </a:t>
+            </a:r>
+            <a:r>
+              <a:rPr lang="en-US" dirty="0" smtClean="0"/>
+              <a:t>outputs the upper case of message</a:t>
+            </a:r>
+          </a:p>
+          <a:p>
+            <a:r>
+              <a:rPr lang="en-US" dirty="0" smtClean="0"/>
+              <a:t>Cannot put tags within #s</a:t>
+            </a:r>
+          </a:p>
+          <a:p>
+            <a:r>
+              <a:rPr lang="en-US" dirty="0" smtClean="0"/>
+              <a:t>Escape # with another #: ##</a:t>
+            </a:r>
+          </a:p>
+          <a:p>
+            <a:r>
+              <a:rPr lang="en-US" dirty="0" smtClean="0"/>
+              <a:t>Need #s in attributes for tags</a:t>
+            </a:r>
+          </a:p>
+          <a:p>
+            <a:pPr lvl="1"/>
+            <a:r>
+              <a:rPr lang="en-US" b="1" dirty="0" smtClean="0"/>
+              <a:t>&lt;</a:t>
+            </a:r>
+            <a:r>
+              <a:rPr lang="en-US" b="1" dirty="0" err="1" smtClean="0"/>
+              <a:t>cfdump</a:t>
+            </a:r>
+            <a:r>
+              <a:rPr lang="en-US" b="1" dirty="0" smtClean="0"/>
+              <a:t> </a:t>
+            </a:r>
+            <a:r>
+              <a:rPr lang="en-US" b="1" dirty="0" err="1" smtClean="0"/>
+              <a:t>var</a:t>
+            </a:r>
+            <a:r>
+              <a:rPr lang="en-US" b="1" dirty="0" smtClean="0"/>
+              <a:t>=“#message#”&gt;</a:t>
+            </a:r>
+            <a:endParaRPr lang="en-US" b="1" dirty="0"/>
+          </a:p>
+        </p:txBody>
+      </p:sp>
+    </p:spTree>
+    <p:extLst>
+      <p:ext uri="{BB962C8B-B14F-4D97-AF65-F5344CB8AC3E}">
+        <p14:creationId xmlns:p14="http://schemas.microsoft.com/office/powerpoint/2010/main" val="3765747897"/>
+      </p:ext>
+    </p:extLst>
+  </p:cSld>
+  <p:clrMapOvr>
+    <a:masterClrMapping/>
+  </p:clrMapOvr>
+</p:sld>
+</file>
+
+<file path=ppt/slides/slide16.xml><?xml version="1.0" encoding="utf-8"?>
+<p:sld xmlns:a="http://schemas.openxmlformats.org/drawingml/2006/main" xmlns:r="http://schemas.openxmlformats.org/officeDocument/2006/relationships" xmlns:p="http://schemas.openxmlformats.org/presentationml/2006/main">
+  <p:cSld>
+    <p:spTree>
+      <p:nvGrpSpPr>
+        <p:cNvPr id="1" name=""/>
+        <p:cNvGrpSpPr/>
+        <p:nvPr/>
+      </p:nvGrpSpPr>
+      <p:grpSpPr>
+        <a:xfrm>
+          <a:off x="0" y="0"/>
+          <a:ext cx="0" cy="0"/>
+          <a:chOff x="0" y="0"/>
+          <a:chExt cx="0" cy="0"/>
+        </a:xfrm>
+      </p:grpSpPr>
+      <p:sp>
+        <p:nvSpPr>
+          <p:cNvPr id="2" name="Title 1"/>
+          <p:cNvSpPr>
+            <a:spLocks noGrp="1"/>
+          </p:cNvSpPr>
+          <p:nvPr>
+            <p:ph type="title"/>
+          </p:nvPr>
+        </p:nvSpPr>
+        <p:spPr/>
+        <p:txBody>
+          <a:bodyPr/>
+          <a:lstStyle/>
+          <a:p>
+            <a:r>
+              <a:rPr lang="en-US" dirty="0" smtClean="0"/>
+              <a:t>Basic CFML - functions</a:t>
+            </a:r>
+            <a:endParaRPr lang="en-US" dirty="0"/>
+          </a:p>
+        </p:txBody>
+      </p:sp>
+      <p:sp>
+        <p:nvSpPr>
+          <p:cNvPr id="3" name="Content Placeholder 2"/>
+          <p:cNvSpPr>
+            <a:spLocks noGrp="1"/>
+          </p:cNvSpPr>
+          <p:nvPr>
+            <p:ph idx="1"/>
+          </p:nvPr>
+        </p:nvSpPr>
+        <p:spPr/>
+        <p:txBody>
+          <a:bodyPr/>
+          <a:lstStyle/>
+          <a:p>
+            <a:r>
+              <a:rPr lang="en-US" dirty="0" smtClean="0"/>
+              <a:t>2 basic types: core (built-in) and user-defined (UDF)</a:t>
+            </a:r>
+          </a:p>
+          <a:p>
+            <a:r>
+              <a:rPr lang="en-US" dirty="0" smtClean="0"/>
+              <a:t>Can define using </a:t>
+            </a:r>
+            <a:r>
+              <a:rPr lang="en-US" b="1" dirty="0" smtClean="0"/>
+              <a:t>&lt;</a:t>
+            </a:r>
+            <a:r>
+              <a:rPr lang="en-US" b="1" dirty="0" err="1" smtClean="0"/>
+              <a:t>cffunction</a:t>
+            </a:r>
+            <a:r>
+              <a:rPr lang="en-US" b="1" dirty="0" smtClean="0"/>
+              <a:t> …&gt;</a:t>
+            </a:r>
+            <a:r>
+              <a:rPr lang="en-US" dirty="0" smtClean="0"/>
+              <a:t> or CFCs</a:t>
+            </a:r>
+          </a:p>
+          <a:p>
+            <a:r>
+              <a:rPr lang="en-US" dirty="0" smtClean="0"/>
+              <a:t>Might return a value, output something, or both</a:t>
+            </a:r>
+          </a:p>
+          <a:p>
+            <a:r>
+              <a:rPr lang="en-US" dirty="0" smtClean="0"/>
+              <a:t>Syntax</a:t>
+            </a:r>
+          </a:p>
+          <a:p>
+            <a:pPr lvl="1"/>
+            <a:r>
+              <a:rPr lang="en-US" b="1" dirty="0" err="1" smtClean="0"/>
+              <a:t>FunctionName</a:t>
+            </a:r>
+            <a:r>
+              <a:rPr lang="en-US" b="1" dirty="0" smtClean="0"/>
+              <a:t>(“Miles”, 28)</a:t>
+            </a:r>
+          </a:p>
+          <a:p>
+            <a:pPr lvl="1"/>
+            <a:r>
+              <a:rPr lang="en-US" b="1" dirty="0" err="1" smtClean="0"/>
+              <a:t>FunctionName</a:t>
+            </a:r>
+            <a:r>
+              <a:rPr lang="en-US" b="1" dirty="0" smtClean="0"/>
+              <a:t>(name = “Miles”, age = 28)</a:t>
+            </a:r>
+          </a:p>
+          <a:p>
+            <a:pPr lvl="1"/>
+            <a:r>
+              <a:rPr lang="en-US" b="1" dirty="0" err="1" smtClean="0"/>
+              <a:t>FunctionName</a:t>
+            </a:r>
+            <a:r>
+              <a:rPr lang="en-US" b="1" dirty="0" smtClean="0"/>
+              <a:t>(</a:t>
+            </a:r>
+            <a:r>
+              <a:rPr lang="en-US" b="1" dirty="0" err="1" smtClean="0"/>
+              <a:t>argumentcollection</a:t>
+            </a:r>
+            <a:r>
+              <a:rPr lang="en-US" b="1" dirty="0" smtClean="0"/>
+              <a:t> = </a:t>
+            </a:r>
+            <a:r>
+              <a:rPr lang="en-US" b="1" dirty="0" err="1" smtClean="0"/>
+              <a:t>argsStruct</a:t>
+            </a:r>
+            <a:r>
+              <a:rPr lang="en-US" b="1" dirty="0" smtClean="0"/>
+              <a:t>)</a:t>
+            </a:r>
+            <a:endParaRPr lang="en-US" b="1" dirty="0"/>
+          </a:p>
+        </p:txBody>
+      </p:sp>
+    </p:spTree>
+    <p:extLst>
+      <p:ext uri="{BB962C8B-B14F-4D97-AF65-F5344CB8AC3E}">
+        <p14:creationId xmlns:p14="http://schemas.microsoft.com/office/powerpoint/2010/main" val="1785793510"/>
+      </p:ext>
+    </p:extLst>
+  </p:cSld>
+  <p:clrMapOvr>
+    <a:masterClrMapping/>
+  </p:clrMapOvr>
+</p:sld>
+</file>
+
+<file path=ppt/slides/slide17.xml><?xml version="1.0" encoding="utf-8"?>
+<p:sld xmlns:a="http://schemas.openxmlformats.org/drawingml/2006/main" xmlns:r="http://schemas.openxmlformats.org/officeDocument/2006/relationships" xmlns:p="http://schemas.openxmlformats.org/presentationml/2006/main">
+  <p:cSld>
+    <p:spTree>
+      <p:nvGrpSpPr>
+        <p:cNvPr id="1" name=""/>
+        <p:cNvGrpSpPr/>
+        <p:nvPr/>
+      </p:nvGrpSpPr>
+      <p:grpSpPr>
+        <a:xfrm>
+          <a:off x="0" y="0"/>
+          <a:ext cx="0" cy="0"/>
+          <a:chOff x="0" y="0"/>
+          <a:chExt cx="0" cy="0"/>
+        </a:xfrm>
+      </p:grpSpPr>
+      <p:sp>
+        <p:nvSpPr>
+          <p:cNvPr id="2" name="Title 1"/>
+          <p:cNvSpPr>
+            <a:spLocks noGrp="1"/>
+          </p:cNvSpPr>
+          <p:nvPr>
+            <p:ph type="title"/>
+          </p:nvPr>
+        </p:nvSpPr>
+        <p:spPr/>
+        <p:txBody>
+          <a:bodyPr/>
+          <a:lstStyle/>
+          <a:p>
+            <a:r>
+              <a:rPr lang="en-US" dirty="0" smtClean="0"/>
+              <a:t>Using Variables</a:t>
+            </a:r>
+            <a:endParaRPr lang="en-US" dirty="0"/>
+          </a:p>
+        </p:txBody>
+      </p:sp>
+      <p:sp>
+        <p:nvSpPr>
+          <p:cNvPr id="3" name="Content Placeholder 2"/>
+          <p:cNvSpPr>
+            <a:spLocks noGrp="1"/>
+          </p:cNvSpPr>
+          <p:nvPr>
+            <p:ph idx="1"/>
+          </p:nvPr>
+        </p:nvSpPr>
+        <p:spPr/>
+        <p:txBody>
+          <a:bodyPr>
+            <a:normAutofit/>
+          </a:bodyPr>
+          <a:lstStyle/>
+          <a:p>
+            <a:r>
+              <a:rPr lang="en-US" dirty="0" smtClean="0"/>
+              <a:t>String</a:t>
+            </a:r>
+            <a:r>
+              <a:rPr lang="en-US" dirty="0"/>
+              <a:t>: </a:t>
+            </a:r>
+            <a:r>
+              <a:rPr lang="en-US" b="1" dirty="0"/>
+              <a:t>&lt;</a:t>
+            </a:r>
+            <a:r>
+              <a:rPr lang="en-US" b="1" dirty="0" err="1"/>
+              <a:t>cfset</a:t>
+            </a:r>
+            <a:r>
+              <a:rPr lang="en-US" b="1" dirty="0"/>
+              <a:t> name=“Miles”&gt;</a:t>
+            </a:r>
+          </a:p>
+          <a:p>
+            <a:r>
+              <a:rPr lang="en-US" dirty="0" smtClean="0"/>
+              <a:t>Number: </a:t>
+            </a:r>
+            <a:r>
+              <a:rPr lang="en-US" b="1" dirty="0" smtClean="0"/>
+              <a:t>&lt;</a:t>
+            </a:r>
+            <a:r>
+              <a:rPr lang="en-US" b="1" dirty="0" err="1" smtClean="0"/>
+              <a:t>cfset</a:t>
+            </a:r>
+            <a:r>
+              <a:rPr lang="en-US" b="1" dirty="0" smtClean="0"/>
+              <a:t> age = 28&gt;</a:t>
+            </a:r>
+          </a:p>
+          <a:p>
+            <a:r>
+              <a:rPr lang="en-US" dirty="0" smtClean="0"/>
+              <a:t>Boolean: </a:t>
+            </a:r>
+            <a:r>
+              <a:rPr lang="en-US" b="1" dirty="0" smtClean="0"/>
+              <a:t>&lt;</a:t>
+            </a:r>
+            <a:r>
+              <a:rPr lang="en-US" b="1" dirty="0" err="1" smtClean="0"/>
+              <a:t>cfset</a:t>
+            </a:r>
+            <a:r>
+              <a:rPr lang="en-US" b="1" dirty="0" smtClean="0"/>
+              <a:t> </a:t>
+            </a:r>
+            <a:r>
+              <a:rPr lang="en-US" b="1" dirty="0" err="1" smtClean="0"/>
+              <a:t>isPresenting</a:t>
+            </a:r>
+            <a:r>
+              <a:rPr lang="en-US" b="1" dirty="0" smtClean="0"/>
+              <a:t> = true&gt;</a:t>
+            </a:r>
+          </a:p>
+          <a:p>
+            <a:r>
+              <a:rPr lang="en-US" dirty="0" smtClean="0"/>
+              <a:t>Date: </a:t>
+            </a:r>
+            <a:r>
+              <a:rPr lang="en-US" b="1" dirty="0" smtClean="0"/>
+              <a:t>&lt;</a:t>
+            </a:r>
+            <a:r>
+              <a:rPr lang="en-US" b="1" dirty="0" err="1" smtClean="0"/>
+              <a:t>cfset</a:t>
+            </a:r>
+            <a:r>
+              <a:rPr lang="en-US" b="1" dirty="0" smtClean="0"/>
+              <a:t> </a:t>
+            </a:r>
+            <a:r>
+              <a:rPr lang="en-US" b="1" dirty="0" err="1" smtClean="0"/>
+              <a:t>datePresenting</a:t>
+            </a:r>
+            <a:r>
+              <a:rPr lang="en-US" b="1" dirty="0" smtClean="0"/>
+              <a:t> = Now()&gt;</a:t>
+            </a:r>
+          </a:p>
+          <a:p>
+            <a:r>
+              <a:rPr lang="en-US" b="1" dirty="0" smtClean="0"/>
+              <a:t>&lt;</a:t>
+            </a:r>
+            <a:r>
+              <a:rPr lang="en-US" b="1" dirty="0" err="1" smtClean="0"/>
+              <a:t>cfparam</a:t>
+            </a:r>
+            <a:r>
+              <a:rPr lang="en-US" b="1" dirty="0" smtClean="0"/>
+              <a:t> name=“name” default=“No Name”&gt;</a:t>
+            </a:r>
+          </a:p>
+          <a:p>
+            <a:r>
+              <a:rPr lang="en-US" b="1" dirty="0" smtClean="0"/>
+              <a:t>&lt;</a:t>
+            </a:r>
+            <a:r>
+              <a:rPr lang="en-US" b="1" dirty="0" err="1" smtClean="0"/>
+              <a:t>cfoutput</a:t>
+            </a:r>
+            <a:r>
+              <a:rPr lang="en-US" b="1" dirty="0" smtClean="0"/>
+              <a:t>&gt;#</a:t>
+            </a:r>
+            <a:r>
+              <a:rPr lang="en-US" b="1" dirty="0" err="1" smtClean="0"/>
+              <a:t>simpleVariable</a:t>
+            </a:r>
+            <a:r>
+              <a:rPr lang="en-US" b="1" dirty="0" smtClean="0"/>
+              <a:t>#&lt;/</a:t>
+            </a:r>
+            <a:r>
+              <a:rPr lang="en-US" b="1" dirty="0" err="1" smtClean="0"/>
+              <a:t>cfoutput</a:t>
+            </a:r>
+            <a:r>
+              <a:rPr lang="en-US" b="1" dirty="0" smtClean="0"/>
+              <a:t>&gt;</a:t>
+            </a:r>
+          </a:p>
+        </p:txBody>
+      </p:sp>
+    </p:spTree>
+    <p:extLst>
+      <p:ext uri="{BB962C8B-B14F-4D97-AF65-F5344CB8AC3E}">
+        <p14:creationId xmlns:p14="http://schemas.microsoft.com/office/powerpoint/2010/main" val="1432780703"/>
+      </p:ext>
+    </p:extLst>
+  </p:cSld>
+  <p:clrMapOvr>
+    <a:masterClrMapping/>
+  </p:clrMapOvr>
+</p:sld>
+</file>
+
+<file path=ppt/slides/slide18.xml><?xml version="1.0" encoding="utf-8"?>
+<p:sld xmlns:a="http://schemas.openxmlformats.org/drawingml/2006/main" xmlns:r="http://schemas.openxmlformats.org/officeDocument/2006/relationships" xmlns:p="http://schemas.openxmlformats.org/presentationml/2006/main">
+  <p:cSld>
+    <p:spTree>
+      <p:nvGrpSpPr>
+        <p:cNvPr id="1" name=""/>
+        <p:cNvGrpSpPr/>
+        <p:nvPr/>
+      </p:nvGrpSpPr>
+      <p:grpSpPr>
+        <a:xfrm>
+          <a:off x="0" y="0"/>
+          <a:ext cx="0" cy="0"/>
+          <a:chOff x="0" y="0"/>
+          <a:chExt cx="0" cy="0"/>
+        </a:xfrm>
+      </p:grpSpPr>
+      <p:sp>
+        <p:nvSpPr>
+          <p:cNvPr id="2" name="Title 1"/>
+          <p:cNvSpPr>
+            <a:spLocks noGrp="1"/>
+          </p:cNvSpPr>
+          <p:nvPr>
+            <p:ph type="title"/>
+          </p:nvPr>
+        </p:nvSpPr>
+        <p:spPr/>
+        <p:txBody>
+          <a:bodyPr/>
+          <a:lstStyle/>
+          <a:p>
+            <a:r>
+              <a:rPr lang="en-US" dirty="0" smtClean="0"/>
+              <a:t>Using Variables - Arrays</a:t>
+            </a:r>
+            <a:endParaRPr lang="en-US" dirty="0"/>
+          </a:p>
+        </p:txBody>
+      </p:sp>
+      <p:sp>
+        <p:nvSpPr>
+          <p:cNvPr id="3" name="Content Placeholder 2"/>
+          <p:cNvSpPr>
+            <a:spLocks noGrp="1"/>
+          </p:cNvSpPr>
+          <p:nvPr>
+            <p:ph idx="1"/>
+          </p:nvPr>
+        </p:nvSpPr>
+        <p:spPr/>
+        <p:txBody>
+          <a:bodyPr/>
+          <a:lstStyle/>
+          <a:p>
+            <a:r>
+              <a:rPr lang="en-US" dirty="0" smtClean="0"/>
+              <a:t>1</a:t>
+            </a:r>
+            <a:r>
+              <a:rPr lang="en-US" dirty="0"/>
+              <a:t>-based, not 0-</a:t>
+            </a:r>
+            <a:r>
+              <a:rPr lang="en-US" dirty="0" smtClean="0"/>
+              <a:t>based</a:t>
+            </a:r>
+          </a:p>
+          <a:p>
+            <a:r>
+              <a:rPr lang="en-US" dirty="0" smtClean="0"/>
+              <a:t>Not typed</a:t>
+            </a:r>
+            <a:endParaRPr lang="en-US" dirty="0"/>
+          </a:p>
+          <a:p>
+            <a:r>
+              <a:rPr lang="en-US" b="1" dirty="0"/>
+              <a:t>&lt;</a:t>
+            </a:r>
+            <a:r>
+              <a:rPr lang="en-US" b="1" dirty="0" err="1"/>
+              <a:t>cfset</a:t>
+            </a:r>
+            <a:r>
+              <a:rPr lang="en-US" b="1" dirty="0"/>
+              <a:t> links = </a:t>
+            </a:r>
+            <a:r>
+              <a:rPr lang="en-US" b="1" dirty="0" err="1"/>
+              <a:t>ArrayNew</a:t>
+            </a:r>
+            <a:r>
+              <a:rPr lang="en-US" b="1" dirty="0"/>
+              <a:t>(1)&gt;</a:t>
+            </a:r>
+            <a:br>
+              <a:rPr lang="en-US" b="1" dirty="0"/>
+            </a:br>
+            <a:r>
+              <a:rPr lang="en-US" b="1" dirty="0"/>
+              <a:t>&lt;</a:t>
+            </a:r>
+            <a:r>
+              <a:rPr lang="en-US" b="1" dirty="0" err="1"/>
+              <a:t>cfset</a:t>
+            </a:r>
+            <a:r>
+              <a:rPr lang="en-US" b="1" dirty="0"/>
+              <a:t> links[1] = “http://</a:t>
+            </a:r>
+            <a:r>
+              <a:rPr lang="en-US" b="1" dirty="0" err="1"/>
+              <a:t>milesrausch.com</a:t>
+            </a:r>
+            <a:r>
+              <a:rPr lang="en-US" b="1" dirty="0"/>
+              <a:t>”&gt;</a:t>
+            </a:r>
+            <a:br>
+              <a:rPr lang="en-US" b="1" dirty="0"/>
+            </a:br>
+            <a:r>
+              <a:rPr lang="en-US" b="1" dirty="0"/>
+              <a:t>&lt;</a:t>
+            </a:r>
+            <a:r>
+              <a:rPr lang="en-US" b="1" dirty="0" err="1"/>
+              <a:t>cfset</a:t>
+            </a:r>
+            <a:r>
+              <a:rPr lang="en-US" b="1" dirty="0"/>
+              <a:t> links[2] = “http://</a:t>
+            </a:r>
+            <a:r>
+              <a:rPr lang="en-US" b="1" dirty="0" err="1"/>
+              <a:t>awayken.com</a:t>
+            </a:r>
+            <a:r>
+              <a:rPr lang="en-US" b="1" dirty="0"/>
+              <a:t>”&gt;</a:t>
+            </a:r>
+          </a:p>
+          <a:p>
+            <a:r>
+              <a:rPr lang="en-US" b="1" dirty="0"/>
+              <a:t>&lt;</a:t>
+            </a:r>
+            <a:r>
+              <a:rPr lang="en-US" b="1" dirty="0" err="1"/>
+              <a:t>cfset</a:t>
+            </a:r>
+            <a:r>
+              <a:rPr lang="en-US" b="1" dirty="0"/>
+              <a:t> links = [ “http://</a:t>
+            </a:r>
+            <a:r>
+              <a:rPr lang="en-US" b="1" dirty="0" err="1"/>
+              <a:t>milesrausch.com</a:t>
+            </a:r>
+            <a:r>
+              <a:rPr lang="en-US" b="1" dirty="0"/>
+              <a:t>”, “http://</a:t>
+            </a:r>
+            <a:r>
+              <a:rPr lang="en-US" b="1" dirty="0" err="1"/>
+              <a:t>awaken.com</a:t>
+            </a:r>
+            <a:r>
+              <a:rPr lang="en-US" b="1" dirty="0"/>
+              <a:t>” ]&gt;</a:t>
+            </a:r>
+          </a:p>
+          <a:p>
+            <a:r>
+              <a:rPr lang="en-US" b="1" dirty="0"/>
+              <a:t>&lt;</a:t>
+            </a:r>
+            <a:r>
+              <a:rPr lang="en-US" b="1" dirty="0" err="1"/>
+              <a:t>cfoutput</a:t>
+            </a:r>
+            <a:r>
+              <a:rPr lang="en-US" b="1" dirty="0"/>
+              <a:t>&gt;#links[1]#&lt;/</a:t>
+            </a:r>
+            <a:r>
+              <a:rPr lang="en-US" b="1" dirty="0" err="1"/>
+              <a:t>cfoutput</a:t>
+            </a:r>
+            <a:r>
+              <a:rPr lang="en-US" b="1" dirty="0" smtClean="0"/>
+              <a:t>&gt;</a:t>
+            </a:r>
+            <a:endParaRPr lang="en-US" b="1" dirty="0"/>
+          </a:p>
+        </p:txBody>
+      </p:sp>
+    </p:spTree>
+    <p:extLst>
+      <p:ext uri="{BB962C8B-B14F-4D97-AF65-F5344CB8AC3E}">
+        <p14:creationId xmlns:p14="http://schemas.microsoft.com/office/powerpoint/2010/main" val="696998618"/>
+      </p:ext>
+    </p:extLst>
+  </p:cSld>
+  <p:clrMapOvr>
+    <a:masterClrMapping/>
+  </p:clrMapOvr>
+</p:sld>
+</file>
+
+<file path=ppt/slides/slide19.xml><?xml version="1.0" encoding="utf-8"?>
+<p:sld xmlns:a="http://schemas.openxmlformats.org/drawingml/2006/main" xmlns:r="http://schemas.openxmlformats.org/officeDocument/2006/relationships" xmlns:p="http://schemas.openxmlformats.org/presentationml/2006/main">
+  <p:cSld>
+    <p:spTree>
+      <p:nvGrpSpPr>
+        <p:cNvPr id="1" name=""/>
+        <p:cNvGrpSpPr/>
+        <p:nvPr/>
+      </p:nvGrpSpPr>
+      <p:grpSpPr>
+        <a:xfrm>
+          <a:off x="0" y="0"/>
+          <a:ext cx="0" cy="0"/>
+          <a:chOff x="0" y="0"/>
+          <a:chExt cx="0" cy="0"/>
+        </a:xfrm>
+      </p:grpSpPr>
+      <p:sp>
+        <p:nvSpPr>
+          <p:cNvPr id="2" name="Title 1"/>
+          <p:cNvSpPr>
+            <a:spLocks noGrp="1"/>
+          </p:cNvSpPr>
+          <p:nvPr>
+            <p:ph type="title"/>
+          </p:nvPr>
+        </p:nvSpPr>
+        <p:spPr/>
+        <p:txBody>
+          <a:bodyPr/>
+          <a:lstStyle/>
+          <a:p>
+            <a:r>
+              <a:rPr lang="en-US" dirty="0" smtClean="0"/>
+              <a:t>Using Variables - Structures</a:t>
+            </a:r>
+            <a:endParaRPr lang="en-US" dirty="0"/>
+          </a:p>
+        </p:txBody>
+      </p:sp>
+      <p:sp>
+        <p:nvSpPr>
+          <p:cNvPr id="3" name="Content Placeholder 2"/>
+          <p:cNvSpPr>
+            <a:spLocks noGrp="1"/>
+          </p:cNvSpPr>
+          <p:nvPr>
+            <p:ph idx="1"/>
+          </p:nvPr>
+        </p:nvSpPr>
+        <p:spPr/>
+        <p:txBody>
+          <a:bodyPr>
+            <a:normAutofit fontScale="92500" lnSpcReduction="20000"/>
+          </a:bodyPr>
+          <a:lstStyle/>
+          <a:p>
+            <a:r>
+              <a:rPr lang="en-US" dirty="0" smtClean="0"/>
+              <a:t>Key / value data (map, collection, etc.)</a:t>
+            </a:r>
+          </a:p>
+          <a:p>
+            <a:r>
+              <a:rPr lang="en-US" dirty="0" smtClean="0"/>
+              <a:t>Can reference with dot or bracket notation</a:t>
+            </a:r>
+          </a:p>
+          <a:p>
+            <a:r>
+              <a:rPr lang="en-US" b="1" dirty="0" smtClean="0"/>
+              <a:t>&lt;</a:t>
+            </a:r>
+            <a:r>
+              <a:rPr lang="en-US" b="1" dirty="0" err="1"/>
+              <a:t>cfset</a:t>
+            </a:r>
+            <a:r>
+              <a:rPr lang="en-US" b="1" dirty="0"/>
+              <a:t> </a:t>
+            </a:r>
+            <a:r>
+              <a:rPr lang="en-US" b="1" dirty="0" smtClean="0"/>
+              <a:t>meta = </a:t>
+            </a:r>
+            <a:r>
+              <a:rPr lang="en-US" b="1" dirty="0" err="1" smtClean="0"/>
+              <a:t>StructNew</a:t>
+            </a:r>
+            <a:r>
+              <a:rPr lang="en-US" b="1" dirty="0" smtClean="0"/>
+              <a:t>()</a:t>
+            </a:r>
+            <a:r>
+              <a:rPr lang="en-US" b="1" dirty="0"/>
+              <a:t>&gt;</a:t>
+            </a:r>
+            <a:br>
+              <a:rPr lang="en-US" b="1" dirty="0"/>
+            </a:br>
+            <a:r>
+              <a:rPr lang="en-US" b="1" dirty="0"/>
+              <a:t>&lt;</a:t>
+            </a:r>
+            <a:r>
+              <a:rPr lang="en-US" b="1" dirty="0" err="1"/>
+              <a:t>cfset</a:t>
+            </a:r>
+            <a:r>
+              <a:rPr lang="en-US" b="1" dirty="0"/>
+              <a:t> </a:t>
+            </a:r>
+            <a:r>
+              <a:rPr lang="en-US" b="1" dirty="0" err="1" smtClean="0"/>
+              <a:t>meta.engine</a:t>
+            </a:r>
+            <a:r>
+              <a:rPr lang="en-US" b="1" dirty="0" smtClean="0"/>
+              <a:t> </a:t>
+            </a:r>
+            <a:r>
+              <a:rPr lang="en-US" b="1" dirty="0"/>
+              <a:t>= </a:t>
+            </a:r>
+            <a:r>
+              <a:rPr lang="en-US" b="1" dirty="0" smtClean="0"/>
+              <a:t>“</a:t>
+            </a:r>
+            <a:r>
+              <a:rPr lang="en-US" b="1" dirty="0" err="1" smtClean="0"/>
+              <a:t>OpenBD</a:t>
+            </a:r>
+            <a:r>
+              <a:rPr lang="en-US" b="1" dirty="0" smtClean="0"/>
+              <a:t>”</a:t>
+            </a:r>
+            <a:r>
+              <a:rPr lang="en-US" b="1" dirty="0"/>
+              <a:t>&gt;</a:t>
+            </a:r>
+            <a:br>
+              <a:rPr lang="en-US" b="1" dirty="0"/>
+            </a:br>
+            <a:r>
+              <a:rPr lang="en-US" b="1" dirty="0"/>
+              <a:t>&lt;</a:t>
+            </a:r>
+            <a:r>
+              <a:rPr lang="en-US" b="1" dirty="0" err="1"/>
+              <a:t>cfset</a:t>
+            </a:r>
+            <a:r>
+              <a:rPr lang="en-US" b="1" dirty="0"/>
+              <a:t> </a:t>
+            </a:r>
+            <a:r>
+              <a:rPr lang="en-US" b="1" dirty="0" smtClean="0"/>
+              <a:t>meta[“version”] </a:t>
+            </a:r>
+            <a:r>
+              <a:rPr lang="en-US" b="1" dirty="0"/>
+              <a:t>= </a:t>
+            </a:r>
+            <a:r>
+              <a:rPr lang="en-US" b="1" dirty="0" smtClean="0"/>
+              <a:t>“1.5”</a:t>
+            </a:r>
+            <a:r>
+              <a:rPr lang="en-US" b="1" dirty="0"/>
+              <a:t>&gt;</a:t>
+            </a:r>
+          </a:p>
+          <a:p>
+            <a:r>
+              <a:rPr lang="en-US" b="1" dirty="0"/>
+              <a:t>&lt;</a:t>
+            </a:r>
+            <a:r>
+              <a:rPr lang="en-US" b="1" dirty="0" err="1"/>
+              <a:t>cfset</a:t>
+            </a:r>
+            <a:r>
+              <a:rPr lang="en-US" b="1" dirty="0"/>
+              <a:t> </a:t>
+            </a:r>
+            <a:r>
+              <a:rPr lang="en-US" b="1" dirty="0" smtClean="0"/>
+              <a:t>meta = { engine = “</a:t>
+            </a:r>
+            <a:r>
+              <a:rPr lang="en-US" b="1" dirty="0" err="1" smtClean="0"/>
+              <a:t>OpenBD</a:t>
+            </a:r>
+            <a:r>
+              <a:rPr lang="en-US" b="1" dirty="0" smtClean="0"/>
+              <a:t>”, version = “1.5” }&gt;</a:t>
+            </a:r>
+            <a:endParaRPr lang="en-US" b="1" dirty="0"/>
+          </a:p>
+          <a:p>
+            <a:r>
+              <a:rPr lang="en-US" b="1" dirty="0"/>
+              <a:t>&lt;</a:t>
+            </a:r>
+            <a:r>
+              <a:rPr lang="en-US" b="1" dirty="0" err="1"/>
+              <a:t>cfoutput</a:t>
+            </a:r>
+            <a:r>
+              <a:rPr lang="en-US" b="1" dirty="0"/>
+              <a:t>&gt;</a:t>
+            </a:r>
+            <a:r>
+              <a:rPr lang="en-US" b="1" dirty="0" smtClean="0"/>
+              <a:t>#</a:t>
+            </a:r>
+            <a:r>
+              <a:rPr lang="en-US" b="1" dirty="0" err="1" smtClean="0"/>
+              <a:t>meta.engine</a:t>
+            </a:r>
+            <a:r>
+              <a:rPr lang="en-US" b="1" dirty="0" smtClean="0"/>
+              <a:t>#</a:t>
+            </a:r>
+            <a:r>
+              <a:rPr lang="en-US" b="1" dirty="0"/>
+              <a:t>&lt;/</a:t>
+            </a:r>
+            <a:r>
+              <a:rPr lang="en-US" b="1" dirty="0" err="1"/>
+              <a:t>cfoutput</a:t>
+            </a:r>
+            <a:r>
+              <a:rPr lang="en-US" b="1" dirty="0" smtClean="0"/>
+              <a:t>&gt;</a:t>
+            </a:r>
+            <a:br>
+              <a:rPr lang="en-US" b="1" dirty="0" smtClean="0"/>
+            </a:br>
+            <a:r>
+              <a:rPr lang="en-US" b="1" dirty="0" smtClean="0"/>
+              <a:t>&lt;</a:t>
+            </a:r>
+            <a:r>
+              <a:rPr lang="en-US" b="1" dirty="0" err="1" smtClean="0"/>
+              <a:t>cfoutput</a:t>
+            </a:r>
+            <a:r>
+              <a:rPr lang="en-US" b="1" dirty="0" smtClean="0"/>
+              <a:t>&gt;#meta[“version”]#&lt;/</a:t>
+            </a:r>
+            <a:r>
+              <a:rPr lang="en-US" b="1" dirty="0" err="1" smtClean="0"/>
+              <a:t>cfoutput</a:t>
+            </a:r>
+            <a:r>
+              <a:rPr lang="en-US" b="1" dirty="0" smtClean="0"/>
+              <a:t>&gt;</a:t>
+            </a:r>
+          </a:p>
+          <a:p>
+            <a:r>
+              <a:rPr lang="en-US" dirty="0"/>
+              <a:t>Check for existence before </a:t>
+            </a:r>
+            <a:r>
+              <a:rPr lang="en-US" dirty="0" smtClean="0"/>
+              <a:t>using:</a:t>
+            </a:r>
+            <a:br>
+              <a:rPr lang="en-US" dirty="0" smtClean="0"/>
+            </a:br>
+            <a:r>
+              <a:rPr lang="en-US" b="1" dirty="0" smtClean="0"/>
+              <a:t>&lt;</a:t>
+            </a:r>
+            <a:r>
+              <a:rPr lang="en-US" b="1" dirty="0" err="1" smtClean="0"/>
+              <a:t>cfif</a:t>
+            </a:r>
+            <a:r>
+              <a:rPr lang="en-US" b="1" dirty="0" smtClean="0"/>
+              <a:t> </a:t>
+            </a:r>
+            <a:r>
+              <a:rPr lang="en-US" b="1" dirty="0" err="1" smtClean="0"/>
+              <a:t>isDefined</a:t>
+            </a:r>
+            <a:r>
+              <a:rPr lang="en-US" b="1" dirty="0" smtClean="0"/>
+              <a:t>(“</a:t>
+            </a:r>
+            <a:r>
+              <a:rPr lang="en-US" b="1" dirty="0" err="1" smtClean="0"/>
+              <a:t>meta.engine</a:t>
+            </a:r>
+            <a:r>
+              <a:rPr lang="en-US" b="1" dirty="0" smtClean="0"/>
+              <a:t>”)&gt;</a:t>
+            </a:r>
+            <a:br>
+              <a:rPr lang="en-US" b="1" dirty="0" smtClean="0"/>
+            </a:br>
+            <a:r>
+              <a:rPr lang="en-US" b="1" dirty="0" smtClean="0"/>
+              <a:t>&lt;</a:t>
+            </a:r>
+            <a:r>
+              <a:rPr lang="en-US" b="1" dirty="0" err="1" smtClean="0"/>
+              <a:t>cfif</a:t>
+            </a:r>
+            <a:r>
+              <a:rPr lang="en-US" b="1" dirty="0" smtClean="0"/>
+              <a:t> </a:t>
+            </a:r>
+            <a:r>
+              <a:rPr lang="en-US" b="1" dirty="0" err="1" smtClean="0"/>
+              <a:t>StructKeyExists</a:t>
+            </a:r>
+            <a:r>
+              <a:rPr lang="en-US" b="1" dirty="0" smtClean="0"/>
+              <a:t>(meta, “engine”)&gt;</a:t>
+            </a:r>
+            <a:endParaRPr lang="en-US" b="1" dirty="0"/>
+          </a:p>
+        </p:txBody>
+      </p:sp>
+    </p:spTree>
+    <p:extLst>
+      <p:ext uri="{BB962C8B-B14F-4D97-AF65-F5344CB8AC3E}">
+        <p14:creationId xmlns:p14="http://schemas.microsoft.com/office/powerpoint/2010/main" val="2389885091"/>
+      </p:ext>
+    </p:extLst>
+  </p:cSld>
+  <p:clrMapOvr>
+    <a:masterClrMapping/>
+  </p:clrMapOvr>
 </p:sld>
 </file>
 
@@ -5289,14 +8725,1203 @@
   <p:clrMapOvr>
     <a:masterClrMapping/>
   </p:clrMapOvr>
-  <mc:AlternateContent xmlns:mc="http://schemas.openxmlformats.org/markup-compatibility/2006">
-    <mc:Choice xmlns:p14="http://schemas.microsoft.com/office/powerpoint/2010/main" Requires="p14">
+  <mc:AlternateContent xmlns:mc="http://schemas.openxmlformats.org/markup-compatibility/2006" xmlns:p14="http://schemas.microsoft.com/office/powerpoint/2010/main">
+    <mc:Choice Requires="p14">
       <p:transition spd="slow" p14:dur="2000"/>
     </mc:Choice>
-    <mc:Fallback>
+    <mc:Fallback xmlns="">
       <p:transition xmlns:p14="http://schemas.microsoft.com/office/powerpoint/2010/main" spd="slow"/>
     </mc:Fallback>
   </mc:AlternateContent>
+</p:sld>
+</file>
+
+<file path=ppt/slides/slide20.xml><?xml version="1.0" encoding="utf-8"?>
+<p:sld xmlns:a="http://schemas.openxmlformats.org/drawingml/2006/main" xmlns:r="http://schemas.openxmlformats.org/officeDocument/2006/relationships" xmlns:p="http://schemas.openxmlformats.org/presentationml/2006/main">
+  <p:cSld>
+    <p:spTree>
+      <p:nvGrpSpPr>
+        <p:cNvPr id="1" name=""/>
+        <p:cNvGrpSpPr/>
+        <p:nvPr/>
+      </p:nvGrpSpPr>
+      <p:grpSpPr>
+        <a:xfrm>
+          <a:off x="0" y="0"/>
+          <a:ext cx="0" cy="0"/>
+          <a:chOff x="0" y="0"/>
+          <a:chExt cx="0" cy="0"/>
+        </a:xfrm>
+      </p:grpSpPr>
+      <p:sp>
+        <p:nvSpPr>
+          <p:cNvPr id="2" name="Title 1"/>
+          <p:cNvSpPr>
+            <a:spLocks noGrp="1"/>
+          </p:cNvSpPr>
+          <p:nvPr>
+            <p:ph type="title"/>
+          </p:nvPr>
+        </p:nvSpPr>
+        <p:spPr/>
+        <p:txBody>
+          <a:bodyPr/>
+          <a:lstStyle/>
+          <a:p>
+            <a:r>
+              <a:rPr lang="en-US" dirty="0" smtClean="0"/>
+              <a:t>Operators</a:t>
+            </a:r>
+            <a:endParaRPr lang="en-US" dirty="0"/>
+          </a:p>
+        </p:txBody>
+      </p:sp>
+      <p:sp>
+        <p:nvSpPr>
+          <p:cNvPr id="3" name="Content Placeholder 2"/>
+          <p:cNvSpPr>
+            <a:spLocks noGrp="1"/>
+          </p:cNvSpPr>
+          <p:nvPr>
+            <p:ph idx="1"/>
+          </p:nvPr>
+        </p:nvSpPr>
+        <p:spPr/>
+        <p:txBody>
+          <a:bodyPr>
+            <a:normAutofit fontScale="77500" lnSpcReduction="20000"/>
+          </a:bodyPr>
+          <a:lstStyle/>
+          <a:p>
+            <a:r>
+              <a:rPr lang="en-US" dirty="0" smtClean="0"/>
+              <a:t>Assignment</a:t>
+            </a:r>
+          </a:p>
+          <a:p>
+            <a:pPr lvl="1"/>
+            <a:r>
+              <a:rPr lang="en-US" dirty="0" smtClean="0"/>
+              <a:t>=, +=, -=, &amp;=, /=, *=, %=</a:t>
+            </a:r>
+          </a:p>
+          <a:p>
+            <a:r>
+              <a:rPr lang="en-US" dirty="0" smtClean="0"/>
+              <a:t>Unary</a:t>
+            </a:r>
+          </a:p>
+          <a:p>
+            <a:pPr lvl="1"/>
+            <a:r>
+              <a:rPr lang="en-US" dirty="0" smtClean="0"/>
+              <a:t>++, --, +, -, /, *</a:t>
+            </a:r>
+          </a:p>
+          <a:p>
+            <a:r>
+              <a:rPr lang="en-US" dirty="0" smtClean="0"/>
+              <a:t>Binary</a:t>
+            </a:r>
+          </a:p>
+          <a:p>
+            <a:pPr lvl="1"/>
+            <a:r>
+              <a:rPr lang="en-US" dirty="0" smtClean="0"/>
+              <a:t>% or MOD</a:t>
+            </a:r>
+          </a:p>
+          <a:p>
+            <a:r>
+              <a:rPr lang="en-US" dirty="0" smtClean="0"/>
+              <a:t>Logical</a:t>
+            </a:r>
+          </a:p>
+          <a:p>
+            <a:pPr lvl="1"/>
+            <a:r>
+              <a:rPr lang="en-US" dirty="0" smtClean="0"/>
+              <a:t>! or NOT, OR, AND, XOR</a:t>
+            </a:r>
+          </a:p>
+          <a:p>
+            <a:r>
+              <a:rPr lang="en-US" dirty="0" smtClean="0"/>
+              <a:t>Comparators</a:t>
+            </a:r>
+          </a:p>
+          <a:p>
+            <a:pPr lvl="1"/>
+            <a:r>
+              <a:rPr lang="en-US" dirty="0" smtClean="0"/>
+              <a:t>EQ, NEQ, LT, LTE, GT, GTE, IS, IS NOT, CONTAINS</a:t>
+            </a:r>
+          </a:p>
+          <a:p>
+            <a:r>
+              <a:rPr lang="en-US" dirty="0" smtClean="0"/>
+              <a:t>This is not a complete list.</a:t>
+            </a:r>
+          </a:p>
+        </p:txBody>
+      </p:sp>
+    </p:spTree>
+    <p:extLst>
+      <p:ext uri="{BB962C8B-B14F-4D97-AF65-F5344CB8AC3E}">
+        <p14:creationId xmlns:p14="http://schemas.microsoft.com/office/powerpoint/2010/main" val="2233413174"/>
+      </p:ext>
+    </p:extLst>
+  </p:cSld>
+  <p:clrMapOvr>
+    <a:masterClrMapping/>
+  </p:clrMapOvr>
+</p:sld>
+</file>
+
+<file path=ppt/slides/slide21.xml><?xml version="1.0" encoding="utf-8"?>
+<p:sld xmlns:a="http://schemas.openxmlformats.org/drawingml/2006/main" xmlns:r="http://schemas.openxmlformats.org/officeDocument/2006/relationships" xmlns:p="http://schemas.openxmlformats.org/presentationml/2006/main">
+  <p:cSld>
+    <p:spTree>
+      <p:nvGrpSpPr>
+        <p:cNvPr id="1" name=""/>
+        <p:cNvGrpSpPr/>
+        <p:nvPr/>
+      </p:nvGrpSpPr>
+      <p:grpSpPr>
+        <a:xfrm>
+          <a:off x="0" y="0"/>
+          <a:ext cx="0" cy="0"/>
+          <a:chOff x="0" y="0"/>
+          <a:chExt cx="0" cy="0"/>
+        </a:xfrm>
+      </p:grpSpPr>
+      <p:sp>
+        <p:nvSpPr>
+          <p:cNvPr id="2" name="Title 1"/>
+          <p:cNvSpPr>
+            <a:spLocks noGrp="1"/>
+          </p:cNvSpPr>
+          <p:nvPr>
+            <p:ph type="ctrTitle"/>
+          </p:nvPr>
+        </p:nvSpPr>
+        <p:spPr/>
+        <p:txBody>
+          <a:bodyPr/>
+          <a:lstStyle/>
+          <a:p>
+            <a:r>
+              <a:rPr lang="en-US" dirty="0" smtClean="0"/>
+              <a:t>Demo 02</a:t>
+            </a:r>
+            <a:endParaRPr lang="en-US" dirty="0"/>
+          </a:p>
+        </p:txBody>
+      </p:sp>
+      <p:sp>
+        <p:nvSpPr>
+          <p:cNvPr id="4" name="Subtitle 3"/>
+          <p:cNvSpPr>
+            <a:spLocks noGrp="1"/>
+          </p:cNvSpPr>
+          <p:nvPr>
+            <p:ph type="subTitle" idx="1"/>
+          </p:nvPr>
+        </p:nvSpPr>
+        <p:spPr/>
+        <p:txBody>
+          <a:bodyPr/>
+          <a:lstStyle/>
+          <a:p>
+            <a:endParaRPr lang="en-US"/>
+          </a:p>
+        </p:txBody>
+      </p:sp>
+      <p:sp>
+        <p:nvSpPr>
+          <p:cNvPr id="5" name="Picture Placeholder 4"/>
+          <p:cNvSpPr>
+            <a:spLocks noGrp="1"/>
+          </p:cNvSpPr>
+          <p:nvPr>
+            <p:ph type="pic" idx="13"/>
+          </p:nvPr>
+        </p:nvSpPr>
+        <p:spPr/>
+      </p:sp>
+    </p:spTree>
+    <p:extLst>
+      <p:ext uri="{BB962C8B-B14F-4D97-AF65-F5344CB8AC3E}">
+        <p14:creationId xmlns:p14="http://schemas.microsoft.com/office/powerpoint/2010/main" val="3132652974"/>
+      </p:ext>
+    </p:extLst>
+  </p:cSld>
+  <p:clrMapOvr>
+    <a:masterClrMapping/>
+  </p:clrMapOvr>
+</p:sld>
+</file>
+
+<file path=ppt/slides/slide22.xml><?xml version="1.0" encoding="utf-8"?>
+<p:sld xmlns:a="http://schemas.openxmlformats.org/drawingml/2006/main" xmlns:r="http://schemas.openxmlformats.org/officeDocument/2006/relationships" xmlns:p="http://schemas.openxmlformats.org/presentationml/2006/main">
+  <p:cSld>
+    <p:spTree>
+      <p:nvGrpSpPr>
+        <p:cNvPr id="1" name=""/>
+        <p:cNvGrpSpPr/>
+        <p:nvPr/>
+      </p:nvGrpSpPr>
+      <p:grpSpPr>
+        <a:xfrm>
+          <a:off x="0" y="0"/>
+          <a:ext cx="0" cy="0"/>
+          <a:chOff x="0" y="0"/>
+          <a:chExt cx="0" cy="0"/>
+        </a:xfrm>
+      </p:grpSpPr>
+      <p:sp>
+        <p:nvSpPr>
+          <p:cNvPr id="5" name="Title 4"/>
+          <p:cNvSpPr>
+            <a:spLocks noGrp="1"/>
+          </p:cNvSpPr>
+          <p:nvPr>
+            <p:ph type="title"/>
+          </p:nvPr>
+        </p:nvSpPr>
+        <p:spPr/>
+        <p:txBody>
+          <a:bodyPr/>
+          <a:lstStyle/>
+          <a:p>
+            <a:r>
+              <a:rPr lang="en-US" dirty="0" smtClean="0"/>
+              <a:t>Control</a:t>
+            </a:r>
+            <a:endParaRPr lang="en-US" dirty="0"/>
+          </a:p>
+        </p:txBody>
+      </p:sp>
+      <p:sp>
+        <p:nvSpPr>
+          <p:cNvPr id="6" name="Content Placeholder 5"/>
+          <p:cNvSpPr>
+            <a:spLocks noGrp="1"/>
+          </p:cNvSpPr>
+          <p:nvPr>
+            <p:ph idx="1"/>
+          </p:nvPr>
+        </p:nvSpPr>
+        <p:spPr/>
+        <p:txBody>
+          <a:bodyPr>
+            <a:normAutofit fontScale="92500" lnSpcReduction="10000"/>
+          </a:bodyPr>
+          <a:lstStyle/>
+          <a:p>
+            <a:r>
+              <a:rPr lang="en-US" dirty="0" smtClean="0"/>
+              <a:t>&lt;</a:t>
+            </a:r>
+            <a:r>
+              <a:rPr lang="en-US" dirty="0" err="1" smtClean="0"/>
+              <a:t>cfif</a:t>
+            </a:r>
+            <a:r>
+              <a:rPr lang="en-US" dirty="0" smtClean="0"/>
+              <a:t>&gt;</a:t>
+            </a:r>
+          </a:p>
+          <a:p>
+            <a:pPr lvl="1"/>
+            <a:r>
+              <a:rPr lang="en-US" dirty="0" smtClean="0"/>
+              <a:t>&lt;</a:t>
+            </a:r>
+            <a:r>
+              <a:rPr lang="en-US" dirty="0" err="1" smtClean="0"/>
+              <a:t>cfelseif</a:t>
+            </a:r>
+            <a:r>
+              <a:rPr lang="en-US" dirty="0" smtClean="0"/>
+              <a:t>&gt;</a:t>
+            </a:r>
+          </a:p>
+          <a:p>
+            <a:pPr lvl="1"/>
+            <a:r>
+              <a:rPr lang="en-US" dirty="0" smtClean="0"/>
+              <a:t>&lt;</a:t>
+            </a:r>
+            <a:r>
+              <a:rPr lang="en-US" dirty="0" err="1" smtClean="0"/>
+              <a:t>cfelse</a:t>
+            </a:r>
+            <a:r>
+              <a:rPr lang="en-US" dirty="0" smtClean="0"/>
+              <a:t>&gt;</a:t>
+            </a:r>
+          </a:p>
+          <a:p>
+            <a:r>
+              <a:rPr lang="en-US" dirty="0" smtClean="0"/>
+              <a:t>&lt;</a:t>
+            </a:r>
+            <a:r>
+              <a:rPr lang="en-US" dirty="0" err="1" smtClean="0"/>
+              <a:t>cfswitch</a:t>
+            </a:r>
+            <a:r>
+              <a:rPr lang="en-US" dirty="0" smtClean="0"/>
+              <a:t>&gt;</a:t>
+            </a:r>
+          </a:p>
+          <a:p>
+            <a:pPr lvl="1"/>
+            <a:r>
+              <a:rPr lang="en-US" dirty="0" smtClean="0"/>
+              <a:t>&lt;</a:t>
+            </a:r>
+            <a:r>
+              <a:rPr lang="en-US" dirty="0" err="1" smtClean="0"/>
+              <a:t>cfcase</a:t>
+            </a:r>
+            <a:r>
+              <a:rPr lang="en-US" dirty="0" smtClean="0"/>
+              <a:t>&gt;</a:t>
+            </a:r>
+          </a:p>
+          <a:p>
+            <a:pPr lvl="1"/>
+            <a:r>
+              <a:rPr lang="en-US" dirty="0" smtClean="0"/>
+              <a:t>&lt;</a:t>
+            </a:r>
+            <a:r>
+              <a:rPr lang="en-US" dirty="0" err="1" smtClean="0"/>
+              <a:t>cfdefaultcase</a:t>
+            </a:r>
+            <a:r>
+              <a:rPr lang="en-US" dirty="0" smtClean="0"/>
+              <a:t>&gt;</a:t>
+            </a:r>
+          </a:p>
+          <a:p>
+            <a:r>
+              <a:rPr lang="en-US" dirty="0" smtClean="0"/>
+              <a:t>&lt;</a:t>
+            </a:r>
+            <a:r>
+              <a:rPr lang="en-US" dirty="0" err="1" smtClean="0"/>
+              <a:t>cftry</a:t>
+            </a:r>
+            <a:r>
+              <a:rPr lang="en-US" dirty="0" smtClean="0"/>
+              <a:t>&gt;</a:t>
+            </a:r>
+          </a:p>
+          <a:p>
+            <a:pPr lvl="1"/>
+            <a:r>
+              <a:rPr lang="en-US" dirty="0" smtClean="0"/>
+              <a:t>&lt;</a:t>
+            </a:r>
+            <a:r>
+              <a:rPr lang="en-US" dirty="0" err="1" smtClean="0"/>
+              <a:t>cfcatch</a:t>
+            </a:r>
+            <a:r>
+              <a:rPr lang="en-US" dirty="0" smtClean="0"/>
+              <a:t>&gt;</a:t>
+            </a:r>
+          </a:p>
+          <a:p>
+            <a:pPr lvl="1"/>
+            <a:r>
+              <a:rPr lang="en-US" dirty="0" smtClean="0"/>
+              <a:t>&lt;</a:t>
+            </a:r>
+            <a:r>
+              <a:rPr lang="en-US" dirty="0" err="1" smtClean="0"/>
+              <a:t>cffinally</a:t>
+            </a:r>
+            <a:r>
+              <a:rPr lang="en-US" dirty="0" smtClean="0"/>
+              <a:t>&gt;</a:t>
+            </a:r>
+          </a:p>
+          <a:p>
+            <a:r>
+              <a:rPr lang="en-US" dirty="0" smtClean="0"/>
+              <a:t>&lt;</a:t>
+            </a:r>
+            <a:r>
+              <a:rPr lang="en-US" dirty="0" err="1" smtClean="0"/>
+              <a:t>cflocation</a:t>
+            </a:r>
+            <a:r>
+              <a:rPr lang="en-US" dirty="0" smtClean="0"/>
+              <a:t>&gt;</a:t>
+            </a:r>
+            <a:endParaRPr lang="en-US" dirty="0"/>
+          </a:p>
+        </p:txBody>
+      </p:sp>
+    </p:spTree>
+    <p:extLst>
+      <p:ext uri="{BB962C8B-B14F-4D97-AF65-F5344CB8AC3E}">
+        <p14:creationId xmlns:p14="http://schemas.microsoft.com/office/powerpoint/2010/main" val="2696741995"/>
+      </p:ext>
+    </p:extLst>
+  </p:cSld>
+  <p:clrMapOvr>
+    <a:masterClrMapping/>
+  </p:clrMapOvr>
+</p:sld>
+</file>
+
+<file path=ppt/slides/slide23.xml><?xml version="1.0" encoding="utf-8"?>
+<p:sld xmlns:a="http://schemas.openxmlformats.org/drawingml/2006/main" xmlns:r="http://schemas.openxmlformats.org/officeDocument/2006/relationships" xmlns:p="http://schemas.openxmlformats.org/presentationml/2006/main">
+  <p:cSld>
+    <p:spTree>
+      <p:nvGrpSpPr>
+        <p:cNvPr id="1" name=""/>
+        <p:cNvGrpSpPr/>
+        <p:nvPr/>
+      </p:nvGrpSpPr>
+      <p:grpSpPr>
+        <a:xfrm>
+          <a:off x="0" y="0"/>
+          <a:ext cx="0" cy="0"/>
+          <a:chOff x="0" y="0"/>
+          <a:chExt cx="0" cy="0"/>
+        </a:xfrm>
+      </p:grpSpPr>
+      <p:sp>
+        <p:nvSpPr>
+          <p:cNvPr id="2" name="Title 1"/>
+          <p:cNvSpPr>
+            <a:spLocks noGrp="1"/>
+          </p:cNvSpPr>
+          <p:nvPr>
+            <p:ph type="title"/>
+          </p:nvPr>
+        </p:nvSpPr>
+        <p:spPr/>
+        <p:txBody>
+          <a:bodyPr/>
+          <a:lstStyle/>
+          <a:p>
+            <a:r>
+              <a:rPr lang="en-US" dirty="0" smtClean="0"/>
+              <a:t>Iterations</a:t>
+            </a:r>
+            <a:endParaRPr lang="en-US" dirty="0"/>
+          </a:p>
+        </p:txBody>
+      </p:sp>
+      <p:sp>
+        <p:nvSpPr>
+          <p:cNvPr id="3" name="Content Placeholder 2"/>
+          <p:cNvSpPr>
+            <a:spLocks noGrp="1"/>
+          </p:cNvSpPr>
+          <p:nvPr>
+            <p:ph idx="1"/>
+          </p:nvPr>
+        </p:nvSpPr>
+        <p:spPr/>
+        <p:txBody>
+          <a:bodyPr>
+            <a:normAutofit lnSpcReduction="10000"/>
+          </a:bodyPr>
+          <a:lstStyle/>
+          <a:p>
+            <a:r>
+              <a:rPr lang="en-US" dirty="0" smtClean="0"/>
+              <a:t>&lt;</a:t>
+            </a:r>
+            <a:r>
+              <a:rPr lang="en-US" dirty="0" err="1" smtClean="0"/>
+              <a:t>cfloop</a:t>
+            </a:r>
+            <a:r>
+              <a:rPr lang="en-US" dirty="0" smtClean="0"/>
+              <a:t>&gt;</a:t>
+            </a:r>
+          </a:p>
+          <a:p>
+            <a:pPr lvl="1"/>
+            <a:r>
+              <a:rPr lang="en-US" dirty="0" smtClean="0"/>
+              <a:t>Types of loops</a:t>
+            </a:r>
+          </a:p>
+          <a:p>
+            <a:pPr lvl="2"/>
+            <a:r>
+              <a:rPr lang="en-US" dirty="0" smtClean="0"/>
+              <a:t>Numeric: from, to, index, step</a:t>
+            </a:r>
+          </a:p>
+          <a:p>
+            <a:pPr lvl="2"/>
+            <a:r>
+              <a:rPr lang="en-US" dirty="0" smtClean="0"/>
+              <a:t>Condition: condition</a:t>
+            </a:r>
+          </a:p>
+          <a:p>
+            <a:pPr lvl="2"/>
+            <a:r>
+              <a:rPr lang="en-US" dirty="0" smtClean="0"/>
+              <a:t>Query: query, </a:t>
+            </a:r>
+            <a:r>
+              <a:rPr lang="en-US" dirty="0" err="1" smtClean="0"/>
+              <a:t>startrow</a:t>
+            </a:r>
+            <a:r>
+              <a:rPr lang="en-US" dirty="0" smtClean="0"/>
+              <a:t>, </a:t>
+            </a:r>
+            <a:r>
+              <a:rPr lang="en-US" dirty="0" err="1" smtClean="0"/>
+              <a:t>endrow</a:t>
+            </a:r>
+            <a:endParaRPr lang="en-US" dirty="0" smtClean="0"/>
+          </a:p>
+          <a:p>
+            <a:pPr lvl="2"/>
+            <a:r>
+              <a:rPr lang="en-US" dirty="0" smtClean="0"/>
+              <a:t>Array: array, index</a:t>
+            </a:r>
+          </a:p>
+          <a:p>
+            <a:pPr lvl="2"/>
+            <a:r>
+              <a:rPr lang="en-US" dirty="0" smtClean="0"/>
+              <a:t>List: list, index, delimiters</a:t>
+            </a:r>
+          </a:p>
+          <a:p>
+            <a:pPr lvl="2"/>
+            <a:r>
+              <a:rPr lang="en-US" dirty="0" smtClean="0"/>
+              <a:t>File: file, index, characters</a:t>
+            </a:r>
+          </a:p>
+          <a:p>
+            <a:pPr lvl="2"/>
+            <a:r>
+              <a:rPr lang="en-US" dirty="0" smtClean="0"/>
+              <a:t>Collection: collection, item</a:t>
+            </a:r>
+          </a:p>
+          <a:p>
+            <a:pPr lvl="1"/>
+            <a:r>
+              <a:rPr lang="en-US" dirty="0" smtClean="0"/>
+              <a:t>&lt;</a:t>
+            </a:r>
+            <a:r>
+              <a:rPr lang="en-US" dirty="0" err="1" smtClean="0"/>
+              <a:t>cfbreak</a:t>
+            </a:r>
+            <a:r>
+              <a:rPr lang="en-US" dirty="0" smtClean="0"/>
+              <a:t>&gt;</a:t>
+            </a:r>
+          </a:p>
+          <a:p>
+            <a:pPr lvl="1"/>
+            <a:r>
+              <a:rPr lang="en-US" dirty="0" smtClean="0"/>
+              <a:t>&lt;</a:t>
+            </a:r>
+            <a:r>
+              <a:rPr lang="en-US" dirty="0" err="1" smtClean="0"/>
+              <a:t>cfcontinue</a:t>
+            </a:r>
+            <a:r>
+              <a:rPr lang="en-US" dirty="0" smtClean="0"/>
+              <a:t>&gt;</a:t>
+            </a:r>
+            <a:endParaRPr lang="en-US" dirty="0"/>
+          </a:p>
+        </p:txBody>
+      </p:sp>
+    </p:spTree>
+    <p:extLst>
+      <p:ext uri="{BB962C8B-B14F-4D97-AF65-F5344CB8AC3E}">
+        <p14:creationId xmlns:p14="http://schemas.microsoft.com/office/powerpoint/2010/main" val="3196592386"/>
+      </p:ext>
+    </p:extLst>
+  </p:cSld>
+  <p:clrMapOvr>
+    <a:masterClrMapping/>
+  </p:clrMapOvr>
+</p:sld>
+</file>
+
+<file path=ppt/slides/slide24.xml><?xml version="1.0" encoding="utf-8"?>
+<p:sld xmlns:a="http://schemas.openxmlformats.org/drawingml/2006/main" xmlns:r="http://schemas.openxmlformats.org/officeDocument/2006/relationships" xmlns:p="http://schemas.openxmlformats.org/presentationml/2006/main">
+  <p:cSld>
+    <p:spTree>
+      <p:nvGrpSpPr>
+        <p:cNvPr id="1" name=""/>
+        <p:cNvGrpSpPr/>
+        <p:nvPr/>
+      </p:nvGrpSpPr>
+      <p:grpSpPr>
+        <a:xfrm>
+          <a:off x="0" y="0"/>
+          <a:ext cx="0" cy="0"/>
+          <a:chOff x="0" y="0"/>
+          <a:chExt cx="0" cy="0"/>
+        </a:xfrm>
+      </p:grpSpPr>
+      <p:sp>
+        <p:nvSpPr>
+          <p:cNvPr id="2" name="Title 1"/>
+          <p:cNvSpPr>
+            <a:spLocks noGrp="1"/>
+          </p:cNvSpPr>
+          <p:nvPr>
+            <p:ph type="title"/>
+          </p:nvPr>
+        </p:nvSpPr>
+        <p:spPr/>
+        <p:txBody>
+          <a:bodyPr/>
+          <a:lstStyle/>
+          <a:p>
+            <a:r>
+              <a:rPr lang="en-US" dirty="0" smtClean="0"/>
+              <a:t>Content</a:t>
+            </a:r>
+            <a:endParaRPr lang="en-US" dirty="0"/>
+          </a:p>
+        </p:txBody>
+      </p:sp>
+      <p:sp>
+        <p:nvSpPr>
+          <p:cNvPr id="3" name="Content Placeholder 2"/>
+          <p:cNvSpPr>
+            <a:spLocks noGrp="1"/>
+          </p:cNvSpPr>
+          <p:nvPr>
+            <p:ph idx="1"/>
+          </p:nvPr>
+        </p:nvSpPr>
+        <p:spPr/>
+        <p:txBody>
+          <a:bodyPr>
+            <a:normAutofit/>
+          </a:bodyPr>
+          <a:lstStyle/>
+          <a:p>
+            <a:r>
+              <a:rPr lang="en-US" dirty="0" smtClean="0"/>
+              <a:t>&lt;</a:t>
+            </a:r>
+            <a:r>
+              <a:rPr lang="en-US" dirty="0" err="1" smtClean="0"/>
+              <a:t>cfquery</a:t>
+            </a:r>
+            <a:r>
+              <a:rPr lang="en-US" dirty="0" smtClean="0"/>
+              <a:t>&gt;</a:t>
+            </a:r>
+          </a:p>
+          <a:p>
+            <a:pPr lvl="1"/>
+            <a:r>
+              <a:rPr lang="en-US" dirty="0" smtClean="0"/>
+              <a:t>&lt;</a:t>
+            </a:r>
+            <a:r>
+              <a:rPr lang="en-US" dirty="0" err="1" smtClean="0"/>
+              <a:t>cfqueryparam</a:t>
+            </a:r>
+            <a:r>
+              <a:rPr lang="en-US" dirty="0" smtClean="0"/>
+              <a:t>&gt;</a:t>
+            </a:r>
+          </a:p>
+          <a:p>
+            <a:pPr lvl="1"/>
+            <a:r>
+              <a:rPr lang="en-US" dirty="0" smtClean="0"/>
+              <a:t>&lt;</a:t>
+            </a:r>
+            <a:r>
+              <a:rPr lang="en-US" dirty="0" err="1" smtClean="0"/>
+              <a:t>cftransaction</a:t>
+            </a:r>
+            <a:r>
+              <a:rPr lang="en-US" dirty="0" smtClean="0"/>
+              <a:t>&gt;</a:t>
+            </a:r>
+          </a:p>
+          <a:p>
+            <a:r>
+              <a:rPr lang="en-US" dirty="0" smtClean="0"/>
+              <a:t>&lt;</a:t>
+            </a:r>
+            <a:r>
+              <a:rPr lang="en-US" dirty="0" err="1" smtClean="0"/>
+              <a:t>cffile</a:t>
+            </a:r>
+            <a:r>
+              <a:rPr lang="en-US" dirty="0" smtClean="0"/>
+              <a:t>&gt;</a:t>
+            </a:r>
+          </a:p>
+          <a:p>
+            <a:r>
+              <a:rPr lang="en-US" dirty="0" smtClean="0"/>
+              <a:t>&lt;</a:t>
+            </a:r>
+            <a:r>
+              <a:rPr lang="en-US" dirty="0" err="1" smtClean="0"/>
+              <a:t>cfdirectory</a:t>
+            </a:r>
+            <a:r>
+              <a:rPr lang="en-US" dirty="0" smtClean="0"/>
+              <a:t>&gt;</a:t>
+            </a:r>
+          </a:p>
+          <a:p>
+            <a:r>
+              <a:rPr lang="en-US" dirty="0" smtClean="0"/>
+              <a:t>&lt;</a:t>
+            </a:r>
+            <a:r>
+              <a:rPr lang="en-US" dirty="0" err="1" smtClean="0"/>
+              <a:t>cfhttp</a:t>
+            </a:r>
+            <a:r>
+              <a:rPr lang="en-US" dirty="0" smtClean="0"/>
+              <a:t>&gt;</a:t>
+            </a:r>
+          </a:p>
+          <a:p>
+            <a:pPr lvl="1"/>
+            <a:r>
+              <a:rPr lang="en-US" dirty="0" smtClean="0"/>
+              <a:t>&lt;</a:t>
+            </a:r>
+            <a:r>
+              <a:rPr lang="en-US" dirty="0" err="1" smtClean="0"/>
+              <a:t>cfhttpparam</a:t>
+            </a:r>
+            <a:r>
+              <a:rPr lang="en-US" dirty="0" smtClean="0"/>
+              <a:t>&gt;</a:t>
+            </a:r>
+          </a:p>
+          <a:p>
+            <a:r>
+              <a:rPr lang="en-US" dirty="0" smtClean="0"/>
+              <a:t>&lt;</a:t>
+            </a:r>
+            <a:r>
+              <a:rPr lang="en-US" dirty="0" err="1" smtClean="0"/>
+              <a:t>cffeed</a:t>
+            </a:r>
+            <a:r>
+              <a:rPr lang="en-US" dirty="0" smtClean="0"/>
+              <a:t>&gt;</a:t>
+            </a:r>
+            <a:endParaRPr lang="en-US" dirty="0"/>
+          </a:p>
+        </p:txBody>
+      </p:sp>
+    </p:spTree>
+    <p:extLst>
+      <p:ext uri="{BB962C8B-B14F-4D97-AF65-F5344CB8AC3E}">
+        <p14:creationId xmlns:p14="http://schemas.microsoft.com/office/powerpoint/2010/main" val="2652134881"/>
+      </p:ext>
+    </p:extLst>
+  </p:cSld>
+  <p:clrMapOvr>
+    <a:masterClrMapping/>
+  </p:clrMapOvr>
+</p:sld>
+</file>
+
+<file path=ppt/slides/slide25.xml><?xml version="1.0" encoding="utf-8"?>
+<p:sld xmlns:a="http://schemas.openxmlformats.org/drawingml/2006/main" xmlns:r="http://schemas.openxmlformats.org/officeDocument/2006/relationships" xmlns:p="http://schemas.openxmlformats.org/presentationml/2006/main">
+  <p:cSld>
+    <p:spTree>
+      <p:nvGrpSpPr>
+        <p:cNvPr id="1" name=""/>
+        <p:cNvGrpSpPr/>
+        <p:nvPr/>
+      </p:nvGrpSpPr>
+      <p:grpSpPr>
+        <a:xfrm>
+          <a:off x="0" y="0"/>
+          <a:ext cx="0" cy="0"/>
+          <a:chOff x="0" y="0"/>
+          <a:chExt cx="0" cy="0"/>
+        </a:xfrm>
+      </p:grpSpPr>
+      <p:sp>
+        <p:nvSpPr>
+          <p:cNvPr id="2" name="Title 1"/>
+          <p:cNvSpPr>
+            <a:spLocks noGrp="1"/>
+          </p:cNvSpPr>
+          <p:nvPr>
+            <p:ph type="title"/>
+          </p:nvPr>
+        </p:nvSpPr>
+        <p:spPr/>
+        <p:txBody>
+          <a:bodyPr/>
+          <a:lstStyle/>
+          <a:p>
+            <a:r>
+              <a:rPr lang="en-US" dirty="0" smtClean="0"/>
+              <a:t>Manipulation</a:t>
+            </a:r>
+            <a:endParaRPr lang="en-US" dirty="0"/>
+          </a:p>
+        </p:txBody>
+      </p:sp>
+      <p:sp>
+        <p:nvSpPr>
+          <p:cNvPr id="3" name="Content Placeholder 2"/>
+          <p:cNvSpPr>
+            <a:spLocks noGrp="1"/>
+          </p:cNvSpPr>
+          <p:nvPr>
+            <p:ph idx="1"/>
+          </p:nvPr>
+        </p:nvSpPr>
+        <p:spPr/>
+        <p:txBody>
+          <a:bodyPr>
+            <a:normAutofit fontScale="92500" lnSpcReduction="10000"/>
+          </a:bodyPr>
+          <a:lstStyle/>
+          <a:p>
+            <a:r>
+              <a:rPr lang="en-US" dirty="0"/>
+              <a:t>&lt;</a:t>
+            </a:r>
+            <a:r>
+              <a:rPr lang="en-US" dirty="0" err="1"/>
+              <a:t>cfimage</a:t>
+            </a:r>
+            <a:r>
+              <a:rPr lang="en-US" dirty="0"/>
+              <a:t>&gt;</a:t>
+            </a:r>
+          </a:p>
+          <a:p>
+            <a:r>
+              <a:rPr lang="en-US" dirty="0"/>
+              <a:t>&lt;</a:t>
+            </a:r>
+            <a:r>
+              <a:rPr lang="en-US" dirty="0" err="1"/>
+              <a:t>cfmail</a:t>
+            </a:r>
+            <a:r>
+              <a:rPr lang="en-US" dirty="0"/>
+              <a:t>&gt;</a:t>
+            </a:r>
+          </a:p>
+          <a:p>
+            <a:pPr lvl="1"/>
+            <a:r>
+              <a:rPr lang="en-US" dirty="0"/>
+              <a:t>&lt;</a:t>
+            </a:r>
+            <a:r>
+              <a:rPr lang="en-US" dirty="0" err="1"/>
+              <a:t>cfmailparam</a:t>
+            </a:r>
+            <a:r>
+              <a:rPr lang="en-US" dirty="0"/>
+              <a:t>&gt;</a:t>
+            </a:r>
+          </a:p>
+          <a:p>
+            <a:pPr lvl="1"/>
+            <a:r>
+              <a:rPr lang="en-US" dirty="0"/>
+              <a:t>&lt;</a:t>
+            </a:r>
+            <a:r>
+              <a:rPr lang="en-US" dirty="0" err="1"/>
+              <a:t>cfmailpart</a:t>
+            </a:r>
+            <a:r>
+              <a:rPr lang="en-US" dirty="0" smtClean="0"/>
+              <a:t>&gt;</a:t>
+            </a:r>
+          </a:p>
+          <a:p>
+            <a:r>
+              <a:rPr lang="en-US" dirty="0" smtClean="0"/>
+              <a:t>&lt;</a:t>
+            </a:r>
+            <a:r>
+              <a:rPr lang="en-US" dirty="0" err="1" smtClean="0"/>
+              <a:t>cfdocument</a:t>
+            </a:r>
+            <a:r>
+              <a:rPr lang="en-US" dirty="0" smtClean="0"/>
+              <a:t>&gt;</a:t>
+            </a:r>
+          </a:p>
+          <a:p>
+            <a:pPr lvl="1"/>
+            <a:r>
+              <a:rPr lang="en-US" dirty="0" smtClean="0"/>
+              <a:t>&lt;</a:t>
+            </a:r>
+            <a:r>
+              <a:rPr lang="en-US" dirty="0" err="1" smtClean="0"/>
+              <a:t>cfdocumentsection</a:t>
+            </a:r>
+            <a:r>
+              <a:rPr lang="en-US" dirty="0" smtClean="0"/>
+              <a:t>&gt;</a:t>
+            </a:r>
+          </a:p>
+          <a:p>
+            <a:pPr lvl="1"/>
+            <a:r>
+              <a:rPr lang="en-US" dirty="0" smtClean="0"/>
+              <a:t>&lt;</a:t>
+            </a:r>
+            <a:r>
+              <a:rPr lang="en-US" dirty="0" err="1" smtClean="0"/>
+              <a:t>cfdocumentitem</a:t>
+            </a:r>
+            <a:r>
+              <a:rPr lang="en-US" dirty="0" smtClean="0"/>
+              <a:t>&gt;</a:t>
+            </a:r>
+          </a:p>
+          <a:p>
+            <a:r>
+              <a:rPr lang="en-US" dirty="0" smtClean="0"/>
+              <a:t>&lt;</a:t>
+            </a:r>
+            <a:r>
+              <a:rPr lang="en-US" dirty="0" err="1" smtClean="0"/>
+              <a:t>cfform</a:t>
+            </a:r>
+            <a:r>
+              <a:rPr lang="en-US" dirty="0" smtClean="0"/>
+              <a:t>&gt;</a:t>
+            </a:r>
+          </a:p>
+          <a:p>
+            <a:pPr lvl="1"/>
+            <a:r>
+              <a:rPr lang="en-US" dirty="0" smtClean="0"/>
+              <a:t>&lt;</a:t>
+            </a:r>
+            <a:r>
+              <a:rPr lang="en-US" dirty="0" err="1" smtClean="0"/>
+              <a:t>cfinput</a:t>
+            </a:r>
+            <a:r>
+              <a:rPr lang="en-US" dirty="0" smtClean="0"/>
+              <a:t>&gt;</a:t>
+            </a:r>
+          </a:p>
+          <a:p>
+            <a:pPr lvl="1"/>
+            <a:r>
+              <a:rPr lang="en-US" dirty="0" smtClean="0"/>
+              <a:t>&lt;</a:t>
+            </a:r>
+            <a:r>
+              <a:rPr lang="en-US" dirty="0" err="1" smtClean="0"/>
+              <a:t>cftextarea</a:t>
+            </a:r>
+            <a:r>
+              <a:rPr lang="en-US" dirty="0" smtClean="0"/>
+              <a:t>&gt;</a:t>
+            </a:r>
+          </a:p>
+        </p:txBody>
+      </p:sp>
+    </p:spTree>
+    <p:extLst>
+      <p:ext uri="{BB962C8B-B14F-4D97-AF65-F5344CB8AC3E}">
+        <p14:creationId xmlns:p14="http://schemas.microsoft.com/office/powerpoint/2010/main" val="1012331123"/>
+      </p:ext>
+    </p:extLst>
+  </p:cSld>
+  <p:clrMapOvr>
+    <a:masterClrMapping/>
+  </p:clrMapOvr>
+</p:sld>
+</file>
+
+<file path=ppt/slides/slide26.xml><?xml version="1.0" encoding="utf-8"?>
+<p:sld xmlns:a="http://schemas.openxmlformats.org/drawingml/2006/main" xmlns:r="http://schemas.openxmlformats.org/officeDocument/2006/relationships" xmlns:p="http://schemas.openxmlformats.org/presentationml/2006/main">
+  <p:cSld>
+    <p:spTree>
+      <p:nvGrpSpPr>
+        <p:cNvPr id="1" name=""/>
+        <p:cNvGrpSpPr/>
+        <p:nvPr/>
+      </p:nvGrpSpPr>
+      <p:grpSpPr>
+        <a:xfrm>
+          <a:off x="0" y="0"/>
+          <a:ext cx="0" cy="0"/>
+          <a:chOff x="0" y="0"/>
+          <a:chExt cx="0" cy="0"/>
+        </a:xfrm>
+      </p:grpSpPr>
+      <p:sp>
+        <p:nvSpPr>
+          <p:cNvPr id="4" name="Title 3"/>
+          <p:cNvSpPr>
+            <a:spLocks noGrp="1"/>
+          </p:cNvSpPr>
+          <p:nvPr>
+            <p:ph type="ctrTitle"/>
+          </p:nvPr>
+        </p:nvSpPr>
+        <p:spPr/>
+        <p:txBody>
+          <a:bodyPr/>
+          <a:lstStyle/>
+          <a:p>
+            <a:r>
+              <a:rPr lang="en-US" dirty="0" smtClean="0"/>
+              <a:t>Demo 03</a:t>
+            </a:r>
+            <a:endParaRPr lang="en-US" dirty="0"/>
+          </a:p>
+        </p:txBody>
+      </p:sp>
+      <p:sp>
+        <p:nvSpPr>
+          <p:cNvPr id="5" name="Subtitle 4"/>
+          <p:cNvSpPr>
+            <a:spLocks noGrp="1"/>
+          </p:cNvSpPr>
+          <p:nvPr>
+            <p:ph type="subTitle" idx="1"/>
+          </p:nvPr>
+        </p:nvSpPr>
+        <p:spPr/>
+        <p:txBody>
+          <a:bodyPr/>
+          <a:lstStyle/>
+          <a:p>
+            <a:endParaRPr lang="en-US"/>
+          </a:p>
+        </p:txBody>
+      </p:sp>
+      <p:sp>
+        <p:nvSpPr>
+          <p:cNvPr id="6" name="Picture Placeholder 5"/>
+          <p:cNvSpPr>
+            <a:spLocks noGrp="1"/>
+          </p:cNvSpPr>
+          <p:nvPr>
+            <p:ph type="pic" idx="13"/>
+          </p:nvPr>
+        </p:nvSpPr>
+        <p:spPr/>
+      </p:sp>
+    </p:spTree>
+    <p:extLst>
+      <p:ext uri="{BB962C8B-B14F-4D97-AF65-F5344CB8AC3E}">
+        <p14:creationId xmlns:p14="http://schemas.microsoft.com/office/powerpoint/2010/main" val="2368212209"/>
+      </p:ext>
+    </p:extLst>
+  </p:cSld>
+  <p:clrMapOvr>
+    <a:masterClrMapping/>
+  </p:clrMapOvr>
+</p:sld>
+</file>
+
+<file path=ppt/slides/slide27.xml><?xml version="1.0" encoding="utf-8"?>
+<p:sld xmlns:a="http://schemas.openxmlformats.org/drawingml/2006/main" xmlns:r="http://schemas.openxmlformats.org/officeDocument/2006/relationships" xmlns:p="http://schemas.openxmlformats.org/presentationml/2006/main">
+  <p:cSld>
+    <p:spTree>
+      <p:nvGrpSpPr>
+        <p:cNvPr id="1" name=""/>
+        <p:cNvGrpSpPr/>
+        <p:nvPr/>
+      </p:nvGrpSpPr>
+      <p:grpSpPr>
+        <a:xfrm>
+          <a:off x="0" y="0"/>
+          <a:ext cx="0" cy="0"/>
+          <a:chOff x="0" y="0"/>
+          <a:chExt cx="0" cy="0"/>
+        </a:xfrm>
+      </p:grpSpPr>
+      <p:sp>
+        <p:nvSpPr>
+          <p:cNvPr id="5" name="Title 4"/>
+          <p:cNvSpPr>
+            <a:spLocks noGrp="1"/>
+          </p:cNvSpPr>
+          <p:nvPr>
+            <p:ph type="title"/>
+          </p:nvPr>
+        </p:nvSpPr>
+        <p:spPr/>
+        <p:txBody>
+          <a:bodyPr/>
+          <a:lstStyle/>
+          <a:p>
+            <a:r>
+              <a:rPr lang="en-US" dirty="0" smtClean="0"/>
+              <a:t>CFCs</a:t>
+            </a:r>
+            <a:endParaRPr lang="en-US" dirty="0"/>
+          </a:p>
+        </p:txBody>
+      </p:sp>
+      <p:sp>
+        <p:nvSpPr>
+          <p:cNvPr id="6" name="Content Placeholder 5"/>
+          <p:cNvSpPr>
+            <a:spLocks noGrp="1"/>
+          </p:cNvSpPr>
+          <p:nvPr>
+            <p:ph idx="1"/>
+          </p:nvPr>
+        </p:nvSpPr>
+        <p:spPr/>
+        <p:txBody>
+          <a:bodyPr/>
+          <a:lstStyle/>
+          <a:p>
+            <a:endParaRPr lang="en-US"/>
+          </a:p>
+        </p:txBody>
+      </p:sp>
+    </p:spTree>
+    <p:extLst>
+      <p:ext uri="{BB962C8B-B14F-4D97-AF65-F5344CB8AC3E}">
+        <p14:creationId xmlns:p14="http://schemas.microsoft.com/office/powerpoint/2010/main" val="2014084714"/>
+      </p:ext>
+    </p:extLst>
+  </p:cSld>
+  <p:clrMapOvr>
+    <a:masterClrMapping/>
+  </p:clrMapOvr>
 </p:sld>
 </file>
 
@@ -5415,11 +10040,11 @@
   <p:clrMapOvr>
     <a:masterClrMapping/>
   </p:clrMapOvr>
-  <mc:AlternateContent xmlns:mc="http://schemas.openxmlformats.org/markup-compatibility/2006">
-    <mc:Choice xmlns:p14="http://schemas.microsoft.com/office/powerpoint/2010/main" Requires="p14">
+  <mc:AlternateContent xmlns:mc="http://schemas.openxmlformats.org/markup-compatibility/2006" xmlns:p14="http://schemas.microsoft.com/office/powerpoint/2010/main">
+    <mc:Choice Requires="p14">
       <p:transition spd="slow" p14:dur="2000"/>
     </mc:Choice>
-    <mc:Fallback>
+    <mc:Fallback xmlns="">
       <p:transition xmlns:p14="http://schemas.microsoft.com/office/powerpoint/2010/main" spd="slow"/>
     </mc:Fallback>
   </mc:AlternateContent>
@@ -5501,11 +10126,11 @@
   <p:clrMapOvr>
     <a:masterClrMapping/>
   </p:clrMapOvr>
-  <mc:AlternateContent xmlns:mc="http://schemas.openxmlformats.org/markup-compatibility/2006">
-    <mc:Choice xmlns:p14="http://schemas.microsoft.com/office/powerpoint/2010/main" Requires="p14">
+  <mc:AlternateContent xmlns:mc="http://schemas.openxmlformats.org/markup-compatibility/2006" xmlns:p14="http://schemas.microsoft.com/office/powerpoint/2010/main">
+    <mc:Choice Requires="p14">
       <p:transition spd="slow" p14:dur="2000"/>
     </mc:Choice>
-    <mc:Fallback>
+    <mc:Fallback xmlns="">
       <p:transition xmlns:p14="http://schemas.microsoft.com/office/powerpoint/2010/main" spd="slow"/>
     </mc:Fallback>
   </mc:AlternateContent>
@@ -5583,11 +10208,11 @@
   <p:clrMapOvr>
     <a:masterClrMapping/>
   </p:clrMapOvr>
-  <mc:AlternateContent xmlns:mc="http://schemas.openxmlformats.org/markup-compatibility/2006">
-    <mc:Choice xmlns:p14="http://schemas.microsoft.com/office/powerpoint/2010/main" Requires="p14">
+  <mc:AlternateContent xmlns:mc="http://schemas.openxmlformats.org/markup-compatibility/2006" xmlns:p14="http://schemas.microsoft.com/office/powerpoint/2010/main">
+    <mc:Choice Requires="p14">
       <p:transition spd="slow" p14:dur="2000"/>
     </mc:Choice>
-    <mc:Fallback>
+    <mc:Fallback xmlns="">
       <p:transition xmlns:p14="http://schemas.microsoft.com/office/powerpoint/2010/main" spd="slow"/>
     </mc:Fallback>
   </mc:AlternateContent>
@@ -5669,11 +10294,11 @@
   <p:clrMapOvr>
     <a:masterClrMapping/>
   </p:clrMapOvr>
-  <mc:AlternateContent xmlns:mc="http://schemas.openxmlformats.org/markup-compatibility/2006">
-    <mc:Choice xmlns:p14="http://schemas.microsoft.com/office/powerpoint/2010/main" Requires="p14">
+  <mc:AlternateContent xmlns:mc="http://schemas.openxmlformats.org/markup-compatibility/2006" xmlns:p14="http://schemas.microsoft.com/office/powerpoint/2010/main">
+    <mc:Choice Requires="p14">
       <p:transition spd="slow" p14:dur="2000"/>
     </mc:Choice>
-    <mc:Fallback>
+    <mc:Fallback xmlns="">
       <p:transition xmlns:p14="http://schemas.microsoft.com/office/powerpoint/2010/main" spd="slow"/>
     </mc:Fallback>
   </mc:AlternateContent>
@@ -5755,11 +10380,11 @@
   <p:clrMapOvr>
     <a:masterClrMapping/>
   </p:clrMapOvr>
-  <mc:AlternateContent xmlns:mc="http://schemas.openxmlformats.org/markup-compatibility/2006">
-    <mc:Choice xmlns:p14="http://schemas.microsoft.com/office/powerpoint/2010/main" Requires="p14">
+  <mc:AlternateContent xmlns:mc="http://schemas.openxmlformats.org/markup-compatibility/2006" xmlns:p14="http://schemas.microsoft.com/office/powerpoint/2010/main">
+    <mc:Choice Requires="p14">
       <p:transition spd="slow" p14:dur="2000"/>
     </mc:Choice>
-    <mc:Fallback>
+    <mc:Fallback xmlns="">
       <p:transition xmlns:p14="http://schemas.microsoft.com/office/powerpoint/2010/main" spd="slow"/>
     </mc:Fallback>
   </mc:AlternateContent>
@@ -5841,11 +10466,11 @@
   <p:clrMapOvr>
     <a:masterClrMapping/>
   </p:clrMapOvr>
-  <mc:AlternateContent xmlns:mc="http://schemas.openxmlformats.org/markup-compatibility/2006">
-    <mc:Choice xmlns:p14="http://schemas.microsoft.com/office/powerpoint/2010/main" Requires="p14">
+  <mc:AlternateContent xmlns:mc="http://schemas.openxmlformats.org/markup-compatibility/2006" xmlns:p14="http://schemas.microsoft.com/office/powerpoint/2010/main">
+    <mc:Choice Requires="p14">
       <p:transition spd="slow" p14:dur="2000"/>
     </mc:Choice>
-    <mc:Fallback>
+    <mc:Fallback xmlns="">
       <p:transition xmlns:p14="http://schemas.microsoft.com/office/powerpoint/2010/main" spd="slow"/>
     </mc:Fallback>
   </mc:AlternateContent>

</xml_diff>

<commit_message>
Added 06 demo and 06 slides.
</commit_message>
<xml_diff>
--- a/presentation.pptx
+++ b/presentation.pptx
@@ -5,7 +5,7 @@
     <p:sldMasterId id="2147484490" r:id="rId1"/>
   </p:sldMasterIdLst>
   <p:notesMasterIdLst>
-    <p:notesMasterId r:id="rId36"/>
+    <p:notesMasterId r:id="rId41"/>
   </p:notesMasterIdLst>
   <p:sldIdLst>
     <p:sldId id="256" r:id="rId2"/>
@@ -42,6 +42,11 @@
     <p:sldId id="288" r:id="rId33"/>
     <p:sldId id="287" r:id="rId34"/>
     <p:sldId id="277" r:id="rId35"/>
+    <p:sldId id="291" r:id="rId36"/>
+    <p:sldId id="292" r:id="rId37"/>
+    <p:sldId id="293" r:id="rId38"/>
+    <p:sldId id="294" r:id="rId39"/>
+    <p:sldId id="295" r:id="rId40"/>
   </p:sldIdLst>
   <p:sldSz cx="9144000" cy="6858000" type="screen4x3"/>
   <p:notesSz cx="6858000" cy="9144000"/>
@@ -2307,6 +2312,344 @@
     <p:extLst>
       <p:ext uri="{BB962C8B-B14F-4D97-AF65-F5344CB8AC3E}">
         <p14:creationId xmlns:p14="http://schemas.microsoft.com/office/powerpoint/2010/main" val="882511047"/>
+      </p:ext>
+    </p:extLst>
+  </p:cSld>
+  <p:clrMapOvr>
+    <a:masterClrMapping/>
+  </p:clrMapOvr>
+</p:notes>
+</file>
+
+<file path=ppt/notesSlides/notesSlide25.xml><?xml version="1.0" encoding="utf-8"?>
+<p:notes xmlns:a="http://schemas.openxmlformats.org/drawingml/2006/main" xmlns:r="http://schemas.openxmlformats.org/officeDocument/2006/relationships" xmlns:p="http://schemas.openxmlformats.org/presentationml/2006/main">
+  <p:cSld>
+    <p:spTree>
+      <p:nvGrpSpPr>
+        <p:cNvPr id="1" name=""/>
+        <p:cNvGrpSpPr/>
+        <p:nvPr/>
+      </p:nvGrpSpPr>
+      <p:grpSpPr>
+        <a:xfrm>
+          <a:off x="0" y="0"/>
+          <a:ext cx="0" cy="0"/>
+          <a:chOff x="0" y="0"/>
+          <a:chExt cx="0" cy="0"/>
+        </a:xfrm>
+      </p:grpSpPr>
+      <p:sp>
+        <p:nvSpPr>
+          <p:cNvPr id="2" name="Slide Image Placeholder 1"/>
+          <p:cNvSpPr>
+            <a:spLocks noGrp="1" noRot="1" noChangeAspect="1"/>
+          </p:cNvSpPr>
+          <p:nvPr>
+            <p:ph type="sldImg"/>
+          </p:nvPr>
+        </p:nvSpPr>
+        <p:spPr/>
+      </p:sp>
+      <p:sp>
+        <p:nvSpPr>
+          <p:cNvPr id="3" name="Notes Placeholder 2"/>
+          <p:cNvSpPr>
+            <a:spLocks noGrp="1"/>
+          </p:cNvSpPr>
+          <p:nvPr>
+            <p:ph type="body" idx="1"/>
+          </p:nvPr>
+        </p:nvSpPr>
+        <p:spPr/>
+        <p:txBody>
+          <a:bodyPr/>
+          <a:lstStyle/>
+          <a:p>
+            <a:r>
+              <a:rPr lang="en-US" dirty="0" smtClean="0"/>
+              <a:t>http://</a:t>
+            </a:r>
+            <a:r>
+              <a:rPr lang="en-US" dirty="0" err="1" smtClean="0"/>
+              <a:t>openbd.org</a:t>
+            </a:r>
+            <a:r>
+              <a:rPr lang="en-US" dirty="0" smtClean="0"/>
+              <a:t>/manual/?/</a:t>
+            </a:r>
+            <a:r>
+              <a:rPr lang="en-US" dirty="0" err="1" smtClean="0"/>
+              <a:t>cfc_structure</a:t>
+            </a:r>
+            <a:endParaRPr lang="en-US" dirty="0" smtClean="0"/>
+          </a:p>
+          <a:p>
+            <a:r>
+              <a:rPr lang="en-US" dirty="0" smtClean="0"/>
+              <a:t>http://</a:t>
+            </a:r>
+            <a:r>
+              <a:rPr lang="en-US" dirty="0" err="1" smtClean="0"/>
+              <a:t>openbd.org</a:t>
+            </a:r>
+            <a:r>
+              <a:rPr lang="en-US" dirty="0" smtClean="0"/>
+              <a:t>/manual/?/</a:t>
+            </a:r>
+            <a:r>
+              <a:rPr lang="en-US" dirty="0" err="1" smtClean="0"/>
+              <a:t>cfc_encapsulation</a:t>
+            </a:r>
+            <a:endParaRPr lang="en-US" dirty="0"/>
+          </a:p>
+        </p:txBody>
+      </p:sp>
+      <p:sp>
+        <p:nvSpPr>
+          <p:cNvPr id="4" name="Slide Number Placeholder 3"/>
+          <p:cNvSpPr>
+            <a:spLocks noGrp="1"/>
+          </p:cNvSpPr>
+          <p:nvPr>
+            <p:ph type="sldNum" sz="quarter" idx="10"/>
+          </p:nvPr>
+        </p:nvSpPr>
+        <p:spPr/>
+        <p:txBody>
+          <a:bodyPr/>
+          <a:lstStyle/>
+          <a:p>
+            <a:fld id="{433137AF-EBFE-664E-840A-10B3290003D1}" type="slidenum">
+              <a:rPr lang="en-US" smtClean="0"/>
+              <a:t>35</a:t>
+            </a:fld>
+            <a:endParaRPr lang="en-US"/>
+          </a:p>
+        </p:txBody>
+      </p:sp>
+    </p:spTree>
+    <p:extLst>
+      <p:ext uri="{BB962C8B-B14F-4D97-AF65-F5344CB8AC3E}">
+        <p14:creationId xmlns:p14="http://schemas.microsoft.com/office/powerpoint/2010/main" val="444516683"/>
+      </p:ext>
+    </p:extLst>
+  </p:cSld>
+  <p:clrMapOvr>
+    <a:masterClrMapping/>
+  </p:clrMapOvr>
+</p:notes>
+</file>
+
+<file path=ppt/notesSlides/notesSlide26.xml><?xml version="1.0" encoding="utf-8"?>
+<p:notes xmlns:a="http://schemas.openxmlformats.org/drawingml/2006/main" xmlns:r="http://schemas.openxmlformats.org/officeDocument/2006/relationships" xmlns:p="http://schemas.openxmlformats.org/presentationml/2006/main">
+  <p:cSld>
+    <p:spTree>
+      <p:nvGrpSpPr>
+        <p:cNvPr id="1" name=""/>
+        <p:cNvGrpSpPr/>
+        <p:nvPr/>
+      </p:nvGrpSpPr>
+      <p:grpSpPr>
+        <a:xfrm>
+          <a:off x="0" y="0"/>
+          <a:ext cx="0" cy="0"/>
+          <a:chOff x="0" y="0"/>
+          <a:chExt cx="0" cy="0"/>
+        </a:xfrm>
+      </p:grpSpPr>
+      <p:sp>
+        <p:nvSpPr>
+          <p:cNvPr id="2" name="Slide Image Placeholder 1"/>
+          <p:cNvSpPr>
+            <a:spLocks noGrp="1" noRot="1" noChangeAspect="1"/>
+          </p:cNvSpPr>
+          <p:nvPr>
+            <p:ph type="sldImg"/>
+          </p:nvPr>
+        </p:nvSpPr>
+        <p:spPr/>
+      </p:sp>
+      <p:sp>
+        <p:nvSpPr>
+          <p:cNvPr id="3" name="Notes Placeholder 2"/>
+          <p:cNvSpPr>
+            <a:spLocks noGrp="1"/>
+          </p:cNvSpPr>
+          <p:nvPr>
+            <p:ph type="body" idx="1"/>
+          </p:nvPr>
+        </p:nvSpPr>
+        <p:spPr/>
+        <p:txBody>
+          <a:bodyPr/>
+          <a:lstStyle/>
+          <a:p>
+            <a:r>
+              <a:rPr lang="en-US" dirty="0" smtClean="0"/>
+              <a:t>http://</a:t>
+            </a:r>
+            <a:r>
+              <a:rPr lang="en-US" dirty="0" err="1" smtClean="0"/>
+              <a:t>openbd.org</a:t>
+            </a:r>
+            <a:r>
+              <a:rPr lang="en-US" dirty="0" smtClean="0"/>
+              <a:t>/manual/?/</a:t>
+            </a:r>
+            <a:r>
+              <a:rPr lang="en-US" dirty="0" err="1" smtClean="0"/>
+              <a:t>cfc_variables</a:t>
+            </a:r>
+            <a:endParaRPr lang="en-US" dirty="0"/>
+          </a:p>
+        </p:txBody>
+      </p:sp>
+      <p:sp>
+        <p:nvSpPr>
+          <p:cNvPr id="4" name="Slide Number Placeholder 3"/>
+          <p:cNvSpPr>
+            <a:spLocks noGrp="1"/>
+          </p:cNvSpPr>
+          <p:nvPr>
+            <p:ph type="sldNum" sz="quarter" idx="10"/>
+          </p:nvPr>
+        </p:nvSpPr>
+        <p:spPr/>
+        <p:txBody>
+          <a:bodyPr/>
+          <a:lstStyle/>
+          <a:p>
+            <a:fld id="{433137AF-EBFE-664E-840A-10B3290003D1}" type="slidenum">
+              <a:rPr lang="en-US" smtClean="0"/>
+              <a:t>36</a:t>
+            </a:fld>
+            <a:endParaRPr lang="en-US"/>
+          </a:p>
+        </p:txBody>
+      </p:sp>
+    </p:spTree>
+    <p:extLst>
+      <p:ext uri="{BB962C8B-B14F-4D97-AF65-F5344CB8AC3E}">
+        <p14:creationId xmlns:p14="http://schemas.microsoft.com/office/powerpoint/2010/main" val="1896287146"/>
+      </p:ext>
+    </p:extLst>
+  </p:cSld>
+  <p:clrMapOvr>
+    <a:masterClrMapping/>
+  </p:clrMapOvr>
+</p:notes>
+</file>
+
+<file path=ppt/notesSlides/notesSlide27.xml><?xml version="1.0" encoding="utf-8"?>
+<p:notes xmlns:a="http://schemas.openxmlformats.org/drawingml/2006/main" xmlns:r="http://schemas.openxmlformats.org/officeDocument/2006/relationships" xmlns:p="http://schemas.openxmlformats.org/presentationml/2006/main">
+  <p:cSld>
+    <p:spTree>
+      <p:nvGrpSpPr>
+        <p:cNvPr id="1" name=""/>
+        <p:cNvGrpSpPr/>
+        <p:nvPr/>
+      </p:nvGrpSpPr>
+      <p:grpSpPr>
+        <a:xfrm>
+          <a:off x="0" y="0"/>
+          <a:ext cx="0" cy="0"/>
+          <a:chOff x="0" y="0"/>
+          <a:chExt cx="0" cy="0"/>
+        </a:xfrm>
+      </p:grpSpPr>
+      <p:sp>
+        <p:nvSpPr>
+          <p:cNvPr id="2" name="Slide Image Placeholder 1"/>
+          <p:cNvSpPr>
+            <a:spLocks noGrp="1" noRot="1" noChangeAspect="1"/>
+          </p:cNvSpPr>
+          <p:nvPr>
+            <p:ph type="sldImg"/>
+          </p:nvPr>
+        </p:nvSpPr>
+        <p:spPr/>
+      </p:sp>
+      <p:sp>
+        <p:nvSpPr>
+          <p:cNvPr id="3" name="Notes Placeholder 2"/>
+          <p:cNvSpPr>
+            <a:spLocks noGrp="1"/>
+          </p:cNvSpPr>
+          <p:nvPr>
+            <p:ph type="body" idx="1"/>
+          </p:nvPr>
+        </p:nvSpPr>
+        <p:spPr/>
+        <p:txBody>
+          <a:bodyPr/>
+          <a:lstStyle/>
+          <a:p>
+            <a:r>
+              <a:rPr lang="en-US" dirty="0" smtClean="0"/>
+              <a:t>http://</a:t>
+            </a:r>
+            <a:r>
+              <a:rPr lang="en-US" dirty="0" err="1" smtClean="0"/>
+              <a:t>openbd.org</a:t>
+            </a:r>
+            <a:r>
+              <a:rPr lang="en-US" dirty="0" smtClean="0"/>
+              <a:t>/manual/?/</a:t>
+            </a:r>
+            <a:r>
+              <a:rPr lang="en-US" dirty="0" err="1" smtClean="0"/>
+              <a:t>app_application</a:t>
+            </a:r>
+            <a:endParaRPr lang="en-US" dirty="0" smtClean="0"/>
+          </a:p>
+          <a:p>
+            <a:r>
+              <a:rPr lang="en-US" dirty="0" smtClean="0"/>
+              <a:t>http://</a:t>
+            </a:r>
+            <a:r>
+              <a:rPr lang="en-US" dirty="0" err="1" smtClean="0"/>
+              <a:t>openbd.org</a:t>
+            </a:r>
+            <a:r>
+              <a:rPr lang="en-US" dirty="0" smtClean="0"/>
+              <a:t>/manual/?/</a:t>
+            </a:r>
+            <a:r>
+              <a:rPr lang="en-US" dirty="0" err="1" smtClean="0"/>
+              <a:t>app_application_cfc</a:t>
+            </a:r>
+            <a:endParaRPr lang="en-US" dirty="0"/>
+          </a:p>
+        </p:txBody>
+      </p:sp>
+      <p:sp>
+        <p:nvSpPr>
+          <p:cNvPr id="4" name="Slide Number Placeholder 3"/>
+          <p:cNvSpPr>
+            <a:spLocks noGrp="1"/>
+          </p:cNvSpPr>
+          <p:nvPr>
+            <p:ph type="sldNum" sz="quarter" idx="10"/>
+          </p:nvPr>
+        </p:nvSpPr>
+        <p:spPr/>
+        <p:txBody>
+          <a:bodyPr/>
+          <a:lstStyle/>
+          <a:p>
+            <a:fld id="{433137AF-EBFE-664E-840A-10B3290003D1}" type="slidenum">
+              <a:rPr lang="en-US" smtClean="0"/>
+              <a:t>38</a:t>
+            </a:fld>
+            <a:endParaRPr lang="en-US"/>
+          </a:p>
+        </p:txBody>
+      </p:sp>
+    </p:spTree>
+    <p:extLst>
+      <p:ext uri="{BB962C8B-B14F-4D97-AF65-F5344CB8AC3E}">
+        <p14:creationId xmlns:p14="http://schemas.microsoft.com/office/powerpoint/2010/main" val="1218584212"/>
       </p:ext>
     </p:extLst>
   </p:cSld>
@@ -10509,7 +10852,7 @@
         <p:spPr/>
         <p:txBody>
           <a:bodyPr>
-            <a:normAutofit fontScale="92500" lnSpcReduction="20000"/>
+            <a:normAutofit fontScale="77500" lnSpcReduction="20000"/>
           </a:bodyPr>
           <a:lstStyle/>
           <a:p>
@@ -10719,8 +11062,54 @@
             </a:r>
             <a:r>
               <a:rPr lang="en-US" dirty="0" smtClean="0"/>
-              <a:t> scope (sometimes)</a:t>
-            </a:r>
+              <a:t> scope (sometimes</a:t>
+            </a:r>
+            <a:r>
+              <a:rPr lang="en-US" dirty="0" smtClean="0"/>
+              <a:t>)</a:t>
+            </a:r>
+          </a:p>
+          <a:p>
+            <a:r>
+              <a:rPr lang="en-US" sz="2300" dirty="0" smtClean="0">
+                <a:latin typeface="Courier New"/>
+                <a:cs typeface="Courier New"/>
+              </a:rPr>
+              <a:t>&lt;</a:t>
+            </a:r>
+            <a:r>
+              <a:rPr lang="en-US" sz="2300" dirty="0" smtClean="0">
+                <a:latin typeface="Courier New"/>
+                <a:cs typeface="Courier New"/>
+                <a:hlinkClick r:id="rId7"/>
+              </a:rPr>
+              <a:t>cfhtmlhead</a:t>
+            </a:r>
+            <a:r>
+              <a:rPr lang="en-US" sz="2300" dirty="0" smtClean="0">
+                <a:latin typeface="Courier New"/>
+                <a:cs typeface="Courier New"/>
+              </a:rPr>
+              <a:t> text=“TEXT”&gt;</a:t>
+            </a:r>
+          </a:p>
+          <a:p>
+            <a:pPr lvl="1"/>
+            <a:r>
+              <a:rPr lang="en-US" dirty="0" smtClean="0"/>
+              <a:t>Text is any HTML you want inserted right before </a:t>
+            </a:r>
+            <a:r>
+              <a:rPr lang="en-US" sz="2100" dirty="0" smtClean="0">
+                <a:latin typeface="Courier New"/>
+                <a:cs typeface="Courier New"/>
+              </a:rPr>
+              <a:t>&lt;/head&gt;</a:t>
+            </a:r>
+            <a:endParaRPr lang="en-US" dirty="0" smtClean="0">
+              <a:latin typeface="Courier New"/>
+              <a:cs typeface="Courier New"/>
+            </a:endParaRPr>
           </a:p>
         </p:txBody>
       </p:sp>
@@ -11740,11 +12129,7 @@
           <a:p>
             <a:r>
               <a:rPr lang="en-US" dirty="0" smtClean="0"/>
-              <a:t>Usually return value </a:t>
-            </a:r>
-            <a:r>
-              <a:rPr lang="en-US" smtClean="0"/>
-              <a:t>and doesn’t output</a:t>
+              <a:t>Usually return value and doesn’t output</a:t>
             </a:r>
             <a:endParaRPr lang="en-US" dirty="0"/>
           </a:p>
@@ -12094,7 +12479,7 @@
           <a:p>
             <a:r>
               <a:rPr lang="en-US" dirty="0" smtClean="0"/>
-              <a:t>CFCs</a:t>
+              <a:t>Modularity</a:t>
             </a:r>
             <a:endParaRPr lang="en-US" dirty="0"/>
           </a:p>
@@ -12115,7 +12500,75 @@
           <a:bodyPr/>
           <a:lstStyle/>
           <a:p>
-            <a:endParaRPr lang="en-US"/>
+            <a:r>
+              <a:rPr lang="en-US" dirty="0" smtClean="0"/>
+              <a:t>&lt;</a:t>
+            </a:r>
+            <a:r>
+              <a:rPr lang="en-US" dirty="0" smtClean="0">
+                <a:hlinkClick r:id="rId3"/>
+              </a:rPr>
+              <a:t>cfinclude</a:t>
+            </a:r>
+            <a:r>
+              <a:rPr lang="en-US" dirty="0" smtClean="0"/>
+              <a:t> template=“REAL PATH”&gt;</a:t>
+            </a:r>
+          </a:p>
+          <a:p>
+            <a:pPr lvl="1"/>
+            <a:r>
+              <a:rPr lang="en-US" dirty="0" smtClean="0"/>
+              <a:t>Executes the template into your page</a:t>
+            </a:r>
+          </a:p>
+          <a:p>
+            <a:r>
+              <a:rPr lang="en-US" dirty="0" smtClean="0"/>
+              <a:t>Custom Tags</a:t>
+            </a:r>
+          </a:p>
+          <a:p>
+            <a:pPr lvl="1"/>
+            <a:r>
+              <a:rPr lang="en-US" dirty="0" smtClean="0"/>
+              <a:t>&lt;</a:t>
+            </a:r>
+            <a:r>
+              <a:rPr lang="en-US" dirty="0" err="1" smtClean="0"/>
+              <a:t>cf_mycustomtag</a:t>
+            </a:r>
+            <a:r>
+              <a:rPr lang="en-US" dirty="0" smtClean="0"/>
+              <a:t> ...&gt;</a:t>
+            </a:r>
+          </a:p>
+          <a:p>
+            <a:pPr lvl="1"/>
+            <a:r>
+              <a:rPr lang="en-US" dirty="0" smtClean="0"/>
+              <a:t>Must drop custom tag into custom tags folder</a:t>
+            </a:r>
+          </a:p>
+          <a:p>
+            <a:r>
+              <a:rPr lang="en-US" dirty="0" smtClean="0"/>
+              <a:t>UDFs</a:t>
+            </a:r>
+          </a:p>
+          <a:p>
+            <a:r>
+              <a:rPr lang="en-US" dirty="0" smtClean="0"/>
+              <a:t>ColdFusion Components (CFCs)</a:t>
+            </a:r>
+          </a:p>
+          <a:p>
+            <a:pPr lvl="1"/>
+            <a:r>
+              <a:rPr lang="en-US" dirty="0" smtClean="0"/>
+              <a:t>Can be collection of UDFs or an object</a:t>
+            </a:r>
+            <a:endParaRPr lang="en-US" dirty="0"/>
           </a:p>
         </p:txBody>
       </p:sp>
@@ -12123,6 +12576,799 @@
     <p:extLst>
       <p:ext uri="{BB962C8B-B14F-4D97-AF65-F5344CB8AC3E}">
         <p14:creationId xmlns:p14="http://schemas.microsoft.com/office/powerpoint/2010/main" val="2014084714"/>
+      </p:ext>
+    </p:extLst>
+  </p:cSld>
+  <p:clrMapOvr>
+    <a:masterClrMapping/>
+  </p:clrMapOvr>
+</p:sld>
+</file>
+
+<file path=ppt/slides/slide35.xml><?xml version="1.0" encoding="utf-8"?>
+<p:sld xmlns:a="http://schemas.openxmlformats.org/drawingml/2006/main" xmlns:r="http://schemas.openxmlformats.org/officeDocument/2006/relationships" xmlns:p="http://schemas.openxmlformats.org/presentationml/2006/main">
+  <p:cSld>
+    <p:spTree>
+      <p:nvGrpSpPr>
+        <p:cNvPr id="1" name=""/>
+        <p:cNvGrpSpPr/>
+        <p:nvPr/>
+      </p:nvGrpSpPr>
+      <p:grpSpPr>
+        <a:xfrm>
+          <a:off x="0" y="0"/>
+          <a:ext cx="0" cy="0"/>
+          <a:chOff x="0" y="0"/>
+          <a:chExt cx="0" cy="0"/>
+        </a:xfrm>
+      </p:grpSpPr>
+      <p:sp>
+        <p:nvSpPr>
+          <p:cNvPr id="2" name="Title 1"/>
+          <p:cNvSpPr>
+            <a:spLocks noGrp="1"/>
+          </p:cNvSpPr>
+          <p:nvPr>
+            <p:ph type="title"/>
+          </p:nvPr>
+        </p:nvSpPr>
+        <p:spPr/>
+        <p:txBody>
+          <a:bodyPr/>
+          <a:lstStyle/>
+          <a:p>
+            <a:r>
+              <a:rPr lang="en-US" dirty="0" smtClean="0"/>
+              <a:t>CFC Syntax</a:t>
+            </a:r>
+            <a:endParaRPr lang="en-US" dirty="0"/>
+          </a:p>
+        </p:txBody>
+      </p:sp>
+      <p:sp>
+        <p:nvSpPr>
+          <p:cNvPr id="3" name="Content Placeholder 2"/>
+          <p:cNvSpPr>
+            <a:spLocks noGrp="1"/>
+          </p:cNvSpPr>
+          <p:nvPr>
+            <p:ph idx="1"/>
+          </p:nvPr>
+        </p:nvSpPr>
+        <p:spPr/>
+        <p:txBody>
+          <a:bodyPr>
+            <a:normAutofit lnSpcReduction="10000"/>
+          </a:bodyPr>
+          <a:lstStyle/>
+          <a:p>
+            <a:r>
+              <a:rPr lang="en-US" sz="2000" dirty="0" smtClean="0">
+                <a:latin typeface="Courier New"/>
+                <a:cs typeface="Courier New"/>
+              </a:rPr>
+              <a:t>&lt;</a:t>
+            </a:r>
+            <a:r>
+              <a:rPr lang="en-US" sz="2000" dirty="0" smtClean="0">
+                <a:latin typeface="Courier New"/>
+                <a:cs typeface="Courier New"/>
+                <a:hlinkClick r:id="rId3"/>
+              </a:rPr>
+              <a:t>cfcomponent</a:t>
+            </a:r>
+            <a:r>
+              <a:rPr lang="en-US" sz="2000" dirty="0" smtClean="0">
+                <a:latin typeface="Courier New"/>
+                <a:cs typeface="Courier New"/>
+              </a:rPr>
+              <a:t> output=“BOOLEAN” </a:t>
+            </a:r>
+            <a:r>
+              <a:rPr lang="en-US" sz="2000" dirty="0" err="1" smtClean="0">
+                <a:latin typeface="Courier New"/>
+                <a:cs typeface="Courier New"/>
+              </a:rPr>
+              <a:t>displayname</a:t>
+            </a:r>
+            <a:r>
+              <a:rPr lang="en-US" sz="2000" dirty="0" smtClean="0">
+                <a:latin typeface="Courier New"/>
+                <a:cs typeface="Courier New"/>
+              </a:rPr>
+              <a:t>=“NAME” hint=“STRING” extends=“COMPONENT”&gt;</a:t>
+            </a:r>
+          </a:p>
+          <a:p>
+            <a:pPr lvl="1"/>
+            <a:r>
+              <a:rPr lang="en-US" dirty="0" smtClean="0"/>
+              <a:t>Wraps your CFC</a:t>
+            </a:r>
+          </a:p>
+          <a:p>
+            <a:pPr lvl="1"/>
+            <a:r>
+              <a:rPr lang="en-US" dirty="0"/>
+              <a:t>T</a:t>
+            </a:r>
+            <a:r>
+              <a:rPr lang="en-US" dirty="0" smtClean="0"/>
+              <a:t>ags are optional, most for documentation</a:t>
+            </a:r>
+          </a:p>
+          <a:p>
+            <a:r>
+              <a:rPr lang="en-US" dirty="0" smtClean="0"/>
+              <a:t>Define functions with </a:t>
+            </a:r>
+            <a:r>
+              <a:rPr lang="en-US" sz="2000" dirty="0" smtClean="0">
+                <a:latin typeface="Courier New"/>
+                <a:cs typeface="Courier New"/>
+              </a:rPr>
+              <a:t>&lt;</a:t>
+            </a:r>
+            <a:r>
+              <a:rPr lang="en-US" sz="2000" dirty="0" err="1" smtClean="0">
+                <a:latin typeface="Courier New"/>
+                <a:cs typeface="Courier New"/>
+              </a:rPr>
+              <a:t>cffunction</a:t>
+            </a:r>
+            <a:r>
+              <a:rPr lang="en-US" sz="2000" dirty="0" smtClean="0">
+                <a:latin typeface="Courier New"/>
+                <a:cs typeface="Courier New"/>
+              </a:rPr>
+              <a:t>&gt;</a:t>
+            </a:r>
+            <a:endParaRPr lang="en-US" dirty="0" smtClean="0">
+              <a:latin typeface="Courier New"/>
+              <a:cs typeface="Courier New"/>
+            </a:endParaRPr>
+          </a:p>
+          <a:p>
+            <a:r>
+              <a:rPr lang="en-US" dirty="0" smtClean="0"/>
+              <a:t>Code between </a:t>
+            </a:r>
+            <a:r>
+              <a:rPr lang="en-US" sz="2000" dirty="0" smtClean="0">
+                <a:latin typeface="Courier New"/>
+                <a:cs typeface="Courier New"/>
+              </a:rPr>
+              <a:t>&lt;</a:t>
+            </a:r>
+            <a:r>
+              <a:rPr lang="en-US" sz="2000" dirty="0" err="1" smtClean="0">
+                <a:latin typeface="Courier New"/>
+                <a:cs typeface="Courier New"/>
+              </a:rPr>
+              <a:t>cfcomponent</a:t>
+            </a:r>
+            <a:r>
+              <a:rPr lang="en-US" sz="2000" dirty="0" smtClean="0">
+                <a:latin typeface="Courier New"/>
+                <a:cs typeface="Courier New"/>
+              </a:rPr>
+              <a:t>&gt;</a:t>
+            </a:r>
+            <a:r>
+              <a:rPr lang="en-US" dirty="0" smtClean="0"/>
+              <a:t> and first </a:t>
+            </a:r>
+            <a:r>
+              <a:rPr lang="en-US" sz="2000" dirty="0" smtClean="0">
+                <a:latin typeface="Courier New"/>
+                <a:cs typeface="Courier New"/>
+              </a:rPr>
+              <a:t>&lt;</a:t>
+            </a:r>
+            <a:r>
+              <a:rPr lang="en-US" sz="2000" dirty="0" err="1" smtClean="0">
+                <a:latin typeface="Courier New"/>
+                <a:cs typeface="Courier New"/>
+              </a:rPr>
+              <a:t>cffunction</a:t>
+            </a:r>
+            <a:r>
+              <a:rPr lang="en-US" sz="2000" dirty="0" smtClean="0">
+                <a:latin typeface="Courier New"/>
+                <a:cs typeface="Courier New"/>
+              </a:rPr>
+              <a:t>&gt;</a:t>
+            </a:r>
+            <a:r>
+              <a:rPr lang="en-US" dirty="0" smtClean="0"/>
+              <a:t> acts as “</a:t>
+            </a:r>
+            <a:r>
+              <a:rPr lang="en-US" dirty="0" err="1" smtClean="0"/>
+              <a:t>init</a:t>
+            </a:r>
+            <a:r>
+              <a:rPr lang="en-US" dirty="0" smtClean="0"/>
+              <a:t>()”</a:t>
+            </a:r>
+          </a:p>
+          <a:p>
+            <a:r>
+              <a:rPr lang="en-US" dirty="0" smtClean="0"/>
+              <a:t>Getters / Setters not automatically created</a:t>
+            </a:r>
+          </a:p>
+          <a:p>
+            <a:r>
+              <a:rPr lang="en-US" dirty="0" smtClean="0"/>
+              <a:t>Instantiated using </a:t>
+            </a:r>
+            <a:r>
+              <a:rPr lang="en-US" dirty="0" err="1" smtClean="0">
+                <a:hlinkClick r:id="rId4"/>
+              </a:rPr>
+              <a:t>CreateObject</a:t>
+            </a:r>
+            <a:r>
+              <a:rPr lang="en-US" dirty="0" smtClean="0"/>
+              <a:t>()</a:t>
+            </a:r>
+            <a:endParaRPr lang="en-US" dirty="0"/>
+          </a:p>
+        </p:txBody>
+      </p:sp>
+    </p:spTree>
+    <p:extLst>
+      <p:ext uri="{BB962C8B-B14F-4D97-AF65-F5344CB8AC3E}">
+        <p14:creationId xmlns:p14="http://schemas.microsoft.com/office/powerpoint/2010/main" val="1769265055"/>
+      </p:ext>
+    </p:extLst>
+  </p:cSld>
+  <p:clrMapOvr>
+    <a:masterClrMapping/>
+  </p:clrMapOvr>
+</p:sld>
+</file>
+
+<file path=ppt/slides/slide36.xml><?xml version="1.0" encoding="utf-8"?>
+<p:sld xmlns:a="http://schemas.openxmlformats.org/drawingml/2006/main" xmlns:r="http://schemas.openxmlformats.org/officeDocument/2006/relationships" xmlns:p="http://schemas.openxmlformats.org/presentationml/2006/main">
+  <p:cSld>
+    <p:spTree>
+      <p:nvGrpSpPr>
+        <p:cNvPr id="1" name=""/>
+        <p:cNvGrpSpPr/>
+        <p:nvPr/>
+      </p:nvGrpSpPr>
+      <p:grpSpPr>
+        <a:xfrm>
+          <a:off x="0" y="0"/>
+          <a:ext cx="0" cy="0"/>
+          <a:chOff x="0" y="0"/>
+          <a:chExt cx="0" cy="0"/>
+        </a:xfrm>
+      </p:grpSpPr>
+      <p:sp>
+        <p:nvSpPr>
+          <p:cNvPr id="2" name="Title 1"/>
+          <p:cNvSpPr>
+            <a:spLocks noGrp="1"/>
+          </p:cNvSpPr>
+          <p:nvPr>
+            <p:ph type="title"/>
+          </p:nvPr>
+        </p:nvSpPr>
+        <p:spPr/>
+        <p:txBody>
+          <a:bodyPr/>
+          <a:lstStyle/>
+          <a:p>
+            <a:r>
+              <a:rPr lang="en-US" dirty="0" smtClean="0"/>
+              <a:t>CFC Variable Scope</a:t>
+            </a:r>
+            <a:endParaRPr lang="en-US" dirty="0"/>
+          </a:p>
+        </p:txBody>
+      </p:sp>
+      <p:sp>
+        <p:nvSpPr>
+          <p:cNvPr id="3" name="Content Placeholder 2"/>
+          <p:cNvSpPr>
+            <a:spLocks noGrp="1"/>
+          </p:cNvSpPr>
+          <p:nvPr>
+            <p:ph idx="1"/>
+          </p:nvPr>
+        </p:nvSpPr>
+        <p:spPr/>
+        <p:txBody>
+          <a:bodyPr/>
+          <a:lstStyle/>
+          <a:p>
+            <a:r>
+              <a:rPr lang="en-US" dirty="0" smtClean="0"/>
+              <a:t>this</a:t>
+            </a:r>
+          </a:p>
+          <a:p>
+            <a:pPr lvl="1"/>
+            <a:r>
+              <a:rPr lang="en-US" dirty="0" smtClean="0"/>
+              <a:t>CFC’s global scope</a:t>
+            </a:r>
+          </a:p>
+          <a:p>
+            <a:pPr lvl="1"/>
+            <a:r>
+              <a:rPr lang="en-US" dirty="0" smtClean="0"/>
+              <a:t>Public when added as </a:t>
+            </a:r>
+            <a:r>
+              <a:rPr lang="en-US" dirty="0" err="1" smtClean="0"/>
+              <a:t>this.VARIABLE</a:t>
+            </a:r>
+            <a:endParaRPr lang="en-US" dirty="0" smtClean="0"/>
+          </a:p>
+          <a:p>
+            <a:r>
+              <a:rPr lang="en-US" dirty="0" smtClean="0"/>
+              <a:t>variables</a:t>
+            </a:r>
+          </a:p>
+          <a:p>
+            <a:pPr lvl="1"/>
+            <a:r>
+              <a:rPr lang="en-US" dirty="0" smtClean="0"/>
+              <a:t>CFC’s private scope</a:t>
+            </a:r>
+          </a:p>
+          <a:p>
+            <a:r>
+              <a:rPr lang="en-US" dirty="0" err="1" smtClean="0"/>
+              <a:t>var’d</a:t>
+            </a:r>
+            <a:r>
+              <a:rPr lang="en-US" dirty="0" smtClean="0"/>
+              <a:t> variables</a:t>
+            </a:r>
+          </a:p>
+          <a:p>
+            <a:pPr lvl="1"/>
+            <a:r>
+              <a:rPr lang="en-US" dirty="0" smtClean="0"/>
+              <a:t>Function’s local scope	</a:t>
+            </a:r>
+          </a:p>
+        </p:txBody>
+      </p:sp>
+    </p:spTree>
+    <p:extLst>
+      <p:ext uri="{BB962C8B-B14F-4D97-AF65-F5344CB8AC3E}">
+        <p14:creationId xmlns:p14="http://schemas.microsoft.com/office/powerpoint/2010/main" val="741162050"/>
+      </p:ext>
+    </p:extLst>
+  </p:cSld>
+  <p:clrMapOvr>
+    <a:masterClrMapping/>
+  </p:clrMapOvr>
+</p:sld>
+</file>
+
+<file path=ppt/slides/slide37.xml><?xml version="1.0" encoding="utf-8"?>
+<p:sld xmlns:a="http://schemas.openxmlformats.org/drawingml/2006/main" xmlns:r="http://schemas.openxmlformats.org/officeDocument/2006/relationships" xmlns:p="http://schemas.openxmlformats.org/presentationml/2006/main">
+  <p:cSld>
+    <p:spTree>
+      <p:nvGrpSpPr>
+        <p:cNvPr id="1" name=""/>
+        <p:cNvGrpSpPr/>
+        <p:nvPr/>
+      </p:nvGrpSpPr>
+      <p:grpSpPr>
+        <a:xfrm>
+          <a:off x="0" y="0"/>
+          <a:ext cx="0" cy="0"/>
+          <a:chOff x="0" y="0"/>
+          <a:chExt cx="0" cy="0"/>
+        </a:xfrm>
+      </p:grpSpPr>
+      <p:sp>
+        <p:nvSpPr>
+          <p:cNvPr id="4" name="Title 3"/>
+          <p:cNvSpPr>
+            <a:spLocks noGrp="1"/>
+          </p:cNvSpPr>
+          <p:nvPr>
+            <p:ph type="ctrTitle"/>
+          </p:nvPr>
+        </p:nvSpPr>
+        <p:spPr/>
+        <p:txBody>
+          <a:bodyPr/>
+          <a:lstStyle/>
+          <a:p>
+            <a:r>
+              <a:rPr lang="en-US" dirty="0" smtClean="0"/>
+              <a:t>Demo </a:t>
+            </a:r>
+            <a:r>
+              <a:rPr lang="en-US" dirty="0" smtClean="0"/>
+              <a:t>05</a:t>
+            </a:r>
+            <a:endParaRPr lang="en-US" dirty="0"/>
+          </a:p>
+        </p:txBody>
+      </p:sp>
+      <p:sp>
+        <p:nvSpPr>
+          <p:cNvPr id="5" name="Subtitle 4"/>
+          <p:cNvSpPr>
+            <a:spLocks noGrp="1"/>
+          </p:cNvSpPr>
+          <p:nvPr>
+            <p:ph type="subTitle" idx="1"/>
+          </p:nvPr>
+        </p:nvSpPr>
+        <p:spPr/>
+        <p:txBody>
+          <a:bodyPr/>
+          <a:lstStyle/>
+          <a:p>
+            <a:endParaRPr lang="en-US"/>
+          </a:p>
+        </p:txBody>
+      </p:sp>
+      <p:sp>
+        <p:nvSpPr>
+          <p:cNvPr id="6" name="Picture Placeholder 5"/>
+          <p:cNvSpPr>
+            <a:spLocks noGrp="1"/>
+          </p:cNvSpPr>
+          <p:nvPr>
+            <p:ph type="pic" idx="13"/>
+          </p:nvPr>
+        </p:nvSpPr>
+        <p:spPr/>
+      </p:sp>
+    </p:spTree>
+    <p:extLst>
+      <p:ext uri="{BB962C8B-B14F-4D97-AF65-F5344CB8AC3E}">
+        <p14:creationId xmlns:p14="http://schemas.microsoft.com/office/powerpoint/2010/main" val="4199451968"/>
+      </p:ext>
+    </p:extLst>
+  </p:cSld>
+  <p:clrMapOvr>
+    <a:masterClrMapping/>
+  </p:clrMapOvr>
+</p:sld>
+</file>
+
+<file path=ppt/slides/slide38.xml><?xml version="1.0" encoding="utf-8"?>
+<p:sld xmlns:a="http://schemas.openxmlformats.org/drawingml/2006/main" xmlns:r="http://schemas.openxmlformats.org/officeDocument/2006/relationships" xmlns:p="http://schemas.openxmlformats.org/presentationml/2006/main">
+  <p:cSld>
+    <p:spTree>
+      <p:nvGrpSpPr>
+        <p:cNvPr id="1" name=""/>
+        <p:cNvGrpSpPr/>
+        <p:nvPr/>
+      </p:nvGrpSpPr>
+      <p:grpSpPr>
+        <a:xfrm>
+          <a:off x="0" y="0"/>
+          <a:ext cx="0" cy="0"/>
+          <a:chOff x="0" y="0"/>
+          <a:chExt cx="0" cy="0"/>
+        </a:xfrm>
+      </p:grpSpPr>
+      <p:sp>
+        <p:nvSpPr>
+          <p:cNvPr id="5" name="Title 4"/>
+          <p:cNvSpPr>
+            <a:spLocks noGrp="1"/>
+          </p:cNvSpPr>
+          <p:nvPr>
+            <p:ph type="title"/>
+          </p:nvPr>
+        </p:nvSpPr>
+        <p:spPr/>
+        <p:txBody>
+          <a:bodyPr/>
+          <a:lstStyle/>
+          <a:p>
+            <a:r>
+              <a:rPr lang="en-US" dirty="0" smtClean="0"/>
+              <a:t>Applications</a:t>
+            </a:r>
+            <a:endParaRPr lang="en-US" dirty="0"/>
+          </a:p>
+        </p:txBody>
+      </p:sp>
+      <p:sp>
+        <p:nvSpPr>
+          <p:cNvPr id="6" name="Content Placeholder 5"/>
+          <p:cNvSpPr>
+            <a:spLocks noGrp="1"/>
+          </p:cNvSpPr>
+          <p:nvPr>
+            <p:ph idx="1"/>
+          </p:nvPr>
+        </p:nvSpPr>
+        <p:spPr/>
+        <p:txBody>
+          <a:bodyPr>
+            <a:normAutofit fontScale="92500" lnSpcReduction="20000"/>
+          </a:bodyPr>
+          <a:lstStyle/>
+          <a:p>
+            <a:r>
+              <a:rPr lang="en-US" dirty="0" err="1" smtClean="0"/>
+              <a:t>Application.cfc</a:t>
+            </a:r>
+            <a:r>
+              <a:rPr lang="en-US" dirty="0" smtClean="0"/>
+              <a:t> or </a:t>
+            </a:r>
+            <a:r>
+              <a:rPr lang="en-US" dirty="0" err="1" smtClean="0"/>
+              <a:t>Application.cfm</a:t>
+            </a:r>
+            <a:r>
+              <a:rPr lang="en-US" dirty="0" smtClean="0"/>
+              <a:t> creates an application</a:t>
+            </a:r>
+          </a:p>
+          <a:p>
+            <a:r>
+              <a:rPr lang="en-US" dirty="0" smtClean="0"/>
+              <a:t>Has special properties</a:t>
+            </a:r>
+          </a:p>
+          <a:p>
+            <a:pPr lvl="1"/>
+            <a:r>
+              <a:rPr lang="en-US" dirty="0" err="1" smtClean="0"/>
+              <a:t>this.name</a:t>
+            </a:r>
+            <a:r>
+              <a:rPr lang="en-US" dirty="0" smtClean="0"/>
+              <a:t>, </a:t>
+            </a:r>
+            <a:r>
+              <a:rPr lang="en-US" dirty="0" err="1" smtClean="0"/>
+              <a:t>this.scriptprotect</a:t>
+            </a:r>
+            <a:r>
+              <a:rPr lang="en-US" dirty="0" smtClean="0"/>
+              <a:t>, </a:t>
+            </a:r>
+            <a:r>
+              <a:rPr lang="en-US" dirty="0" err="1" smtClean="0"/>
+              <a:t>this.applicationtimeout</a:t>
+            </a:r>
+            <a:r>
+              <a:rPr lang="en-US" dirty="0" smtClean="0"/>
+              <a:t>, </a:t>
+            </a:r>
+            <a:r>
+              <a:rPr lang="en-US" dirty="0" err="1" smtClean="0"/>
+              <a:t>this.sessionmanagement</a:t>
+            </a:r>
+            <a:r>
+              <a:rPr lang="en-US" dirty="0" smtClean="0"/>
+              <a:t>, </a:t>
+            </a:r>
+            <a:r>
+              <a:rPr lang="en-US" dirty="0" err="1" smtClean="0"/>
+              <a:t>this.sessiontimeout</a:t>
+            </a:r>
+            <a:endParaRPr lang="en-US" dirty="0" smtClean="0"/>
+          </a:p>
+          <a:p>
+            <a:r>
+              <a:rPr lang="en-US" dirty="0" smtClean="0"/>
+              <a:t>Has normal properties: </a:t>
+            </a:r>
+            <a:r>
+              <a:rPr lang="en-US" dirty="0" err="1" smtClean="0"/>
+              <a:t>application.NAME</a:t>
+            </a:r>
+            <a:endParaRPr lang="en-US" dirty="0" smtClean="0"/>
+          </a:p>
+          <a:p>
+            <a:r>
+              <a:rPr lang="en-US" dirty="0" smtClean="0"/>
+              <a:t>Has special methods</a:t>
+            </a:r>
+          </a:p>
+          <a:p>
+            <a:pPr lvl="1"/>
+            <a:r>
+              <a:rPr lang="en-US" dirty="0" err="1" smtClean="0"/>
+              <a:t>onApplicationStart</a:t>
+            </a:r>
+            <a:r>
+              <a:rPr lang="en-US" dirty="0" smtClean="0"/>
+              <a:t>() / </a:t>
+            </a:r>
+            <a:r>
+              <a:rPr lang="en-US" dirty="0" err="1" smtClean="0"/>
+              <a:t>onApplicationEnd</a:t>
+            </a:r>
+            <a:r>
+              <a:rPr lang="en-US" dirty="0" smtClean="0"/>
+              <a:t>()</a:t>
+            </a:r>
+          </a:p>
+          <a:p>
+            <a:pPr lvl="1"/>
+            <a:r>
+              <a:rPr lang="en-US" dirty="0" err="1" smtClean="0"/>
+              <a:t>onSessionStart</a:t>
+            </a:r>
+            <a:r>
+              <a:rPr lang="en-US" dirty="0" smtClean="0"/>
+              <a:t>() / </a:t>
+            </a:r>
+            <a:r>
+              <a:rPr lang="en-US" dirty="0" err="1" smtClean="0"/>
+              <a:t>onSessionEnd</a:t>
+            </a:r>
+            <a:r>
+              <a:rPr lang="en-US" dirty="0" smtClean="0"/>
+              <a:t>()</a:t>
+            </a:r>
+          </a:p>
+          <a:p>
+            <a:pPr lvl="1"/>
+            <a:r>
+              <a:rPr lang="en-US" dirty="0" err="1" smtClean="0"/>
+              <a:t>onRequest</a:t>
+            </a:r>
+            <a:r>
+              <a:rPr lang="en-US" dirty="0" smtClean="0"/>
+              <a:t>() / </a:t>
+            </a:r>
+            <a:r>
+              <a:rPr lang="en-US" dirty="0" err="1" smtClean="0"/>
+              <a:t>onRequestStart</a:t>
+            </a:r>
+            <a:r>
+              <a:rPr lang="en-US" dirty="0" smtClean="0"/>
+              <a:t>() / </a:t>
+            </a:r>
+            <a:r>
+              <a:rPr lang="en-US" dirty="0" err="1" smtClean="0"/>
+              <a:t>onRequestEnd</a:t>
+            </a:r>
+            <a:r>
+              <a:rPr lang="en-US" dirty="0" smtClean="0"/>
+              <a:t>()</a:t>
+            </a:r>
+          </a:p>
+          <a:p>
+            <a:pPr lvl="1"/>
+            <a:r>
+              <a:rPr lang="en-US" dirty="0" err="1" smtClean="0"/>
+              <a:t>onError</a:t>
+            </a:r>
+            <a:r>
+              <a:rPr lang="en-US" dirty="0" smtClean="0"/>
+              <a:t>()</a:t>
+            </a:r>
+          </a:p>
+          <a:p>
+            <a:pPr lvl="1"/>
+            <a:r>
+              <a:rPr lang="en-US" dirty="0" err="1" smtClean="0"/>
+              <a:t>onMissingTemplate</a:t>
+            </a:r>
+            <a:r>
+              <a:rPr lang="en-US" dirty="0" smtClean="0"/>
+              <a:t>() / </a:t>
+            </a:r>
+            <a:r>
+              <a:rPr lang="en-US" dirty="0" err="1" smtClean="0"/>
+              <a:t>onMissingMethod</a:t>
+            </a:r>
+            <a:r>
+              <a:rPr lang="en-US" dirty="0" smtClean="0"/>
+              <a:t>()</a:t>
+            </a:r>
+            <a:endParaRPr lang="en-US" dirty="0"/>
+          </a:p>
+        </p:txBody>
+      </p:sp>
+    </p:spTree>
+    <p:extLst>
+      <p:ext uri="{BB962C8B-B14F-4D97-AF65-F5344CB8AC3E}">
+        <p14:creationId xmlns:p14="http://schemas.microsoft.com/office/powerpoint/2010/main" val="2873994102"/>
+      </p:ext>
+    </p:extLst>
+  </p:cSld>
+  <p:clrMapOvr>
+    <a:masterClrMapping/>
+  </p:clrMapOvr>
+</p:sld>
+</file>
+
+<file path=ppt/slides/slide39.xml><?xml version="1.0" encoding="utf-8"?>
+<p:sld xmlns:a="http://schemas.openxmlformats.org/drawingml/2006/main" xmlns:r="http://schemas.openxmlformats.org/officeDocument/2006/relationships" xmlns:p="http://schemas.openxmlformats.org/presentationml/2006/main">
+  <p:cSld>
+    <p:spTree>
+      <p:nvGrpSpPr>
+        <p:cNvPr id="1" name=""/>
+        <p:cNvGrpSpPr/>
+        <p:nvPr/>
+      </p:nvGrpSpPr>
+      <p:grpSpPr>
+        <a:xfrm>
+          <a:off x="0" y="0"/>
+          <a:ext cx="0" cy="0"/>
+          <a:chOff x="0" y="0"/>
+          <a:chExt cx="0" cy="0"/>
+        </a:xfrm>
+      </p:grpSpPr>
+      <p:sp>
+        <p:nvSpPr>
+          <p:cNvPr id="4" name="Title 3"/>
+          <p:cNvSpPr>
+            <a:spLocks noGrp="1"/>
+          </p:cNvSpPr>
+          <p:nvPr>
+            <p:ph type="ctrTitle"/>
+          </p:nvPr>
+        </p:nvSpPr>
+        <p:spPr/>
+        <p:txBody>
+          <a:bodyPr/>
+          <a:lstStyle/>
+          <a:p>
+            <a:r>
+              <a:rPr lang="en-US" dirty="0" smtClean="0"/>
+              <a:t>Demo </a:t>
+            </a:r>
+            <a:r>
+              <a:rPr lang="en-US" dirty="0" smtClean="0"/>
+              <a:t>06</a:t>
+            </a:r>
+            <a:endParaRPr lang="en-US" dirty="0"/>
+          </a:p>
+        </p:txBody>
+      </p:sp>
+      <p:sp>
+        <p:nvSpPr>
+          <p:cNvPr id="5" name="Subtitle 4"/>
+          <p:cNvSpPr>
+            <a:spLocks noGrp="1"/>
+          </p:cNvSpPr>
+          <p:nvPr>
+            <p:ph type="subTitle" idx="1"/>
+          </p:nvPr>
+        </p:nvSpPr>
+        <p:spPr/>
+        <p:txBody>
+          <a:bodyPr/>
+          <a:lstStyle/>
+          <a:p>
+            <a:endParaRPr lang="en-US"/>
+          </a:p>
+        </p:txBody>
+      </p:sp>
+      <p:sp>
+        <p:nvSpPr>
+          <p:cNvPr id="6" name="Picture Placeholder 5"/>
+          <p:cNvSpPr>
+            <a:spLocks noGrp="1"/>
+          </p:cNvSpPr>
+          <p:nvPr>
+            <p:ph type="pic" idx="13"/>
+          </p:nvPr>
+        </p:nvSpPr>
+        <p:spPr/>
+      </p:sp>
+    </p:spTree>
+    <p:extLst>
+      <p:ext uri="{BB962C8B-B14F-4D97-AF65-F5344CB8AC3E}">
+        <p14:creationId xmlns:p14="http://schemas.microsoft.com/office/powerpoint/2010/main" val="2724574937"/>
       </p:ext>
     </p:extLst>
   </p:cSld>

</xml_diff>

<commit_message>
Some name changing and adding SlideShare link to README.md
</commit_message>
<xml_diff>
--- a/presentation.pptx
+++ b/presentation.pptx
@@ -7331,7 +7331,11 @@
           <a:p>
             <a:r>
               <a:rPr lang="en-US" dirty="0" smtClean="0"/>
-              <a:t>Open Source ColdFusion</a:t>
+              <a:t>Open Source </a:t>
+            </a:r>
+            <a:r>
+              <a:rPr lang="en-US" dirty="0" smtClean="0"/>
+              <a:t>CFML</a:t>
             </a:r>
             <a:endParaRPr lang="en-US" dirty="0"/>
           </a:p>
@@ -11062,11 +11066,7 @@
             </a:r>
             <a:r>
               <a:rPr lang="en-US" dirty="0" smtClean="0"/>
-              <a:t> scope (sometimes</a:t>
-            </a:r>
-            <a:r>
-              <a:rPr lang="en-US" dirty="0" smtClean="0"/>
-              <a:t>)</a:t>
+              <a:t> scope (sometimes)</a:t>
             </a:r>
           </a:p>
           <a:p>
@@ -12988,11 +12988,7 @@
           <a:p>
             <a:r>
               <a:rPr lang="en-US" dirty="0" smtClean="0"/>
-              <a:t>Demo </a:t>
-            </a:r>
-            <a:r>
-              <a:rPr lang="en-US" dirty="0" smtClean="0"/>
-              <a:t>05</a:t>
+              <a:t>Demo 05</a:t>
             </a:r>
             <a:endParaRPr lang="en-US" dirty="0"/>
           </a:p>
@@ -13324,11 +13320,7 @@
           <a:p>
             <a:r>
               <a:rPr lang="en-US" dirty="0" smtClean="0"/>
-              <a:t>Demo </a:t>
-            </a:r>
-            <a:r>
-              <a:rPr lang="en-US" dirty="0" smtClean="0"/>
-              <a:t>06</a:t>
+              <a:t>Demo 06</a:t>
             </a:r>
             <a:endParaRPr lang="en-US" dirty="0"/>
           </a:p>

</xml_diff>